<commit_message>
Update Instalación y configuración de servicios de mensajería instantánea.pptx
</commit_message>
<xml_diff>
--- a/Documentacion/Instalación y configuración de servicios de mensajería instantánea.pptx
+++ b/Documentacion/Instalación y configuración de servicios de mensajería instantánea.pptx
@@ -12,6 +12,10 @@
     <p:sldId id="260" r:id="rId6"/>
     <p:sldId id="261" r:id="rId7"/>
     <p:sldId id="262" r:id="rId8"/>
+    <p:sldId id="263" r:id="rId9"/>
+    <p:sldId id="264" r:id="rId10"/>
+    <p:sldId id="265" r:id="rId11"/>
+    <p:sldId id="266" r:id="rId12"/>
   </p:sldIdLst>
   <p:sldSz cx="12192000" cy="6858000"/>
   <p:notesSz cx="6858000" cy="9144000"/>
@@ -988,6 +992,790 @@
   <dgm:styleLbl name="trBgShp">
     <dgm:fillClrLst meth="repeat">
       <a:schemeClr val="accent1">
+        <a:tint val="50000"/>
+        <a:alpha val="40000"/>
+      </a:schemeClr>
+    </dgm:fillClrLst>
+    <dgm:linClrLst meth="repeat">
+      <a:schemeClr val="accent2"/>
+    </dgm:linClrLst>
+    <dgm:effectClrLst/>
+    <dgm:txLinClrLst/>
+    <dgm:txFillClrLst meth="repeat">
+      <a:schemeClr val="lt1"/>
+    </dgm:txFillClrLst>
+    <dgm:txEffectClrLst/>
+  </dgm:styleLbl>
+  <dgm:styleLbl name="fgShp">
+    <dgm:fillClrLst meth="repeat">
+      <a:schemeClr val="accent2">
+        <a:tint val="40000"/>
+      </a:schemeClr>
+    </dgm:fillClrLst>
+    <dgm:linClrLst meth="repeat">
+      <a:schemeClr val="lt1"/>
+    </dgm:linClrLst>
+    <dgm:effectClrLst/>
+    <dgm:txLinClrLst/>
+    <dgm:txFillClrLst meth="repeat">
+      <a:schemeClr val="dk1"/>
+    </dgm:txFillClrLst>
+    <dgm:txEffectClrLst/>
+  </dgm:styleLbl>
+  <dgm:styleLbl name="revTx">
+    <dgm:fillClrLst meth="repeat">
+      <a:schemeClr val="lt1">
+        <a:alpha val="0"/>
+      </a:schemeClr>
+    </dgm:fillClrLst>
+    <dgm:linClrLst meth="repeat">
+      <a:schemeClr val="dk1">
+        <a:alpha val="0"/>
+      </a:schemeClr>
+    </dgm:linClrLst>
+    <dgm:effectClrLst/>
+    <dgm:txLinClrLst/>
+    <dgm:txFillClrLst meth="repeat">
+      <a:schemeClr val="tx1"/>
+    </dgm:txFillClrLst>
+    <dgm:txEffectClrLst/>
+  </dgm:styleLbl>
+</dgm:colorsDef>
+</file>
+
+<file path=ppt/diagrams/colors2.xml><?xml version="1.0" encoding="utf-8"?>
+<dgm:colorsDef xmlns:dgm="http://schemas.openxmlformats.org/drawingml/2006/diagram" xmlns:a="http://schemas.openxmlformats.org/drawingml/2006/main" uniqueId="urn:microsoft.com/office/officeart/2018/5/colors/Iconchunking_neutralbg_colorful2">
+  <dgm:title val=""/>
+  <dgm:desc val=""/>
+  <dgm:catLst>
+    <dgm:cat type="colorful" pri="10200"/>
+  </dgm:catLst>
+  <dgm:styleLbl name="node0">
+    <dgm:fillClrLst meth="repeat">
+      <a:schemeClr val="accent1"/>
+    </dgm:fillClrLst>
+    <dgm:linClrLst meth="repeat">
+      <a:schemeClr val="lt1"/>
+    </dgm:linClrLst>
+    <dgm:effectClrLst/>
+    <dgm:txLinClrLst/>
+    <dgm:txFillClrLst/>
+    <dgm:txEffectClrLst/>
+  </dgm:styleLbl>
+  <dgm:styleLbl name="node1">
+    <dgm:fillClrLst>
+      <a:schemeClr val="accent2"/>
+      <a:schemeClr val="accent3"/>
+    </dgm:fillClrLst>
+    <dgm:linClrLst meth="repeat">
+      <a:schemeClr val="lt1">
+        <a:alpha val="0"/>
+      </a:schemeClr>
+    </dgm:linClrLst>
+    <dgm:effectClrLst/>
+    <dgm:txLinClrLst/>
+    <dgm:txFillClrLst/>
+    <dgm:txEffectClrLst/>
+  </dgm:styleLbl>
+  <dgm:styleLbl name="alignNode1">
+    <dgm:fillClrLst>
+      <a:schemeClr val="accent2"/>
+      <a:schemeClr val="accent3"/>
+    </dgm:fillClrLst>
+    <dgm:linClrLst>
+      <a:schemeClr val="accent2"/>
+      <a:schemeClr val="accent3"/>
+    </dgm:linClrLst>
+    <dgm:effectClrLst/>
+    <dgm:txLinClrLst/>
+    <dgm:txFillClrLst/>
+    <dgm:txEffectClrLst/>
+  </dgm:styleLbl>
+  <dgm:styleLbl name="lnNode1">
+    <dgm:fillClrLst>
+      <a:schemeClr val="accent2"/>
+      <a:schemeClr val="accent3"/>
+    </dgm:fillClrLst>
+    <dgm:linClrLst meth="repeat">
+      <a:schemeClr val="lt1"/>
+    </dgm:linClrLst>
+    <dgm:effectClrLst/>
+    <dgm:txLinClrLst/>
+    <dgm:txFillClrLst/>
+    <dgm:txEffectClrLst/>
+  </dgm:styleLbl>
+  <dgm:styleLbl name="vennNode1">
+    <dgm:fillClrLst>
+      <a:schemeClr val="accent2">
+        <a:alpha val="50000"/>
+      </a:schemeClr>
+      <a:schemeClr val="accent3">
+        <a:alpha val="50000"/>
+      </a:schemeClr>
+    </dgm:fillClrLst>
+    <dgm:linClrLst meth="repeat">
+      <a:schemeClr val="lt1"/>
+    </dgm:linClrLst>
+    <dgm:effectClrLst/>
+    <dgm:txLinClrLst/>
+    <dgm:txFillClrLst/>
+    <dgm:txEffectClrLst/>
+  </dgm:styleLbl>
+  <dgm:styleLbl name="node2">
+    <dgm:fillClrLst>
+      <a:schemeClr val="accent3"/>
+    </dgm:fillClrLst>
+    <dgm:linClrLst meth="repeat">
+      <a:schemeClr val="lt1"/>
+    </dgm:linClrLst>
+    <dgm:effectClrLst/>
+    <dgm:txLinClrLst/>
+    <dgm:txFillClrLst/>
+    <dgm:txEffectClrLst/>
+  </dgm:styleLbl>
+  <dgm:styleLbl name="node3">
+    <dgm:fillClrLst>
+      <a:schemeClr val="accent4"/>
+    </dgm:fillClrLst>
+    <dgm:linClrLst meth="repeat">
+      <a:schemeClr val="lt1"/>
+    </dgm:linClrLst>
+    <dgm:effectClrLst/>
+    <dgm:txLinClrLst/>
+    <dgm:txFillClrLst/>
+    <dgm:txEffectClrLst/>
+  </dgm:styleLbl>
+  <dgm:styleLbl name="node4">
+    <dgm:fillClrLst>
+      <a:schemeClr val="accent5"/>
+    </dgm:fillClrLst>
+    <dgm:linClrLst meth="repeat">
+      <a:schemeClr val="lt1"/>
+    </dgm:linClrLst>
+    <dgm:effectClrLst/>
+    <dgm:txLinClrLst/>
+    <dgm:txFillClrLst/>
+    <dgm:txEffectClrLst/>
+  </dgm:styleLbl>
+  <dgm:styleLbl name="fgImgPlace1">
+    <dgm:fillClrLst>
+      <a:schemeClr val="accent2">
+        <a:tint val="50000"/>
+      </a:schemeClr>
+      <a:schemeClr val="accent3">
+        <a:tint val="50000"/>
+      </a:schemeClr>
+    </dgm:fillClrLst>
+    <dgm:linClrLst meth="repeat">
+      <a:schemeClr val="lt1"/>
+    </dgm:linClrLst>
+    <dgm:effectClrLst/>
+    <dgm:txLinClrLst/>
+    <dgm:txFillClrLst meth="repeat">
+      <a:schemeClr val="lt1"/>
+    </dgm:txFillClrLst>
+    <dgm:txEffectClrLst/>
+  </dgm:styleLbl>
+  <dgm:styleLbl name="alignImgPlace1">
+    <dgm:fillClrLst>
+      <a:schemeClr val="accent2">
+        <a:tint val="50000"/>
+      </a:schemeClr>
+      <a:schemeClr val="accent3">
+        <a:tint val="20000"/>
+      </a:schemeClr>
+    </dgm:fillClrLst>
+    <dgm:linClrLst meth="repeat">
+      <a:schemeClr val="lt1"/>
+    </dgm:linClrLst>
+    <dgm:effectClrLst/>
+    <dgm:txLinClrLst/>
+    <dgm:txFillClrLst meth="repeat">
+      <a:schemeClr val="lt1"/>
+    </dgm:txFillClrLst>
+    <dgm:txEffectClrLst/>
+  </dgm:styleLbl>
+  <dgm:styleLbl name="bgImgPlace1">
+    <dgm:fillClrLst>
+      <a:schemeClr val="accent2">
+        <a:tint val="50000"/>
+      </a:schemeClr>
+      <a:schemeClr val="accent3">
+        <a:tint val="20000"/>
+      </a:schemeClr>
+    </dgm:fillClrLst>
+    <dgm:linClrLst meth="repeat">
+      <a:schemeClr val="lt1"/>
+    </dgm:linClrLst>
+    <dgm:effectClrLst/>
+    <dgm:txLinClrLst/>
+    <dgm:txFillClrLst meth="repeat">
+      <a:schemeClr val="lt1"/>
+    </dgm:txFillClrLst>
+    <dgm:txEffectClrLst/>
+  </dgm:styleLbl>
+  <dgm:styleLbl name="sibTrans2D1">
+    <dgm:fillClrLst>
+      <a:schemeClr val="accent2"/>
+      <a:schemeClr val="accent3"/>
+    </dgm:fillClrLst>
+    <dgm:linClrLst meth="repeat">
+      <a:schemeClr val="lt1"/>
+    </dgm:linClrLst>
+    <dgm:effectClrLst/>
+    <dgm:txLinClrLst/>
+    <dgm:txFillClrLst/>
+    <dgm:txEffectClrLst/>
+  </dgm:styleLbl>
+  <dgm:styleLbl name="fgSibTrans2D1">
+    <dgm:fillClrLst>
+      <a:schemeClr val="accent2"/>
+      <a:schemeClr val="accent3"/>
+    </dgm:fillClrLst>
+    <dgm:linClrLst meth="repeat">
+      <a:schemeClr val="lt1"/>
+    </dgm:linClrLst>
+    <dgm:effectClrLst/>
+    <dgm:txLinClrLst/>
+    <dgm:txFillClrLst meth="repeat">
+      <a:schemeClr val="lt1"/>
+    </dgm:txFillClrLst>
+    <dgm:txEffectClrLst/>
+  </dgm:styleLbl>
+  <dgm:styleLbl name="bgSibTrans2D1">
+    <dgm:fillClrLst>
+      <a:schemeClr val="accent2"/>
+      <a:schemeClr val="accent3"/>
+    </dgm:fillClrLst>
+    <dgm:linClrLst meth="repeat">
+      <a:schemeClr val="lt1"/>
+    </dgm:linClrLst>
+    <dgm:effectClrLst/>
+    <dgm:txLinClrLst/>
+    <dgm:txFillClrLst meth="repeat">
+      <a:schemeClr val="lt1"/>
+    </dgm:txFillClrLst>
+    <dgm:txEffectClrLst/>
+  </dgm:styleLbl>
+  <dgm:styleLbl name="sibTrans1D1">
+    <dgm:fillClrLst/>
+    <dgm:linClrLst>
+      <a:schemeClr val="accent2"/>
+      <a:schemeClr val="accent3"/>
+    </dgm:linClrLst>
+    <dgm:effectClrLst/>
+    <dgm:txLinClrLst/>
+    <dgm:txFillClrLst meth="repeat">
+      <a:schemeClr val="tx1"/>
+    </dgm:txFillClrLst>
+    <dgm:txEffectClrLst/>
+  </dgm:styleLbl>
+  <dgm:styleLbl name="callout">
+    <dgm:fillClrLst meth="repeat">
+      <a:schemeClr val="accent2"/>
+    </dgm:fillClrLst>
+    <dgm:linClrLst meth="repeat">
+      <a:schemeClr val="accent2">
+        <a:tint val="50000"/>
+      </a:schemeClr>
+    </dgm:linClrLst>
+    <dgm:effectClrLst/>
+    <dgm:txLinClrLst/>
+    <dgm:txFillClrLst meth="repeat">
+      <a:schemeClr val="tx1"/>
+    </dgm:txFillClrLst>
+    <dgm:txEffectClrLst/>
+  </dgm:styleLbl>
+  <dgm:styleLbl name="asst0">
+    <dgm:fillClrLst meth="repeat">
+      <a:schemeClr val="accent2"/>
+    </dgm:fillClrLst>
+    <dgm:linClrLst meth="repeat">
+      <a:schemeClr val="lt1">
+        <a:shade val="80000"/>
+      </a:schemeClr>
+    </dgm:linClrLst>
+    <dgm:effectClrLst/>
+    <dgm:txLinClrLst/>
+    <dgm:txFillClrLst/>
+    <dgm:txEffectClrLst/>
+  </dgm:styleLbl>
+  <dgm:styleLbl name="asst1">
+    <dgm:fillClrLst meth="repeat">
+      <a:schemeClr val="accent3"/>
+    </dgm:fillClrLst>
+    <dgm:linClrLst meth="repeat">
+      <a:schemeClr val="lt1">
+        <a:shade val="80000"/>
+      </a:schemeClr>
+    </dgm:linClrLst>
+    <dgm:effectClrLst/>
+    <dgm:txLinClrLst/>
+    <dgm:txFillClrLst/>
+    <dgm:txEffectClrLst/>
+  </dgm:styleLbl>
+  <dgm:styleLbl name="asst2">
+    <dgm:fillClrLst>
+      <a:schemeClr val="accent4"/>
+    </dgm:fillClrLst>
+    <dgm:linClrLst meth="repeat">
+      <a:schemeClr val="lt1"/>
+    </dgm:linClrLst>
+    <dgm:effectClrLst/>
+    <dgm:txLinClrLst/>
+    <dgm:txFillClrLst/>
+    <dgm:txEffectClrLst/>
+  </dgm:styleLbl>
+  <dgm:styleLbl name="asst3">
+    <dgm:fillClrLst>
+      <a:schemeClr val="accent5"/>
+    </dgm:fillClrLst>
+    <dgm:linClrLst meth="repeat">
+      <a:schemeClr val="lt1"/>
+    </dgm:linClrLst>
+    <dgm:effectClrLst/>
+    <dgm:txLinClrLst/>
+    <dgm:txFillClrLst/>
+    <dgm:txEffectClrLst/>
+  </dgm:styleLbl>
+  <dgm:styleLbl name="asst4">
+    <dgm:fillClrLst>
+      <a:schemeClr val="accent6"/>
+    </dgm:fillClrLst>
+    <dgm:linClrLst meth="repeat">
+      <a:schemeClr val="lt1"/>
+    </dgm:linClrLst>
+    <dgm:effectClrLst/>
+    <dgm:txLinClrLst/>
+    <dgm:txFillClrLst/>
+    <dgm:txEffectClrLst/>
+  </dgm:styleLbl>
+  <dgm:styleLbl name="parChTrans2D1">
+    <dgm:fillClrLst meth="repeat">
+      <a:schemeClr val="accent2"/>
+    </dgm:fillClrLst>
+    <dgm:linClrLst meth="repeat">
+      <a:schemeClr val="lt1"/>
+    </dgm:linClrLst>
+    <dgm:effectClrLst/>
+    <dgm:txLinClrLst/>
+    <dgm:txFillClrLst meth="repeat">
+      <a:schemeClr val="lt1"/>
+    </dgm:txFillClrLst>
+    <dgm:txEffectClrLst/>
+  </dgm:styleLbl>
+  <dgm:styleLbl name="parChTrans2D2">
+    <dgm:fillClrLst meth="repeat">
+      <a:schemeClr val="accent3"/>
+    </dgm:fillClrLst>
+    <dgm:linClrLst meth="repeat">
+      <a:schemeClr val="lt1"/>
+    </dgm:linClrLst>
+    <dgm:effectClrLst/>
+    <dgm:txLinClrLst/>
+    <dgm:txFillClrLst/>
+    <dgm:txEffectClrLst/>
+  </dgm:styleLbl>
+  <dgm:styleLbl name="parChTrans2D3">
+    <dgm:fillClrLst meth="repeat">
+      <a:schemeClr val="accent4"/>
+    </dgm:fillClrLst>
+    <dgm:linClrLst meth="repeat">
+      <a:schemeClr val="lt1"/>
+    </dgm:linClrLst>
+    <dgm:effectClrLst/>
+    <dgm:txLinClrLst/>
+    <dgm:txFillClrLst/>
+    <dgm:txEffectClrLst/>
+  </dgm:styleLbl>
+  <dgm:styleLbl name="parChTrans2D4">
+    <dgm:fillClrLst meth="repeat">
+      <a:schemeClr val="accent5"/>
+    </dgm:fillClrLst>
+    <dgm:linClrLst meth="repeat">
+      <a:schemeClr val="lt1"/>
+    </dgm:linClrLst>
+    <dgm:effectClrLst/>
+    <dgm:txLinClrLst/>
+    <dgm:txFillClrLst meth="repeat">
+      <a:schemeClr val="lt1"/>
+    </dgm:txFillClrLst>
+    <dgm:txEffectClrLst/>
+  </dgm:styleLbl>
+  <dgm:styleLbl name="parChTrans1D1">
+    <dgm:fillClrLst meth="repeat">
+      <a:schemeClr val="accent2"/>
+    </dgm:fillClrLst>
+    <dgm:linClrLst meth="repeat">
+      <a:schemeClr val="accent2"/>
+    </dgm:linClrLst>
+    <dgm:effectClrLst/>
+    <dgm:txLinClrLst/>
+    <dgm:txFillClrLst meth="repeat">
+      <a:schemeClr val="tx1"/>
+    </dgm:txFillClrLst>
+    <dgm:txEffectClrLst/>
+  </dgm:styleLbl>
+  <dgm:styleLbl name="parChTrans1D2">
+    <dgm:fillClrLst meth="repeat">
+      <a:schemeClr val="accent2">
+        <a:tint val="90000"/>
+      </a:schemeClr>
+    </dgm:fillClrLst>
+    <dgm:linClrLst meth="repeat">
+      <a:schemeClr val="accent3"/>
+    </dgm:linClrLst>
+    <dgm:effectClrLst/>
+    <dgm:txLinClrLst/>
+    <dgm:txFillClrLst meth="repeat">
+      <a:schemeClr val="tx1"/>
+    </dgm:txFillClrLst>
+    <dgm:txEffectClrLst/>
+  </dgm:styleLbl>
+  <dgm:styleLbl name="parChTrans1D3">
+    <dgm:fillClrLst meth="repeat">
+      <a:schemeClr val="accent2">
+        <a:tint val="70000"/>
+      </a:schemeClr>
+    </dgm:fillClrLst>
+    <dgm:linClrLst meth="repeat">
+      <a:schemeClr val="accent4"/>
+    </dgm:linClrLst>
+    <dgm:effectClrLst/>
+    <dgm:txLinClrLst/>
+    <dgm:txFillClrLst meth="repeat">
+      <a:schemeClr val="tx1"/>
+    </dgm:txFillClrLst>
+    <dgm:txEffectClrLst/>
+  </dgm:styleLbl>
+  <dgm:styleLbl name="parChTrans1D4">
+    <dgm:fillClrLst meth="repeat">
+      <a:schemeClr val="accent2">
+        <a:tint val="50000"/>
+      </a:schemeClr>
+    </dgm:fillClrLst>
+    <dgm:linClrLst meth="repeat">
+      <a:schemeClr val="accent5"/>
+    </dgm:linClrLst>
+    <dgm:effectClrLst/>
+    <dgm:txLinClrLst/>
+    <dgm:txFillClrLst meth="repeat">
+      <a:schemeClr val="tx1"/>
+    </dgm:txFillClrLst>
+    <dgm:txEffectClrLst/>
+  </dgm:styleLbl>
+  <dgm:styleLbl name="fgAcc1">
+    <dgm:fillClrLst meth="repeat">
+      <a:schemeClr val="lt1">
+        <a:alpha val="90000"/>
+      </a:schemeClr>
+    </dgm:fillClrLst>
+    <dgm:linClrLst>
+      <a:schemeClr val="accent2"/>
+      <a:schemeClr val="accent3"/>
+    </dgm:linClrLst>
+    <dgm:effectClrLst/>
+    <dgm:txLinClrLst/>
+    <dgm:txFillClrLst meth="repeat">
+      <a:schemeClr val="dk1"/>
+    </dgm:txFillClrLst>
+    <dgm:txEffectClrLst/>
+  </dgm:styleLbl>
+  <dgm:styleLbl name="conFgAcc1">
+    <dgm:fillClrLst meth="repeat">
+      <a:schemeClr val="lt1">
+        <a:alpha val="90000"/>
+      </a:schemeClr>
+    </dgm:fillClrLst>
+    <dgm:linClrLst>
+      <a:schemeClr val="accent2"/>
+      <a:schemeClr val="accent3"/>
+    </dgm:linClrLst>
+    <dgm:effectClrLst/>
+    <dgm:txLinClrLst/>
+    <dgm:txFillClrLst meth="repeat">
+      <a:schemeClr val="dk1"/>
+    </dgm:txFillClrLst>
+    <dgm:txEffectClrLst/>
+  </dgm:styleLbl>
+  <dgm:styleLbl name="alignAcc1">
+    <dgm:fillClrLst meth="repeat">
+      <a:schemeClr val="lt1">
+        <a:alpha val="90000"/>
+      </a:schemeClr>
+    </dgm:fillClrLst>
+    <dgm:linClrLst>
+      <a:schemeClr val="accent2"/>
+      <a:schemeClr val="accent3"/>
+    </dgm:linClrLst>
+    <dgm:effectClrLst/>
+    <dgm:txLinClrLst/>
+    <dgm:txFillClrLst meth="repeat">
+      <a:schemeClr val="dk1"/>
+    </dgm:txFillClrLst>
+    <dgm:txEffectClrLst/>
+  </dgm:styleLbl>
+  <dgm:styleLbl name="trAlignAcc1">
+    <dgm:fillClrLst meth="repeat">
+      <a:schemeClr val="lt1">
+        <a:alpha val="40000"/>
+      </a:schemeClr>
+    </dgm:fillClrLst>
+    <dgm:linClrLst meth="repeat">
+      <a:schemeClr val="accent2"/>
+    </dgm:linClrLst>
+    <dgm:effectClrLst/>
+    <dgm:txLinClrLst/>
+    <dgm:txFillClrLst meth="repeat">
+      <a:schemeClr val="dk1"/>
+    </dgm:txFillClrLst>
+    <dgm:txEffectClrLst/>
+  </dgm:styleLbl>
+  <dgm:styleLbl name="bgAcc1">
+    <dgm:fillClrLst meth="repeat">
+      <a:schemeClr val="lt1">
+        <a:alpha val="90000"/>
+      </a:schemeClr>
+    </dgm:fillClrLst>
+    <dgm:linClrLst>
+      <a:schemeClr val="accent2"/>
+      <a:schemeClr val="accent3"/>
+    </dgm:linClrLst>
+    <dgm:effectClrLst/>
+    <dgm:txLinClrLst/>
+    <dgm:txFillClrLst meth="repeat">
+      <a:schemeClr val="dk1"/>
+    </dgm:txFillClrLst>
+    <dgm:txEffectClrLst/>
+  </dgm:styleLbl>
+  <dgm:styleLbl name="solidFgAcc1">
+    <dgm:fillClrLst meth="repeat">
+      <a:schemeClr val="lt1"/>
+    </dgm:fillClrLst>
+    <dgm:linClrLst>
+      <a:schemeClr val="accent2"/>
+      <a:schemeClr val="accent3"/>
+    </dgm:linClrLst>
+    <dgm:effectClrLst/>
+    <dgm:txLinClrLst/>
+    <dgm:txFillClrLst meth="repeat">
+      <a:schemeClr val="dk1"/>
+    </dgm:txFillClrLst>
+    <dgm:txEffectClrLst/>
+  </dgm:styleLbl>
+  <dgm:styleLbl name="solidAlignAcc1">
+    <dgm:fillClrLst meth="repeat">
+      <a:schemeClr val="lt1"/>
+    </dgm:fillClrLst>
+    <dgm:linClrLst>
+      <a:schemeClr val="accent2"/>
+      <a:schemeClr val="accent3"/>
+    </dgm:linClrLst>
+    <dgm:effectClrLst/>
+    <dgm:txLinClrLst/>
+    <dgm:txFillClrLst meth="repeat">
+      <a:schemeClr val="dk1"/>
+    </dgm:txFillClrLst>
+    <dgm:txEffectClrLst/>
+  </dgm:styleLbl>
+  <dgm:styleLbl name="solidBgAcc1">
+    <dgm:fillClrLst meth="repeat">
+      <a:schemeClr val="lt1"/>
+    </dgm:fillClrLst>
+    <dgm:linClrLst>
+      <a:schemeClr val="accent2"/>
+      <a:schemeClr val="accent3"/>
+    </dgm:linClrLst>
+    <dgm:effectClrLst/>
+    <dgm:txLinClrLst/>
+    <dgm:txFillClrLst meth="repeat">
+      <a:schemeClr val="dk1"/>
+    </dgm:txFillClrLst>
+    <dgm:txEffectClrLst/>
+  </dgm:styleLbl>
+  <dgm:styleLbl name="fgAccFollowNode1">
+    <dgm:fillClrLst>
+      <a:schemeClr val="accent2">
+        <a:tint val="40000"/>
+        <a:alpha val="90000"/>
+      </a:schemeClr>
+      <a:schemeClr val="accent3">
+        <a:tint val="40000"/>
+        <a:alpha val="90000"/>
+      </a:schemeClr>
+    </dgm:fillClrLst>
+    <dgm:linClrLst>
+      <a:schemeClr val="accent2">
+        <a:tint val="40000"/>
+        <a:alpha val="90000"/>
+      </a:schemeClr>
+      <a:schemeClr val="accent3">
+        <a:tint val="40000"/>
+        <a:alpha val="90000"/>
+      </a:schemeClr>
+    </dgm:linClrLst>
+    <dgm:effectClrLst/>
+    <dgm:txLinClrLst/>
+    <dgm:txFillClrLst meth="repeat">
+      <a:schemeClr val="dk1"/>
+    </dgm:txFillClrLst>
+    <dgm:txEffectClrLst/>
+  </dgm:styleLbl>
+  <dgm:styleLbl name="alignAccFollowNode1">
+    <dgm:fillClrLst>
+      <a:schemeClr val="accent2">
+        <a:tint val="40000"/>
+        <a:alpha val="90000"/>
+      </a:schemeClr>
+      <a:schemeClr val="accent3">
+        <a:tint val="40000"/>
+        <a:alpha val="90000"/>
+      </a:schemeClr>
+    </dgm:fillClrLst>
+    <dgm:linClrLst>
+      <a:schemeClr val="accent2">
+        <a:tint val="40000"/>
+        <a:alpha val="90000"/>
+      </a:schemeClr>
+      <a:schemeClr val="accent3">
+        <a:tint val="40000"/>
+        <a:alpha val="90000"/>
+      </a:schemeClr>
+    </dgm:linClrLst>
+    <dgm:effectClrLst/>
+    <dgm:txLinClrLst/>
+    <dgm:txFillClrLst meth="repeat">
+      <a:schemeClr val="dk1"/>
+    </dgm:txFillClrLst>
+    <dgm:txEffectClrLst/>
+  </dgm:styleLbl>
+  <dgm:styleLbl name="bgAccFollowNode1">
+    <dgm:fillClrLst>
+      <a:schemeClr val="accent2">
+        <a:tint val="40000"/>
+        <a:alpha val="90000"/>
+      </a:schemeClr>
+      <a:schemeClr val="accent3">
+        <a:tint val="40000"/>
+        <a:alpha val="90000"/>
+      </a:schemeClr>
+    </dgm:fillClrLst>
+    <dgm:linClrLst>
+      <a:schemeClr val="accent2">
+        <a:tint val="40000"/>
+        <a:alpha val="90000"/>
+      </a:schemeClr>
+      <a:schemeClr val="accent3">
+        <a:tint val="40000"/>
+        <a:alpha val="90000"/>
+      </a:schemeClr>
+    </dgm:linClrLst>
+    <dgm:effectClrLst/>
+    <dgm:txLinClrLst/>
+    <dgm:txFillClrLst meth="repeat">
+      <a:schemeClr val="dk1"/>
+    </dgm:txFillClrLst>
+    <dgm:txEffectClrLst/>
+  </dgm:styleLbl>
+  <dgm:styleLbl name="fgAcc0">
+    <dgm:fillClrLst meth="repeat">
+      <a:schemeClr val="lt1">
+        <a:alpha val="90000"/>
+      </a:schemeClr>
+    </dgm:fillClrLst>
+    <dgm:linClrLst>
+      <a:schemeClr val="accent1"/>
+    </dgm:linClrLst>
+    <dgm:effectClrLst/>
+    <dgm:txLinClrLst/>
+    <dgm:txFillClrLst meth="repeat">
+      <a:schemeClr val="dk1"/>
+    </dgm:txFillClrLst>
+    <dgm:txEffectClrLst/>
+  </dgm:styleLbl>
+  <dgm:styleLbl name="fgAcc2">
+    <dgm:fillClrLst meth="repeat">
+      <a:schemeClr val="lt1">
+        <a:alpha val="90000"/>
+      </a:schemeClr>
+    </dgm:fillClrLst>
+    <dgm:linClrLst>
+      <a:schemeClr val="accent3"/>
+    </dgm:linClrLst>
+    <dgm:effectClrLst/>
+    <dgm:txLinClrLst/>
+    <dgm:txFillClrLst meth="repeat">
+      <a:schemeClr val="dk1"/>
+    </dgm:txFillClrLst>
+    <dgm:txEffectClrLst/>
+  </dgm:styleLbl>
+  <dgm:styleLbl name="fgAcc3">
+    <dgm:fillClrLst meth="repeat">
+      <a:schemeClr val="lt1">
+        <a:alpha val="90000"/>
+      </a:schemeClr>
+    </dgm:fillClrLst>
+    <dgm:linClrLst>
+      <a:schemeClr val="accent4"/>
+    </dgm:linClrLst>
+    <dgm:effectClrLst/>
+    <dgm:txLinClrLst/>
+    <dgm:txFillClrLst meth="repeat">
+      <a:schemeClr val="dk1"/>
+    </dgm:txFillClrLst>
+    <dgm:txEffectClrLst/>
+  </dgm:styleLbl>
+  <dgm:styleLbl name="fgAcc4">
+    <dgm:fillClrLst meth="repeat">
+      <a:schemeClr val="lt1">
+        <a:alpha val="90000"/>
+      </a:schemeClr>
+    </dgm:fillClrLst>
+    <dgm:linClrLst>
+      <a:schemeClr val="accent5"/>
+    </dgm:linClrLst>
+    <dgm:effectClrLst/>
+    <dgm:txLinClrLst/>
+    <dgm:txFillClrLst meth="repeat">
+      <a:schemeClr val="dk1"/>
+    </dgm:txFillClrLst>
+    <dgm:txEffectClrLst/>
+  </dgm:styleLbl>
+  <dgm:styleLbl name="bgShp">
+    <dgm:fillClrLst meth="repeat">
+      <a:schemeClr val="bg1">
+        <a:lumMod val="95000"/>
+      </a:schemeClr>
+    </dgm:fillClrLst>
+    <dgm:linClrLst meth="repeat">
+      <a:schemeClr val="dk1"/>
+    </dgm:linClrLst>
+    <dgm:effectClrLst/>
+    <dgm:txLinClrLst/>
+    <dgm:txFillClrLst meth="repeat">
+      <a:schemeClr val="dk1"/>
+    </dgm:txFillClrLst>
+    <dgm:txEffectClrLst/>
+  </dgm:styleLbl>
+  <dgm:styleLbl name="dkBgShp">
+    <dgm:fillClrLst meth="repeat">
+      <a:schemeClr val="accent2">
+        <a:shade val="90000"/>
+      </a:schemeClr>
+    </dgm:fillClrLst>
+    <dgm:linClrLst meth="repeat">
+      <a:schemeClr val="dk1"/>
+    </dgm:linClrLst>
+    <dgm:effectClrLst/>
+    <dgm:txLinClrLst/>
+    <dgm:txFillClrLst meth="repeat">
+      <a:schemeClr val="lt1"/>
+    </dgm:txFillClrLst>
+    <dgm:txEffectClrLst/>
+  </dgm:styleLbl>
+  <dgm:styleLbl name="trBgShp">
+    <dgm:fillClrLst meth="repeat">
+      <a:schemeClr val="accent2">
         <a:tint val="50000"/>
         <a:alpha val="40000"/>
       </a:schemeClr>
@@ -1468,6 +2256,480 @@
     <dgm:cxn modelId="{A83EF849-67B2-47D5-B625-2CF43F66C437}" type="presParOf" srcId="{7C49E9CC-5E51-432F-821F-F9CF587F83EA}" destId="{A9C5E51C-E3D6-45A1-B22B-83241522D2E7}" srcOrd="1" destOrd="0" presId="urn:microsoft.com/office/officeart/2018/2/layout/IconVerticalSolidList"/>
     <dgm:cxn modelId="{101C355B-9E0F-4192-8E1F-452FA2BDF640}" type="presParOf" srcId="{7C49E9CC-5E51-432F-821F-F9CF587F83EA}" destId="{9E0CD108-6BBC-490A-B1C8-BFC5E5780CF0}" srcOrd="2" destOrd="0" presId="urn:microsoft.com/office/officeart/2018/2/layout/IconVerticalSolidList"/>
     <dgm:cxn modelId="{365D6EAD-2354-4653-ACEF-A5DA2643F588}" type="presParOf" srcId="{7C49E9CC-5E51-432F-821F-F9CF587F83EA}" destId="{209FBC82-DA50-4AD2-96BF-F7C0505309BC}" srcOrd="3" destOrd="0" presId="urn:microsoft.com/office/officeart/2018/2/layout/IconVerticalSolidList"/>
+  </dgm:cxnLst>
+  <dgm:bg/>
+  <dgm:whole/>
+  <dgm:extLst>
+    <a:ext uri="http://schemas.microsoft.com/office/drawing/2008/diagram">
+      <dsp:dataModelExt xmlns:dsp="http://schemas.microsoft.com/office/drawing/2008/diagram" relId="rId6" minVer="http://schemas.openxmlformats.org/drawingml/2006/diagram"/>
+    </a:ext>
+  </dgm:extLst>
+</dgm:dataModel>
+</file>
+
+<file path=ppt/diagrams/data2.xml><?xml version="1.0" encoding="utf-8"?>
+<dgm:dataModel xmlns:dgm="http://schemas.openxmlformats.org/drawingml/2006/diagram" xmlns:a="http://schemas.openxmlformats.org/drawingml/2006/main">
+  <dgm:ptLst>
+    <dgm:pt modelId="{24A7BDE1-11FF-4BF5-8792-770C739BA73E}" type="doc">
+      <dgm:prSet loTypeId="urn:microsoft.com/office/officeart/2018/2/layout/IconLabelDescriptionList" loCatId="icon" qsTypeId="urn:microsoft.com/office/officeart/2005/8/quickstyle/simple1" qsCatId="simple" csTypeId="urn:microsoft.com/office/officeart/2018/5/colors/Iconchunking_neutralbg_colorful2" csCatId="colorful" phldr="1"/>
+      <dgm:spPr/>
+      <dgm:t>
+        <a:bodyPr/>
+        <a:lstStyle/>
+        <a:p>
+          <a:endParaRPr lang="en-US"/>
+        </a:p>
+      </dgm:t>
+    </dgm:pt>
+    <dgm:pt modelId="{7B9D7C28-4524-4B38-B0F1-4C94C2AFAFF4}">
+      <dgm:prSet/>
+      <dgm:spPr/>
+      <dgm:t>
+        <a:bodyPr/>
+        <a:lstStyle/>
+        <a:p>
+          <a:pPr>
+            <a:defRPr b="1"/>
+          </a:pPr>
+          <a:r>
+            <a:rPr lang="es-ES" dirty="0"/>
+            <a:t>Añadimos dependencias</a:t>
+          </a:r>
+          <a:endParaRPr lang="en-US" dirty="0"/>
+        </a:p>
+      </dgm:t>
+    </dgm:pt>
+    <dgm:pt modelId="{920D574D-5054-4174-B0A4-8E64420A5EB8}" type="parTrans" cxnId="{3FD2487A-1FF9-40D1-ACBB-AB099B651B76}">
+      <dgm:prSet/>
+      <dgm:spPr/>
+      <dgm:t>
+        <a:bodyPr/>
+        <a:lstStyle/>
+        <a:p>
+          <a:endParaRPr lang="en-US"/>
+        </a:p>
+      </dgm:t>
+    </dgm:pt>
+    <dgm:pt modelId="{A4684ED0-E50B-4D6C-9CEF-3F9218537FEB}" type="sibTrans" cxnId="{3FD2487A-1FF9-40D1-ACBB-AB099B651B76}">
+      <dgm:prSet/>
+      <dgm:spPr/>
+      <dgm:t>
+        <a:bodyPr/>
+        <a:lstStyle/>
+        <a:p>
+          <a:endParaRPr lang="en-US"/>
+        </a:p>
+      </dgm:t>
+    </dgm:pt>
+    <dgm:pt modelId="{D01898ED-38DE-4DCA-B3B7-24E791063624}">
+      <dgm:prSet/>
+      <dgm:spPr/>
+      <dgm:t>
+        <a:bodyPr/>
+        <a:lstStyle/>
+        <a:p>
+          <a:pPr>
+            <a:defRPr b="1"/>
+          </a:pPr>
+          <a:r>
+            <a:rPr lang="es-ES"/>
+            <a:t>pnpm add express socket.io cors better-sqlite3</a:t>
+          </a:r>
+          <a:endParaRPr lang="en-US"/>
+        </a:p>
+      </dgm:t>
+    </dgm:pt>
+    <dgm:pt modelId="{5DBD7006-6841-4995-AA86-50915EAE87C5}" type="parTrans" cxnId="{12A75B1C-C243-4F9F-B002-746D9B823DD8}">
+      <dgm:prSet/>
+      <dgm:spPr/>
+      <dgm:t>
+        <a:bodyPr/>
+        <a:lstStyle/>
+        <a:p>
+          <a:endParaRPr lang="en-US"/>
+        </a:p>
+      </dgm:t>
+    </dgm:pt>
+    <dgm:pt modelId="{90BA027A-53E8-4A11-8385-6E7958C7B5A0}" type="sibTrans" cxnId="{12A75B1C-C243-4F9F-B002-746D9B823DD8}">
+      <dgm:prSet/>
+      <dgm:spPr/>
+      <dgm:t>
+        <a:bodyPr/>
+        <a:lstStyle/>
+        <a:p>
+          <a:endParaRPr lang="en-US"/>
+        </a:p>
+      </dgm:t>
+    </dgm:pt>
+    <dgm:pt modelId="{2DA81ED5-E583-47B9-8126-DB8CF20530DB}">
+      <dgm:prSet/>
+      <dgm:spPr/>
+      <dgm:t>
+        <a:bodyPr/>
+        <a:lstStyle/>
+        <a:p>
+          <a:pPr>
+            <a:defRPr b="1"/>
+          </a:pPr>
+          <a:r>
+            <a:rPr lang="es-ES"/>
+            <a:t>Para ejecutar: </a:t>
+          </a:r>
+          <a:endParaRPr lang="en-US"/>
+        </a:p>
+      </dgm:t>
+    </dgm:pt>
+    <dgm:pt modelId="{B968712C-B0F7-4629-AEFF-D3EFA9D59E8B}" type="parTrans" cxnId="{180E86D5-3B0D-4E45-856A-5054E31F1A0C}">
+      <dgm:prSet/>
+      <dgm:spPr/>
+      <dgm:t>
+        <a:bodyPr/>
+        <a:lstStyle/>
+        <a:p>
+          <a:endParaRPr lang="en-US"/>
+        </a:p>
+      </dgm:t>
+    </dgm:pt>
+    <dgm:pt modelId="{B7326CE7-FF68-44B3-8E13-E9F9EA217C8C}" type="sibTrans" cxnId="{180E86D5-3B0D-4E45-856A-5054E31F1A0C}">
+      <dgm:prSet/>
+      <dgm:spPr/>
+      <dgm:t>
+        <a:bodyPr/>
+        <a:lstStyle/>
+        <a:p>
+          <a:endParaRPr lang="en-US"/>
+        </a:p>
+      </dgm:t>
+    </dgm:pt>
+    <dgm:pt modelId="{8E7C6B4A-E177-4E43-B47D-2968B4C0D2DB}">
+      <dgm:prSet/>
+      <dgm:spPr/>
+      <dgm:t>
+        <a:bodyPr/>
+        <a:lstStyle/>
+        <a:p>
+          <a:r>
+            <a:rPr lang="es-ES" dirty="0"/>
+            <a:t>- </a:t>
+          </a:r>
+          <a:r>
+            <a:rPr lang="es-ES" dirty="0" err="1"/>
+            <a:t>pnpm</a:t>
+          </a:r>
+          <a:r>
+            <a:rPr lang="es-ES" dirty="0"/>
+            <a:t> </a:t>
+          </a:r>
+          <a:r>
+            <a:rPr lang="es-ES" dirty="0" err="1"/>
+            <a:t>tsc</a:t>
+          </a:r>
+          <a:r>
+            <a:rPr lang="es-ES" dirty="0"/>
+            <a:t> (solo necesario para </a:t>
+          </a:r>
+          <a:r>
+            <a:rPr lang="es-ES" dirty="0" err="1"/>
+            <a:t>typescript</a:t>
+          </a:r>
+          <a:r>
+            <a:rPr lang="es-ES" dirty="0"/>
+            <a:t>)</a:t>
+          </a:r>
+          <a:endParaRPr lang="en-US" dirty="0"/>
+        </a:p>
+      </dgm:t>
+    </dgm:pt>
+    <dgm:pt modelId="{E2C78619-F4DD-4F30-9128-C764A878F231}" type="parTrans" cxnId="{19FEC26F-C9F7-4EFE-9E4E-764EB4932F33}">
+      <dgm:prSet/>
+      <dgm:spPr/>
+      <dgm:t>
+        <a:bodyPr/>
+        <a:lstStyle/>
+        <a:p>
+          <a:endParaRPr lang="en-US"/>
+        </a:p>
+      </dgm:t>
+    </dgm:pt>
+    <dgm:pt modelId="{26C8520D-31F1-464E-B9F1-215F71863A3B}" type="sibTrans" cxnId="{19FEC26F-C9F7-4EFE-9E4E-764EB4932F33}">
+      <dgm:prSet/>
+      <dgm:spPr/>
+      <dgm:t>
+        <a:bodyPr/>
+        <a:lstStyle/>
+        <a:p>
+          <a:endParaRPr lang="en-US"/>
+        </a:p>
+      </dgm:t>
+    </dgm:pt>
+    <dgm:pt modelId="{D246A1CE-C3AD-4D0B-BAB1-ADE9CC209B3E}">
+      <dgm:prSet/>
+      <dgm:spPr/>
+      <dgm:t>
+        <a:bodyPr/>
+        <a:lstStyle/>
+        <a:p>
+          <a:r>
+            <a:rPr lang="es-ES" dirty="0"/>
+            <a:t>- </a:t>
+          </a:r>
+          <a:r>
+            <a:rPr lang="es-ES" dirty="0" err="1"/>
+            <a:t>node</a:t>
+          </a:r>
+          <a:r>
+            <a:rPr lang="es-ES" dirty="0"/>
+            <a:t> ‘archivo generado </a:t>
+          </a:r>
+          <a:r>
+            <a:rPr lang="es-ES" dirty="0" err="1"/>
+            <a:t>js</a:t>
+          </a:r>
+          <a:r>
+            <a:rPr lang="es-ES" dirty="0"/>
+            <a:t>’</a:t>
+          </a:r>
+          <a:endParaRPr lang="en-US" dirty="0"/>
+        </a:p>
+      </dgm:t>
+    </dgm:pt>
+    <dgm:pt modelId="{306DAC75-CCA3-4FC7-B446-83EE04D0D9B2}" type="parTrans" cxnId="{03EE6F87-F779-4BFF-AA7F-21D21DEFA8C8}">
+      <dgm:prSet/>
+      <dgm:spPr/>
+      <dgm:t>
+        <a:bodyPr/>
+        <a:lstStyle/>
+        <a:p>
+          <a:endParaRPr lang="en-US"/>
+        </a:p>
+      </dgm:t>
+    </dgm:pt>
+    <dgm:pt modelId="{FBB1F542-A2A6-4D84-964D-76E2C83181ED}" type="sibTrans" cxnId="{03EE6F87-F779-4BFF-AA7F-21D21DEFA8C8}">
+      <dgm:prSet/>
+      <dgm:spPr/>
+      <dgm:t>
+        <a:bodyPr/>
+        <a:lstStyle/>
+        <a:p>
+          <a:endParaRPr lang="en-US"/>
+        </a:p>
+      </dgm:t>
+    </dgm:pt>
+    <dgm:pt modelId="{8410943D-9724-4B72-887B-648623C52D41}" type="pres">
+      <dgm:prSet presAssocID="{24A7BDE1-11FF-4BF5-8792-770C739BA73E}" presName="root" presStyleCnt="0">
+        <dgm:presLayoutVars>
+          <dgm:dir/>
+          <dgm:resizeHandles val="exact"/>
+        </dgm:presLayoutVars>
+      </dgm:prSet>
+      <dgm:spPr/>
+    </dgm:pt>
+    <dgm:pt modelId="{9D49B198-3BCD-46C3-A81A-07039D899E48}" type="pres">
+      <dgm:prSet presAssocID="{7B9D7C28-4524-4B38-B0F1-4C94C2AFAFF4}" presName="compNode" presStyleCnt="0"/>
+      <dgm:spPr/>
+    </dgm:pt>
+    <dgm:pt modelId="{0CCA8D25-59D1-4FBD-A7A3-E20488E62A93}" type="pres">
+      <dgm:prSet presAssocID="{7B9D7C28-4524-4B38-B0F1-4C94C2AFAFF4}" presName="iconRect" presStyleLbl="node1" presStyleIdx="0" presStyleCnt="3"/>
+      <dgm:spPr>
+        <a:blipFill>
+          <a:blip xmlns:r="http://schemas.openxmlformats.org/officeDocument/2006/relationships" r:embed="rId1">
+            <a:extLst>
+              <a:ext uri="{28A0092B-C50C-407E-A947-70E740481C1C}">
+                <a14:useLocalDpi xmlns:a14="http://schemas.microsoft.com/office/drawing/2010/main" val="0"/>
+              </a:ext>
+              <a:ext uri="{96DAC541-7B7A-43D3-8B79-37D633B846F1}">
+                <asvg:svgBlip xmlns:asvg="http://schemas.microsoft.com/office/drawing/2016/SVG/main" r:embed="rId2"/>
+              </a:ext>
+            </a:extLst>
+          </a:blip>
+          <a:stretch>
+            <a:fillRect/>
+          </a:stretch>
+        </a:blipFill>
+        <a:ln>
+          <a:noFill/>
+        </a:ln>
+      </dgm:spPr>
+      <dgm:extLst>
+        <a:ext uri="{E40237B7-FDA0-4F09-8148-C483321AD2D9}">
+          <dgm14:cNvPr xmlns:dgm14="http://schemas.microsoft.com/office/drawing/2010/diagram" id="0" name="" descr="Marca de verificación"/>
+        </a:ext>
+      </dgm:extLst>
+    </dgm:pt>
+    <dgm:pt modelId="{B8F09D3B-8AF2-4966-BB9D-EF1A571BA7AD}" type="pres">
+      <dgm:prSet presAssocID="{7B9D7C28-4524-4B38-B0F1-4C94C2AFAFF4}" presName="iconSpace" presStyleCnt="0"/>
+      <dgm:spPr/>
+    </dgm:pt>
+    <dgm:pt modelId="{74D1E687-14AA-4373-8928-DF010F88C329}" type="pres">
+      <dgm:prSet presAssocID="{7B9D7C28-4524-4B38-B0F1-4C94C2AFAFF4}" presName="parTx" presStyleLbl="revTx" presStyleIdx="0" presStyleCnt="6">
+        <dgm:presLayoutVars>
+          <dgm:chMax val="0"/>
+          <dgm:chPref val="0"/>
+        </dgm:presLayoutVars>
+      </dgm:prSet>
+      <dgm:spPr/>
+    </dgm:pt>
+    <dgm:pt modelId="{E01D72D6-D424-4CA1-8414-3C5349957AC9}" type="pres">
+      <dgm:prSet presAssocID="{7B9D7C28-4524-4B38-B0F1-4C94C2AFAFF4}" presName="txSpace" presStyleCnt="0"/>
+      <dgm:spPr/>
+    </dgm:pt>
+    <dgm:pt modelId="{02B40ACC-86D7-4699-948C-EFCA61053B71}" type="pres">
+      <dgm:prSet presAssocID="{7B9D7C28-4524-4B38-B0F1-4C94C2AFAFF4}" presName="desTx" presStyleLbl="revTx" presStyleIdx="1" presStyleCnt="6">
+        <dgm:presLayoutVars/>
+      </dgm:prSet>
+      <dgm:spPr/>
+    </dgm:pt>
+    <dgm:pt modelId="{B1F9DED7-1B46-4445-ADEF-3F4031ECB051}" type="pres">
+      <dgm:prSet presAssocID="{A4684ED0-E50B-4D6C-9CEF-3F9218537FEB}" presName="sibTrans" presStyleCnt="0"/>
+      <dgm:spPr/>
+    </dgm:pt>
+    <dgm:pt modelId="{36130F89-332C-4D75-93A5-310F508C7141}" type="pres">
+      <dgm:prSet presAssocID="{D01898ED-38DE-4DCA-B3B7-24E791063624}" presName="compNode" presStyleCnt="0"/>
+      <dgm:spPr/>
+    </dgm:pt>
+    <dgm:pt modelId="{A5779E7B-F3CD-4609-AA7D-9E6F05224959}" type="pres">
+      <dgm:prSet presAssocID="{D01898ED-38DE-4DCA-B3B7-24E791063624}" presName="iconRect" presStyleLbl="node1" presStyleIdx="1" presStyleCnt="3"/>
+      <dgm:spPr>
+        <a:blipFill>
+          <a:blip xmlns:r="http://schemas.openxmlformats.org/officeDocument/2006/relationships" r:embed="rId3">
+            <a:extLst>
+              <a:ext uri="{28A0092B-C50C-407E-A947-70E740481C1C}">
+                <a14:useLocalDpi xmlns:a14="http://schemas.microsoft.com/office/drawing/2010/main" val="0"/>
+              </a:ext>
+              <a:ext uri="{96DAC541-7B7A-43D3-8B79-37D633B846F1}">
+                <asvg:svgBlip xmlns:asvg="http://schemas.microsoft.com/office/drawing/2016/SVG/main" r:embed="rId4"/>
+              </a:ext>
+            </a:extLst>
+          </a:blip>
+          <a:stretch>
+            <a:fillRect/>
+          </a:stretch>
+        </a:blipFill>
+        <a:ln>
+          <a:noFill/>
+        </a:ln>
+      </dgm:spPr>
+      <dgm:extLst>
+        <a:ext uri="{E40237B7-FDA0-4F09-8148-C483321AD2D9}">
+          <dgm14:cNvPr xmlns:dgm14="http://schemas.microsoft.com/office/drawing/2010/diagram" id="0" name="" descr="Agregar"/>
+        </a:ext>
+      </dgm:extLst>
+    </dgm:pt>
+    <dgm:pt modelId="{11F5D2F5-1D3F-4436-BC72-B008812C8FAF}" type="pres">
+      <dgm:prSet presAssocID="{D01898ED-38DE-4DCA-B3B7-24E791063624}" presName="iconSpace" presStyleCnt="0"/>
+      <dgm:spPr/>
+    </dgm:pt>
+    <dgm:pt modelId="{56CCBCA5-CDE7-420D-98B0-6B977CDAC996}" type="pres">
+      <dgm:prSet presAssocID="{D01898ED-38DE-4DCA-B3B7-24E791063624}" presName="parTx" presStyleLbl="revTx" presStyleIdx="2" presStyleCnt="6">
+        <dgm:presLayoutVars>
+          <dgm:chMax val="0"/>
+          <dgm:chPref val="0"/>
+        </dgm:presLayoutVars>
+      </dgm:prSet>
+      <dgm:spPr/>
+    </dgm:pt>
+    <dgm:pt modelId="{2EB0516B-41E5-45D7-BA5E-4E1DD2E862FD}" type="pres">
+      <dgm:prSet presAssocID="{D01898ED-38DE-4DCA-B3B7-24E791063624}" presName="txSpace" presStyleCnt="0"/>
+      <dgm:spPr/>
+    </dgm:pt>
+    <dgm:pt modelId="{47FECFF7-9A49-40A7-A302-B400178566F9}" type="pres">
+      <dgm:prSet presAssocID="{D01898ED-38DE-4DCA-B3B7-24E791063624}" presName="desTx" presStyleLbl="revTx" presStyleIdx="3" presStyleCnt="6">
+        <dgm:presLayoutVars/>
+      </dgm:prSet>
+      <dgm:spPr/>
+    </dgm:pt>
+    <dgm:pt modelId="{CD5F7916-4607-42E0-A988-493C46C07BB4}" type="pres">
+      <dgm:prSet presAssocID="{90BA027A-53E8-4A11-8385-6E7958C7B5A0}" presName="sibTrans" presStyleCnt="0"/>
+      <dgm:spPr/>
+    </dgm:pt>
+    <dgm:pt modelId="{8EF51270-F1C5-463B-BF84-A9A7788F8B88}" type="pres">
+      <dgm:prSet presAssocID="{2DA81ED5-E583-47B9-8126-DB8CF20530DB}" presName="compNode" presStyleCnt="0"/>
+      <dgm:spPr/>
+    </dgm:pt>
+    <dgm:pt modelId="{DCE8B20D-8FBF-488E-B1F6-4D6AEBA5EAE6}" type="pres">
+      <dgm:prSet presAssocID="{2DA81ED5-E583-47B9-8126-DB8CF20530DB}" presName="iconRect" presStyleLbl="node1" presStyleIdx="2" presStyleCnt="3"/>
+      <dgm:spPr>
+        <a:blipFill>
+          <a:blip xmlns:r="http://schemas.openxmlformats.org/officeDocument/2006/relationships" r:embed="rId5">
+            <a:extLst>
+              <a:ext uri="{28A0092B-C50C-407E-A947-70E740481C1C}">
+                <a14:useLocalDpi xmlns:a14="http://schemas.microsoft.com/office/drawing/2010/main" val="0"/>
+              </a:ext>
+              <a:ext uri="{96DAC541-7B7A-43D3-8B79-37D633B846F1}">
+                <asvg:svgBlip xmlns:asvg="http://schemas.microsoft.com/office/drawing/2016/SVG/main" r:embed="rId6"/>
+              </a:ext>
+            </a:extLst>
+          </a:blip>
+          <a:stretch>
+            <a:fillRect/>
+          </a:stretch>
+        </a:blipFill>
+        <a:ln>
+          <a:noFill/>
+        </a:ln>
+      </dgm:spPr>
+      <dgm:extLst>
+        <a:ext uri="{E40237B7-FDA0-4F09-8148-C483321AD2D9}">
+          <dgm14:cNvPr xmlns:dgm14="http://schemas.microsoft.com/office/drawing/2010/diagram" id="0" name="" descr="Disco"/>
+        </a:ext>
+      </dgm:extLst>
+    </dgm:pt>
+    <dgm:pt modelId="{F015D380-F7AC-4B0E-9C68-0A437A076FB7}" type="pres">
+      <dgm:prSet presAssocID="{2DA81ED5-E583-47B9-8126-DB8CF20530DB}" presName="iconSpace" presStyleCnt="0"/>
+      <dgm:spPr/>
+    </dgm:pt>
+    <dgm:pt modelId="{3DB72813-20E5-41CF-8E61-6E13B16D38FD}" type="pres">
+      <dgm:prSet presAssocID="{2DA81ED5-E583-47B9-8126-DB8CF20530DB}" presName="parTx" presStyleLbl="revTx" presStyleIdx="4" presStyleCnt="6">
+        <dgm:presLayoutVars>
+          <dgm:chMax val="0"/>
+          <dgm:chPref val="0"/>
+        </dgm:presLayoutVars>
+      </dgm:prSet>
+      <dgm:spPr/>
+    </dgm:pt>
+    <dgm:pt modelId="{F827E321-CCE9-4E0A-AD46-EF1ADC0E98E6}" type="pres">
+      <dgm:prSet presAssocID="{2DA81ED5-E583-47B9-8126-DB8CF20530DB}" presName="txSpace" presStyleCnt="0"/>
+      <dgm:spPr/>
+    </dgm:pt>
+    <dgm:pt modelId="{67AB7C47-6060-4224-969B-FAA4BF172D42}" type="pres">
+      <dgm:prSet presAssocID="{2DA81ED5-E583-47B9-8126-DB8CF20530DB}" presName="desTx" presStyleLbl="revTx" presStyleIdx="5" presStyleCnt="6" custScaleX="155122">
+        <dgm:presLayoutVars/>
+      </dgm:prSet>
+      <dgm:spPr/>
+    </dgm:pt>
+  </dgm:ptLst>
+  <dgm:cxnLst>
+    <dgm:cxn modelId="{12A75B1C-C243-4F9F-B002-746D9B823DD8}" srcId="{24A7BDE1-11FF-4BF5-8792-770C739BA73E}" destId="{D01898ED-38DE-4DCA-B3B7-24E791063624}" srcOrd="1" destOrd="0" parTransId="{5DBD7006-6841-4995-AA86-50915EAE87C5}" sibTransId="{90BA027A-53E8-4A11-8385-6E7958C7B5A0}"/>
+    <dgm:cxn modelId="{19FEC26F-C9F7-4EFE-9E4E-764EB4932F33}" srcId="{2DA81ED5-E583-47B9-8126-DB8CF20530DB}" destId="{8E7C6B4A-E177-4E43-B47D-2968B4C0D2DB}" srcOrd="0" destOrd="0" parTransId="{E2C78619-F4DD-4F30-9128-C764A878F231}" sibTransId="{26C8520D-31F1-464E-B9F1-215F71863A3B}"/>
+    <dgm:cxn modelId="{10C52257-9CA5-4B44-BD67-25F07F2FD20E}" type="presOf" srcId="{7B9D7C28-4524-4B38-B0F1-4C94C2AFAFF4}" destId="{74D1E687-14AA-4373-8928-DF010F88C329}" srcOrd="0" destOrd="0" presId="urn:microsoft.com/office/officeart/2018/2/layout/IconLabelDescriptionList"/>
+    <dgm:cxn modelId="{17B39578-445C-43C5-9731-1560BE626E83}" type="presOf" srcId="{2DA81ED5-E583-47B9-8126-DB8CF20530DB}" destId="{3DB72813-20E5-41CF-8E61-6E13B16D38FD}" srcOrd="0" destOrd="0" presId="urn:microsoft.com/office/officeart/2018/2/layout/IconLabelDescriptionList"/>
+    <dgm:cxn modelId="{D985C279-DC0C-4AA9-B275-59B1C1517081}" type="presOf" srcId="{24A7BDE1-11FF-4BF5-8792-770C739BA73E}" destId="{8410943D-9724-4B72-887B-648623C52D41}" srcOrd="0" destOrd="0" presId="urn:microsoft.com/office/officeart/2018/2/layout/IconLabelDescriptionList"/>
+    <dgm:cxn modelId="{3FD2487A-1FF9-40D1-ACBB-AB099B651B76}" srcId="{24A7BDE1-11FF-4BF5-8792-770C739BA73E}" destId="{7B9D7C28-4524-4B38-B0F1-4C94C2AFAFF4}" srcOrd="0" destOrd="0" parTransId="{920D574D-5054-4174-B0A4-8E64420A5EB8}" sibTransId="{A4684ED0-E50B-4D6C-9CEF-3F9218537FEB}"/>
+    <dgm:cxn modelId="{03EE6F87-F779-4BFF-AA7F-21D21DEFA8C8}" srcId="{2DA81ED5-E583-47B9-8126-DB8CF20530DB}" destId="{D246A1CE-C3AD-4D0B-BAB1-ADE9CC209B3E}" srcOrd="1" destOrd="0" parTransId="{306DAC75-CCA3-4FC7-B446-83EE04D0D9B2}" sibTransId="{FBB1F542-A2A6-4D84-964D-76E2C83181ED}"/>
+    <dgm:cxn modelId="{8CBDD599-5810-436B-80AC-0B680CEE1DE4}" type="presOf" srcId="{D246A1CE-C3AD-4D0B-BAB1-ADE9CC209B3E}" destId="{67AB7C47-6060-4224-969B-FAA4BF172D42}" srcOrd="0" destOrd="1" presId="urn:microsoft.com/office/officeart/2018/2/layout/IconLabelDescriptionList"/>
+    <dgm:cxn modelId="{4D6A9D9A-5088-4AAC-A2D7-A44AB1D26CDE}" type="presOf" srcId="{8E7C6B4A-E177-4E43-B47D-2968B4C0D2DB}" destId="{67AB7C47-6060-4224-969B-FAA4BF172D42}" srcOrd="0" destOrd="0" presId="urn:microsoft.com/office/officeart/2018/2/layout/IconLabelDescriptionList"/>
+    <dgm:cxn modelId="{180E86D5-3B0D-4E45-856A-5054E31F1A0C}" srcId="{24A7BDE1-11FF-4BF5-8792-770C739BA73E}" destId="{2DA81ED5-E583-47B9-8126-DB8CF20530DB}" srcOrd="2" destOrd="0" parTransId="{B968712C-B0F7-4629-AEFF-D3EFA9D59E8B}" sibTransId="{B7326CE7-FF68-44B3-8E13-E9F9EA217C8C}"/>
+    <dgm:cxn modelId="{7F888ADD-455A-4638-876A-39134E563EE9}" type="presOf" srcId="{D01898ED-38DE-4DCA-B3B7-24E791063624}" destId="{56CCBCA5-CDE7-420D-98B0-6B977CDAC996}" srcOrd="0" destOrd="0" presId="urn:microsoft.com/office/officeart/2018/2/layout/IconLabelDescriptionList"/>
+    <dgm:cxn modelId="{CD68486C-2DBC-4B35-AD47-9A0ABAB7A1EF}" type="presParOf" srcId="{8410943D-9724-4B72-887B-648623C52D41}" destId="{9D49B198-3BCD-46C3-A81A-07039D899E48}" srcOrd="0" destOrd="0" presId="urn:microsoft.com/office/officeart/2018/2/layout/IconLabelDescriptionList"/>
+    <dgm:cxn modelId="{D3B8E137-2571-4AEC-98EF-0950D52E4B59}" type="presParOf" srcId="{9D49B198-3BCD-46C3-A81A-07039D899E48}" destId="{0CCA8D25-59D1-4FBD-A7A3-E20488E62A93}" srcOrd="0" destOrd="0" presId="urn:microsoft.com/office/officeart/2018/2/layout/IconLabelDescriptionList"/>
+    <dgm:cxn modelId="{7461282A-7AF7-4A77-9A11-860CCA7A2D1F}" type="presParOf" srcId="{9D49B198-3BCD-46C3-A81A-07039D899E48}" destId="{B8F09D3B-8AF2-4966-BB9D-EF1A571BA7AD}" srcOrd="1" destOrd="0" presId="urn:microsoft.com/office/officeart/2018/2/layout/IconLabelDescriptionList"/>
+    <dgm:cxn modelId="{3D104659-135A-4EE1-8ECB-B20454962C2B}" type="presParOf" srcId="{9D49B198-3BCD-46C3-A81A-07039D899E48}" destId="{74D1E687-14AA-4373-8928-DF010F88C329}" srcOrd="2" destOrd="0" presId="urn:microsoft.com/office/officeart/2018/2/layout/IconLabelDescriptionList"/>
+    <dgm:cxn modelId="{46FDA2C8-0EE4-46EE-BA4A-7BA78F856206}" type="presParOf" srcId="{9D49B198-3BCD-46C3-A81A-07039D899E48}" destId="{E01D72D6-D424-4CA1-8414-3C5349957AC9}" srcOrd="3" destOrd="0" presId="urn:microsoft.com/office/officeart/2018/2/layout/IconLabelDescriptionList"/>
+    <dgm:cxn modelId="{9B9649C1-4E61-4753-9697-00EF6F3345E6}" type="presParOf" srcId="{9D49B198-3BCD-46C3-A81A-07039D899E48}" destId="{02B40ACC-86D7-4699-948C-EFCA61053B71}" srcOrd="4" destOrd="0" presId="urn:microsoft.com/office/officeart/2018/2/layout/IconLabelDescriptionList"/>
+    <dgm:cxn modelId="{9C75B509-D966-4E9B-9581-BEE326A8EE91}" type="presParOf" srcId="{8410943D-9724-4B72-887B-648623C52D41}" destId="{B1F9DED7-1B46-4445-ADEF-3F4031ECB051}" srcOrd="1" destOrd="0" presId="urn:microsoft.com/office/officeart/2018/2/layout/IconLabelDescriptionList"/>
+    <dgm:cxn modelId="{69D6EB9E-EAED-40F6-BE29-67127375435B}" type="presParOf" srcId="{8410943D-9724-4B72-887B-648623C52D41}" destId="{36130F89-332C-4D75-93A5-310F508C7141}" srcOrd="2" destOrd="0" presId="urn:microsoft.com/office/officeart/2018/2/layout/IconLabelDescriptionList"/>
+    <dgm:cxn modelId="{76F0092B-18E6-42CD-95E5-68CF27F507BA}" type="presParOf" srcId="{36130F89-332C-4D75-93A5-310F508C7141}" destId="{A5779E7B-F3CD-4609-AA7D-9E6F05224959}" srcOrd="0" destOrd="0" presId="urn:microsoft.com/office/officeart/2018/2/layout/IconLabelDescriptionList"/>
+    <dgm:cxn modelId="{49F41FA5-8C22-4B73-B9A7-6710B4D4198A}" type="presParOf" srcId="{36130F89-332C-4D75-93A5-310F508C7141}" destId="{11F5D2F5-1D3F-4436-BC72-B008812C8FAF}" srcOrd="1" destOrd="0" presId="urn:microsoft.com/office/officeart/2018/2/layout/IconLabelDescriptionList"/>
+    <dgm:cxn modelId="{876FFB1C-BB83-4BBA-97E5-866121F46E46}" type="presParOf" srcId="{36130F89-332C-4D75-93A5-310F508C7141}" destId="{56CCBCA5-CDE7-420D-98B0-6B977CDAC996}" srcOrd="2" destOrd="0" presId="urn:microsoft.com/office/officeart/2018/2/layout/IconLabelDescriptionList"/>
+    <dgm:cxn modelId="{B9D9DD7D-C24E-4128-AC85-CBD216058B61}" type="presParOf" srcId="{36130F89-332C-4D75-93A5-310F508C7141}" destId="{2EB0516B-41E5-45D7-BA5E-4E1DD2E862FD}" srcOrd="3" destOrd="0" presId="urn:microsoft.com/office/officeart/2018/2/layout/IconLabelDescriptionList"/>
+    <dgm:cxn modelId="{3FB529F0-07C0-4E8E-8C3A-3F417EC37A07}" type="presParOf" srcId="{36130F89-332C-4D75-93A5-310F508C7141}" destId="{47FECFF7-9A49-40A7-A302-B400178566F9}" srcOrd="4" destOrd="0" presId="urn:microsoft.com/office/officeart/2018/2/layout/IconLabelDescriptionList"/>
+    <dgm:cxn modelId="{78D489EF-39ED-48BF-8AEB-6A2CC1BAD4B6}" type="presParOf" srcId="{8410943D-9724-4B72-887B-648623C52D41}" destId="{CD5F7916-4607-42E0-A988-493C46C07BB4}" srcOrd="3" destOrd="0" presId="urn:microsoft.com/office/officeart/2018/2/layout/IconLabelDescriptionList"/>
+    <dgm:cxn modelId="{5F60C799-F59A-4A0C-B653-A6FAB13268B9}" type="presParOf" srcId="{8410943D-9724-4B72-887B-648623C52D41}" destId="{8EF51270-F1C5-463B-BF84-A9A7788F8B88}" srcOrd="4" destOrd="0" presId="urn:microsoft.com/office/officeart/2018/2/layout/IconLabelDescriptionList"/>
+    <dgm:cxn modelId="{6152DB85-F218-42F8-9FFF-7995AD493193}" type="presParOf" srcId="{8EF51270-F1C5-463B-BF84-A9A7788F8B88}" destId="{DCE8B20D-8FBF-488E-B1F6-4D6AEBA5EAE6}" srcOrd="0" destOrd="0" presId="urn:microsoft.com/office/officeart/2018/2/layout/IconLabelDescriptionList"/>
+    <dgm:cxn modelId="{82210C40-7289-42A4-93BE-1454E341083B}" type="presParOf" srcId="{8EF51270-F1C5-463B-BF84-A9A7788F8B88}" destId="{F015D380-F7AC-4B0E-9C68-0A437A076FB7}" srcOrd="1" destOrd="0" presId="urn:microsoft.com/office/officeart/2018/2/layout/IconLabelDescriptionList"/>
+    <dgm:cxn modelId="{454D9E6E-AE56-4FAD-BE69-9EF175E1EA61}" type="presParOf" srcId="{8EF51270-F1C5-463B-BF84-A9A7788F8B88}" destId="{3DB72813-20E5-41CF-8E61-6E13B16D38FD}" srcOrd="2" destOrd="0" presId="urn:microsoft.com/office/officeart/2018/2/layout/IconLabelDescriptionList"/>
+    <dgm:cxn modelId="{95125FD3-CF65-4C33-BD56-FAAD2F19FCC5}" type="presParOf" srcId="{8EF51270-F1C5-463B-BF84-A9A7788F8B88}" destId="{F827E321-CCE9-4E0A-AD46-EF1ADC0E98E6}" srcOrd="3" destOrd="0" presId="urn:microsoft.com/office/officeart/2018/2/layout/IconLabelDescriptionList"/>
+    <dgm:cxn modelId="{27A1D090-2BD6-4378-9EAB-98934B3D0722}" type="presParOf" srcId="{8EF51270-F1C5-463B-BF84-A9A7788F8B88}" destId="{67AB7C47-6060-4224-969B-FAA4BF172D42}" srcOrd="4" destOrd="0" presId="urn:microsoft.com/office/officeart/2018/2/layout/IconLabelDescriptionList"/>
   </dgm:cxnLst>
   <dgm:bg/>
   <dgm:whole/>
@@ -2115,6 +3377,535 @@
 </dsp:drawing>
 </file>
 
+<file path=ppt/diagrams/drawing2.xml><?xml version="1.0" encoding="utf-8"?>
+<dsp:drawing xmlns:dgm="http://schemas.openxmlformats.org/drawingml/2006/diagram" xmlns:dsp="http://schemas.microsoft.com/office/drawing/2008/diagram" xmlns:a="http://schemas.openxmlformats.org/drawingml/2006/main">
+  <dsp:spTree>
+    <dsp:nvGrpSpPr>
+      <dsp:cNvPr id="0" name=""/>
+      <dsp:cNvGrpSpPr/>
+    </dsp:nvGrpSpPr>
+    <dsp:grpSpPr/>
+    <dsp:sp modelId="{0CCA8D25-59D1-4FBD-A7A3-E20488E62A93}">
+      <dsp:nvSpPr>
+        <dsp:cNvPr id="0" name=""/>
+        <dsp:cNvSpPr/>
+      </dsp:nvSpPr>
+      <dsp:spPr>
+        <a:xfrm>
+          <a:off x="3251" y="1125707"/>
+          <a:ext cx="862312" cy="862312"/>
+        </a:xfrm>
+        <a:prstGeom prst="rect">
+          <a:avLst/>
+        </a:prstGeom>
+        <a:blipFill>
+          <a:blip xmlns:r="http://schemas.openxmlformats.org/officeDocument/2006/relationships" r:embed="rId1">
+            <a:extLst>
+              <a:ext uri="{28A0092B-C50C-407E-A947-70E740481C1C}">
+                <a14:useLocalDpi xmlns:a14="http://schemas.microsoft.com/office/drawing/2010/main" val="0"/>
+              </a:ext>
+              <a:ext uri="{96DAC541-7B7A-43D3-8B79-37D633B846F1}">
+                <asvg:svgBlip xmlns:asvg="http://schemas.microsoft.com/office/drawing/2016/SVG/main" r:embed="rId2"/>
+              </a:ext>
+            </a:extLst>
+          </a:blip>
+          <a:stretch>
+            <a:fillRect/>
+          </a:stretch>
+        </a:blipFill>
+        <a:ln w="19050" cap="rnd" cmpd="sng" algn="ctr">
+          <a:noFill/>
+          <a:prstDash val="solid"/>
+        </a:ln>
+        <a:effectLst/>
+      </dsp:spPr>
+      <dsp:style>
+        <a:lnRef idx="2">
+          <a:scrgbClr r="0" g="0" b="0"/>
+        </a:lnRef>
+        <a:fillRef idx="1">
+          <a:scrgbClr r="0" g="0" b="0"/>
+        </a:fillRef>
+        <a:effectRef idx="0">
+          <a:scrgbClr r="0" g="0" b="0"/>
+        </a:effectRef>
+        <a:fontRef idx="minor">
+          <a:schemeClr val="lt1"/>
+        </a:fontRef>
+      </dsp:style>
+    </dsp:sp>
+    <dsp:sp modelId="{74D1E687-14AA-4373-8928-DF010F88C329}">
+      <dsp:nvSpPr>
+        <dsp:cNvPr id="0" name=""/>
+        <dsp:cNvSpPr/>
+      </dsp:nvSpPr>
+      <dsp:spPr>
+        <a:xfrm>
+          <a:off x="3251" y="2067228"/>
+          <a:ext cx="2463750" cy="381111"/>
+        </a:xfrm>
+        <a:prstGeom prst="rect">
+          <a:avLst/>
+        </a:prstGeom>
+        <a:noFill/>
+        <a:ln>
+          <a:noFill/>
+        </a:ln>
+        <a:effectLst/>
+      </dsp:spPr>
+      <dsp:style>
+        <a:lnRef idx="0">
+          <a:scrgbClr r="0" g="0" b="0"/>
+        </a:lnRef>
+        <a:fillRef idx="0">
+          <a:scrgbClr r="0" g="0" b="0"/>
+        </a:fillRef>
+        <a:effectRef idx="0">
+          <a:scrgbClr r="0" g="0" b="0"/>
+        </a:effectRef>
+        <a:fontRef idx="minor"/>
+      </dsp:style>
+      <dsp:txBody>
+        <a:bodyPr spcFirstLastPara="0" vert="horz" wrap="square" lIns="0" tIns="0" rIns="0" bIns="0" numCol="1" spcCol="1270" anchor="t" anchorCtr="0">
+          <a:noAutofit/>
+        </a:bodyPr>
+        <a:lstStyle/>
+        <a:p>
+          <a:pPr marL="0" lvl="0" indent="0" algn="l" defTabSz="622300">
+            <a:lnSpc>
+              <a:spcPct val="90000"/>
+            </a:lnSpc>
+            <a:spcBef>
+              <a:spcPct val="0"/>
+            </a:spcBef>
+            <a:spcAft>
+              <a:spcPct val="35000"/>
+            </a:spcAft>
+            <a:buNone/>
+            <a:defRPr b="1"/>
+          </a:pPr>
+          <a:r>
+            <a:rPr lang="es-ES" sz="1400" kern="1200" dirty="0"/>
+            <a:t>Añadimos dependencias</a:t>
+          </a:r>
+          <a:endParaRPr lang="en-US" sz="1400" kern="1200" dirty="0"/>
+        </a:p>
+      </dsp:txBody>
+      <dsp:txXfrm>
+        <a:off x="3251" y="2067228"/>
+        <a:ext cx="2463750" cy="381111"/>
+      </dsp:txXfrm>
+    </dsp:sp>
+    <dsp:sp modelId="{02B40ACC-86D7-4699-948C-EFCA61053B71}">
+      <dsp:nvSpPr>
+        <dsp:cNvPr id="0" name=""/>
+        <dsp:cNvSpPr/>
+      </dsp:nvSpPr>
+      <dsp:spPr>
+        <a:xfrm>
+          <a:off x="3251" y="2485181"/>
+          <a:ext cx="2463750" cy="482592"/>
+        </a:xfrm>
+        <a:prstGeom prst="rect">
+          <a:avLst/>
+        </a:prstGeom>
+        <a:noFill/>
+        <a:ln>
+          <a:noFill/>
+        </a:ln>
+        <a:effectLst/>
+      </dsp:spPr>
+      <dsp:style>
+        <a:lnRef idx="0">
+          <a:scrgbClr r="0" g="0" b="0"/>
+        </a:lnRef>
+        <a:fillRef idx="0">
+          <a:scrgbClr r="0" g="0" b="0"/>
+        </a:fillRef>
+        <a:effectRef idx="0">
+          <a:scrgbClr r="0" g="0" b="0"/>
+        </a:effectRef>
+        <a:fontRef idx="minor"/>
+      </dsp:style>
+    </dsp:sp>
+    <dsp:sp modelId="{A5779E7B-F3CD-4609-AA7D-9E6F05224959}">
+      <dsp:nvSpPr>
+        <dsp:cNvPr id="0" name=""/>
+        <dsp:cNvSpPr/>
+      </dsp:nvSpPr>
+      <dsp:spPr>
+        <a:xfrm>
+          <a:off x="2898157" y="1125707"/>
+          <a:ext cx="862312" cy="862312"/>
+        </a:xfrm>
+        <a:prstGeom prst="rect">
+          <a:avLst/>
+        </a:prstGeom>
+        <a:blipFill>
+          <a:blip xmlns:r="http://schemas.openxmlformats.org/officeDocument/2006/relationships" r:embed="rId3">
+            <a:extLst>
+              <a:ext uri="{28A0092B-C50C-407E-A947-70E740481C1C}">
+                <a14:useLocalDpi xmlns:a14="http://schemas.microsoft.com/office/drawing/2010/main" val="0"/>
+              </a:ext>
+              <a:ext uri="{96DAC541-7B7A-43D3-8B79-37D633B846F1}">
+                <asvg:svgBlip xmlns:asvg="http://schemas.microsoft.com/office/drawing/2016/SVG/main" r:embed="rId4"/>
+              </a:ext>
+            </a:extLst>
+          </a:blip>
+          <a:stretch>
+            <a:fillRect/>
+          </a:stretch>
+        </a:blipFill>
+        <a:ln w="19050" cap="rnd" cmpd="sng" algn="ctr">
+          <a:noFill/>
+          <a:prstDash val="solid"/>
+        </a:ln>
+        <a:effectLst/>
+      </dsp:spPr>
+      <dsp:style>
+        <a:lnRef idx="2">
+          <a:scrgbClr r="0" g="0" b="0"/>
+        </a:lnRef>
+        <a:fillRef idx="1">
+          <a:scrgbClr r="0" g="0" b="0"/>
+        </a:fillRef>
+        <a:effectRef idx="0">
+          <a:scrgbClr r="0" g="0" b="0"/>
+        </a:effectRef>
+        <a:fontRef idx="minor">
+          <a:schemeClr val="lt1"/>
+        </a:fontRef>
+      </dsp:style>
+    </dsp:sp>
+    <dsp:sp modelId="{56CCBCA5-CDE7-420D-98B0-6B977CDAC996}">
+      <dsp:nvSpPr>
+        <dsp:cNvPr id="0" name=""/>
+        <dsp:cNvSpPr/>
+      </dsp:nvSpPr>
+      <dsp:spPr>
+        <a:xfrm>
+          <a:off x="2898157" y="2067228"/>
+          <a:ext cx="2463750" cy="381111"/>
+        </a:xfrm>
+        <a:prstGeom prst="rect">
+          <a:avLst/>
+        </a:prstGeom>
+        <a:noFill/>
+        <a:ln>
+          <a:noFill/>
+        </a:ln>
+        <a:effectLst/>
+      </dsp:spPr>
+      <dsp:style>
+        <a:lnRef idx="0">
+          <a:scrgbClr r="0" g="0" b="0"/>
+        </a:lnRef>
+        <a:fillRef idx="0">
+          <a:scrgbClr r="0" g="0" b="0"/>
+        </a:fillRef>
+        <a:effectRef idx="0">
+          <a:scrgbClr r="0" g="0" b="0"/>
+        </a:effectRef>
+        <a:fontRef idx="minor"/>
+      </dsp:style>
+      <dsp:txBody>
+        <a:bodyPr spcFirstLastPara="0" vert="horz" wrap="square" lIns="0" tIns="0" rIns="0" bIns="0" numCol="1" spcCol="1270" anchor="t" anchorCtr="0">
+          <a:noAutofit/>
+        </a:bodyPr>
+        <a:lstStyle/>
+        <a:p>
+          <a:pPr marL="0" lvl="0" indent="0" algn="l" defTabSz="622300">
+            <a:lnSpc>
+              <a:spcPct val="90000"/>
+            </a:lnSpc>
+            <a:spcBef>
+              <a:spcPct val="0"/>
+            </a:spcBef>
+            <a:spcAft>
+              <a:spcPct val="35000"/>
+            </a:spcAft>
+            <a:buNone/>
+            <a:defRPr b="1"/>
+          </a:pPr>
+          <a:r>
+            <a:rPr lang="es-ES" sz="1400" kern="1200"/>
+            <a:t>pnpm add express socket.io cors better-sqlite3</a:t>
+          </a:r>
+          <a:endParaRPr lang="en-US" sz="1400" kern="1200"/>
+        </a:p>
+      </dsp:txBody>
+      <dsp:txXfrm>
+        <a:off x="2898157" y="2067228"/>
+        <a:ext cx="2463750" cy="381111"/>
+      </dsp:txXfrm>
+    </dsp:sp>
+    <dsp:sp modelId="{47FECFF7-9A49-40A7-A302-B400178566F9}">
+      <dsp:nvSpPr>
+        <dsp:cNvPr id="0" name=""/>
+        <dsp:cNvSpPr/>
+      </dsp:nvSpPr>
+      <dsp:spPr>
+        <a:xfrm>
+          <a:off x="2898157" y="2485181"/>
+          <a:ext cx="2463750" cy="482592"/>
+        </a:xfrm>
+        <a:prstGeom prst="rect">
+          <a:avLst/>
+        </a:prstGeom>
+        <a:noFill/>
+        <a:ln>
+          <a:noFill/>
+        </a:ln>
+        <a:effectLst/>
+      </dsp:spPr>
+      <dsp:style>
+        <a:lnRef idx="0">
+          <a:scrgbClr r="0" g="0" b="0"/>
+        </a:lnRef>
+        <a:fillRef idx="0">
+          <a:scrgbClr r="0" g="0" b="0"/>
+        </a:fillRef>
+        <a:effectRef idx="0">
+          <a:scrgbClr r="0" g="0" b="0"/>
+        </a:effectRef>
+        <a:fontRef idx="minor"/>
+      </dsp:style>
+    </dsp:sp>
+    <dsp:sp modelId="{DCE8B20D-8FBF-488E-B1F6-4D6AEBA5EAE6}">
+      <dsp:nvSpPr>
+        <dsp:cNvPr id="0" name=""/>
+        <dsp:cNvSpPr/>
+      </dsp:nvSpPr>
+      <dsp:spPr>
+        <a:xfrm>
+          <a:off x="6472097" y="1118925"/>
+          <a:ext cx="862312" cy="862312"/>
+        </a:xfrm>
+        <a:prstGeom prst="rect">
+          <a:avLst/>
+        </a:prstGeom>
+        <a:blipFill>
+          <a:blip xmlns:r="http://schemas.openxmlformats.org/officeDocument/2006/relationships" r:embed="rId5">
+            <a:extLst>
+              <a:ext uri="{28A0092B-C50C-407E-A947-70E740481C1C}">
+                <a14:useLocalDpi xmlns:a14="http://schemas.microsoft.com/office/drawing/2010/main" val="0"/>
+              </a:ext>
+              <a:ext uri="{96DAC541-7B7A-43D3-8B79-37D633B846F1}">
+                <asvg:svgBlip xmlns:asvg="http://schemas.microsoft.com/office/drawing/2016/SVG/main" r:embed="rId6"/>
+              </a:ext>
+            </a:extLst>
+          </a:blip>
+          <a:stretch>
+            <a:fillRect/>
+          </a:stretch>
+        </a:blipFill>
+        <a:ln w="19050" cap="rnd" cmpd="sng" algn="ctr">
+          <a:noFill/>
+          <a:prstDash val="solid"/>
+        </a:ln>
+        <a:effectLst/>
+      </dsp:spPr>
+      <dsp:style>
+        <a:lnRef idx="2">
+          <a:scrgbClr r="0" g="0" b="0"/>
+        </a:lnRef>
+        <a:fillRef idx="1">
+          <a:scrgbClr r="0" g="0" b="0"/>
+        </a:fillRef>
+        <a:effectRef idx="0">
+          <a:scrgbClr r="0" g="0" b="0"/>
+        </a:effectRef>
+        <a:fontRef idx="minor">
+          <a:schemeClr val="lt1"/>
+        </a:fontRef>
+      </dsp:style>
+    </dsp:sp>
+    <dsp:sp modelId="{3DB72813-20E5-41CF-8E61-6E13B16D38FD}">
+      <dsp:nvSpPr>
+        <dsp:cNvPr id="0" name=""/>
+        <dsp:cNvSpPr/>
+      </dsp:nvSpPr>
+      <dsp:spPr>
+        <a:xfrm>
+          <a:off x="6472097" y="2060447"/>
+          <a:ext cx="2463750" cy="381111"/>
+        </a:xfrm>
+        <a:prstGeom prst="rect">
+          <a:avLst/>
+        </a:prstGeom>
+        <a:noFill/>
+        <a:ln>
+          <a:noFill/>
+        </a:ln>
+        <a:effectLst/>
+      </dsp:spPr>
+      <dsp:style>
+        <a:lnRef idx="0">
+          <a:scrgbClr r="0" g="0" b="0"/>
+        </a:lnRef>
+        <a:fillRef idx="0">
+          <a:scrgbClr r="0" g="0" b="0"/>
+        </a:fillRef>
+        <a:effectRef idx="0">
+          <a:scrgbClr r="0" g="0" b="0"/>
+        </a:effectRef>
+        <a:fontRef idx="minor"/>
+      </dsp:style>
+      <dsp:txBody>
+        <a:bodyPr spcFirstLastPara="0" vert="horz" wrap="square" lIns="0" tIns="0" rIns="0" bIns="0" numCol="1" spcCol="1270" anchor="t" anchorCtr="0">
+          <a:noAutofit/>
+        </a:bodyPr>
+        <a:lstStyle/>
+        <a:p>
+          <a:pPr marL="0" lvl="0" indent="0" algn="l" defTabSz="622300">
+            <a:lnSpc>
+              <a:spcPct val="90000"/>
+            </a:lnSpc>
+            <a:spcBef>
+              <a:spcPct val="0"/>
+            </a:spcBef>
+            <a:spcAft>
+              <a:spcPct val="35000"/>
+            </a:spcAft>
+            <a:buNone/>
+            <a:defRPr b="1"/>
+          </a:pPr>
+          <a:r>
+            <a:rPr lang="es-ES" sz="1400" kern="1200"/>
+            <a:t>Para ejecutar: </a:t>
+          </a:r>
+          <a:endParaRPr lang="en-US" sz="1400" kern="1200"/>
+        </a:p>
+      </dsp:txBody>
+      <dsp:txXfrm>
+        <a:off x="6472097" y="2060447"/>
+        <a:ext cx="2463750" cy="381111"/>
+      </dsp:txXfrm>
+    </dsp:sp>
+    <dsp:sp modelId="{67AB7C47-6060-4224-969B-FAA4BF172D42}">
+      <dsp:nvSpPr>
+        <dsp:cNvPr id="0" name=""/>
+        <dsp:cNvSpPr/>
+      </dsp:nvSpPr>
+      <dsp:spPr>
+        <a:xfrm>
+          <a:off x="5793063" y="2464836"/>
+          <a:ext cx="3821818" cy="509719"/>
+        </a:xfrm>
+        <a:prstGeom prst="rect">
+          <a:avLst/>
+        </a:prstGeom>
+        <a:noFill/>
+        <a:ln>
+          <a:noFill/>
+        </a:ln>
+        <a:effectLst/>
+      </dsp:spPr>
+      <dsp:style>
+        <a:lnRef idx="0">
+          <a:scrgbClr r="0" g="0" b="0"/>
+        </a:lnRef>
+        <a:fillRef idx="0">
+          <a:scrgbClr r="0" g="0" b="0"/>
+        </a:fillRef>
+        <a:effectRef idx="0">
+          <a:scrgbClr r="0" g="0" b="0"/>
+        </a:effectRef>
+        <a:fontRef idx="minor"/>
+      </dsp:style>
+      <dsp:txBody>
+        <a:bodyPr spcFirstLastPara="0" vert="horz" wrap="square" lIns="0" tIns="0" rIns="0" bIns="0" numCol="1" spcCol="1270" anchor="t" anchorCtr="0">
+          <a:noAutofit/>
+        </a:bodyPr>
+        <a:lstStyle/>
+        <a:p>
+          <a:pPr marL="0" lvl="0" indent="0" algn="l" defTabSz="488950">
+            <a:lnSpc>
+              <a:spcPct val="90000"/>
+            </a:lnSpc>
+            <a:spcBef>
+              <a:spcPct val="0"/>
+            </a:spcBef>
+            <a:spcAft>
+              <a:spcPct val="35000"/>
+            </a:spcAft>
+            <a:buNone/>
+          </a:pPr>
+          <a:r>
+            <a:rPr lang="es-ES" sz="1100" kern="1200" dirty="0"/>
+            <a:t>- </a:t>
+          </a:r>
+          <a:r>
+            <a:rPr lang="es-ES" sz="1100" kern="1200" dirty="0" err="1"/>
+            <a:t>pnpm</a:t>
+          </a:r>
+          <a:r>
+            <a:rPr lang="es-ES" sz="1100" kern="1200" dirty="0"/>
+            <a:t> </a:t>
+          </a:r>
+          <a:r>
+            <a:rPr lang="es-ES" sz="1100" kern="1200" dirty="0" err="1"/>
+            <a:t>tsc</a:t>
+          </a:r>
+          <a:r>
+            <a:rPr lang="es-ES" sz="1100" kern="1200" dirty="0"/>
+            <a:t> (solo necesario para </a:t>
+          </a:r>
+          <a:r>
+            <a:rPr lang="es-ES" sz="1100" kern="1200" dirty="0" err="1"/>
+            <a:t>typescript</a:t>
+          </a:r>
+          <a:r>
+            <a:rPr lang="es-ES" sz="1100" kern="1200" dirty="0"/>
+            <a:t>)</a:t>
+          </a:r>
+          <a:endParaRPr lang="en-US" sz="1100" kern="1200" dirty="0"/>
+        </a:p>
+        <a:p>
+          <a:pPr marL="0" lvl="0" indent="0" algn="l" defTabSz="488950">
+            <a:lnSpc>
+              <a:spcPct val="90000"/>
+            </a:lnSpc>
+            <a:spcBef>
+              <a:spcPct val="0"/>
+            </a:spcBef>
+            <a:spcAft>
+              <a:spcPct val="35000"/>
+            </a:spcAft>
+            <a:buNone/>
+          </a:pPr>
+          <a:r>
+            <a:rPr lang="es-ES" sz="1100" kern="1200" dirty="0"/>
+            <a:t>- </a:t>
+          </a:r>
+          <a:r>
+            <a:rPr lang="es-ES" sz="1100" kern="1200" dirty="0" err="1"/>
+            <a:t>node</a:t>
+          </a:r>
+          <a:r>
+            <a:rPr lang="es-ES" sz="1100" kern="1200" dirty="0"/>
+            <a:t> ‘archivo generado </a:t>
+          </a:r>
+          <a:r>
+            <a:rPr lang="es-ES" sz="1100" kern="1200" dirty="0" err="1"/>
+            <a:t>js</a:t>
+          </a:r>
+          <a:r>
+            <a:rPr lang="es-ES" sz="1100" kern="1200" dirty="0"/>
+            <a:t>’</a:t>
+          </a:r>
+          <a:endParaRPr lang="en-US" sz="1100" kern="1200" dirty="0"/>
+        </a:p>
+      </dsp:txBody>
+      <dsp:txXfrm>
+        <a:off x="5793063" y="2464836"/>
+        <a:ext cx="3821818" cy="509719"/>
+      </dsp:txXfrm>
+    </dsp:sp>
+  </dsp:spTree>
+</dsp:drawing>
+</file>
+
 <file path=ppt/diagrams/layout1.xml><?xml version="1.0" encoding="utf-8"?>
 <dgm:layoutDef xmlns:dgm="http://schemas.openxmlformats.org/drawingml/2006/diagram" xmlns:a="http://schemas.openxmlformats.org/drawingml/2006/main" uniqueId="urn:microsoft.com/office/officeart/2018/2/layout/IconVerticalSolidList">
   <dgm:title val="Icon Vertical Solid List"/>
@@ -2409,7 +4200,1250 @@
 </dgm:layoutDef>
 </file>
 
+<file path=ppt/diagrams/layout2.xml><?xml version="1.0" encoding="utf-8"?>
+<dgm:layoutDef xmlns:dgm="http://schemas.openxmlformats.org/drawingml/2006/diagram" xmlns:a="http://schemas.openxmlformats.org/drawingml/2006/main" uniqueId="urn:microsoft.com/office/officeart/2018/2/layout/IconLabelDescriptionList">
+  <dgm:title val="Icon Label Description List"/>
+  <dgm:desc val="Use to show non-sequential or grouped chunks of information. The placeholder holds an icon or small picture, and corresponding text boxes show Level 1 and Level 2 text respectively. Works well for minimal Level 1 text accompanied by lengthier Level two text."/>
+  <dgm:catLst>
+    <dgm:cat type="icon" pri="500"/>
+  </dgm:catLst>
+  <dgm:sampData useDef="1">
+    <dgm:dataModel>
+      <dgm:ptLst/>
+      <dgm:bg/>
+      <dgm:whole/>
+    </dgm:dataModel>
+  </dgm:sampData>
+  <dgm:styleData useDef="1">
+    <dgm:dataModel>
+      <dgm:ptLst/>
+      <dgm:bg/>
+      <dgm:whole/>
+    </dgm:dataModel>
+  </dgm:styleData>
+  <dgm:clrData useDef="1">
+    <dgm:dataModel>
+      <dgm:ptLst/>
+      <dgm:bg/>
+      <dgm:whole/>
+    </dgm:dataModel>
+  </dgm:clrData>
+  <dgm:layoutNode name="root">
+    <dgm:varLst>
+      <dgm:dir/>
+      <dgm:resizeHandles val="exact"/>
+    </dgm:varLst>
+    <dgm:choose name="Name0">
+      <dgm:if name="Name1" axis="self" func="var" arg="dir" op="equ" val="norm">
+        <dgm:alg type="lin"/>
+      </dgm:if>
+      <dgm:else name="Name2">
+        <dgm:alg type="lin">
+          <dgm:param type="linDir" val="fromR"/>
+        </dgm:alg>
+      </dgm:else>
+    </dgm:choose>
+    <dgm:shape xmlns:r="http://schemas.openxmlformats.org/officeDocument/2006/relationships" r:blip="">
+      <dgm:adjLst/>
+    </dgm:shape>
+    <dgm:presOf/>
+    <dgm:constrLst>
+      <dgm:constr type="h" for="ch" forName="compNode" refType="h" fact="0.45"/>
+      <dgm:constr type="w" for="ch" forName="compNode" val="120"/>
+      <dgm:constr type="w" for="ch" forName="sibTrans" refType="w" refFor="ch" refForName="compNode" fact="0.175"/>
+      <dgm:constr type="primFontSz" for="des" forName="parTx" val="36"/>
+      <dgm:constr type="primFontSz" for="des" forName="desTx" refType="primFontSz" refFor="des" refForName="parTx" op="lte" fact="0.75"/>
+      <dgm:constr type="h" for="des" forName="compNode" op="equ"/>
+      <dgm:constr type="h" for="des" forName="iconRect" op="equ"/>
+      <dgm:constr type="w" for="des" forName="iconRect" op="equ"/>
+      <dgm:constr type="h" for="des" forName="iconSpace" op="equ"/>
+      <dgm:constr type="h" for="des" forName="parTx" op="equ"/>
+      <dgm:constr type="h" for="des" forName="txSpace" op="equ"/>
+      <dgm:constr type="h" for="des" forName="desTx" op="equ"/>
+    </dgm:constrLst>
+    <dgm:ruleLst>
+      <dgm:rule type="w" for="ch" forName="compNode" val="0" fact="NaN" max="NaN"/>
+    </dgm:ruleLst>
+    <dgm:forEach name="Name3" axis="ch" ptType="node">
+      <dgm:layoutNode name="compNode">
+        <dgm:alg type="composite"/>
+        <dgm:shape xmlns:r="http://schemas.openxmlformats.org/officeDocument/2006/relationships" r:blip="">
+          <dgm:adjLst/>
+        </dgm:shape>
+        <dgm:presOf axis="self"/>
+        <dgm:constrLst>
+          <dgm:constr type="w" for="ch" forName="iconRect" refType="w" fact="0.35"/>
+          <dgm:constr type="h" for="ch" forName="iconRect" refType="w" refFor="ch" refForName="iconRect"/>
+          <dgm:constr type="l" for="ch" forName="iconRect"/>
+          <dgm:constr type="t" for="ch" forName="iconRect"/>
+          <dgm:constr type="w" for="ch" forName="iconSpace" refType="w"/>
+          <dgm:constr type="h" for="ch" forName="iconSpace" refType="h" fact="0.043"/>
+          <dgm:constr type="l" for="ch" forName="iconSpace"/>
+          <dgm:constr type="t" for="ch" forName="iconSpace" refType="b" refFor="ch" refForName="iconRect"/>
+          <dgm:constr type="w" for="ch" forName="parTx" refType="w"/>
+          <dgm:constr type="h" for="ch" forName="parTx" refType="w" fact="0.15"/>
+          <dgm:constr type="l" for="ch" forName="parTx"/>
+          <dgm:constr type="t" for="ch" forName="parTx" refType="b" refFor="ch" refForName="iconSpace"/>
+          <dgm:constr type="h" for="ch" forName="txSpace" refType="h" fact="0.02"/>
+          <dgm:constr type="w" for="ch" forName="txSpace" refType="w"/>
+          <dgm:constr type="l" for="ch" forName="txSpace"/>
+          <dgm:constr type="t" for="ch" forName="txSpace" refType="b" refFor="ch" refForName="parTx"/>
+          <dgm:constr type="w" for="ch" forName="desTx" refType="w"/>
+          <dgm:constr type="l" for="ch" forName="desTx"/>
+          <dgm:constr type="t" for="ch" forName="desTx" refType="b" refFor="ch" refForName="txSpace"/>
+        </dgm:constrLst>
+        <dgm:ruleLst>
+          <dgm:rule type="h" val="INF" fact="NaN" max="NaN"/>
+        </dgm:ruleLst>
+        <dgm:layoutNode name="iconRect" styleLbl="node1">
+          <dgm:alg type="sp"/>
+          <dgm:shape xmlns:r="http://schemas.openxmlformats.org/officeDocument/2006/relationships" type="rect" r:blip="" blipPhldr="1">
+            <dgm:adjLst/>
+          </dgm:shape>
+          <dgm:presOf/>
+          <dgm:constrLst/>
+          <dgm:ruleLst/>
+        </dgm:layoutNode>
+        <dgm:layoutNode name="iconSpace">
+          <dgm:alg type="sp"/>
+          <dgm:shape xmlns:r="http://schemas.openxmlformats.org/officeDocument/2006/relationships" r:blip="">
+            <dgm:adjLst/>
+          </dgm:shape>
+          <dgm:presOf/>
+          <dgm:constrLst/>
+          <dgm:ruleLst/>
+        </dgm:layoutNode>
+        <dgm:layoutNode name="parTx" styleLbl="revTx">
+          <dgm:varLst>
+            <dgm:chMax val="0"/>
+            <dgm:chPref val="0"/>
+          </dgm:varLst>
+          <dgm:alg type="tx">
+            <dgm:param type="txAnchorVert" val="t"/>
+            <dgm:param type="parTxLTRAlign" val="l"/>
+            <dgm:param type="shpTxLTRAlignCh" val="l"/>
+            <dgm:param type="parTxRTLAlign" val="r"/>
+            <dgm:param type="shpTxRTLAlignCh" val="r"/>
+          </dgm:alg>
+          <dgm:shape xmlns:r="http://schemas.openxmlformats.org/officeDocument/2006/relationships" type="rect" r:blip="">
+            <dgm:adjLst/>
+          </dgm:shape>
+          <dgm:presOf axis="self" ptType="node"/>
+          <dgm:constrLst>
+            <dgm:constr type="lMarg"/>
+            <dgm:constr type="rMarg"/>
+            <dgm:constr type="tMarg"/>
+            <dgm:constr type="bMarg"/>
+          </dgm:constrLst>
+          <dgm:ruleLst>
+            <dgm:rule type="primFontSz" val="14" fact="NaN" max="NaN"/>
+            <dgm:rule type="h" val="INF" fact="NaN" max="NaN"/>
+          </dgm:ruleLst>
+        </dgm:layoutNode>
+        <dgm:layoutNode name="txSpace">
+          <dgm:alg type="sp"/>
+          <dgm:shape xmlns:r="http://schemas.openxmlformats.org/officeDocument/2006/relationships" r:blip="">
+            <dgm:adjLst/>
+          </dgm:shape>
+          <dgm:presOf/>
+          <dgm:constrLst/>
+          <dgm:ruleLst/>
+        </dgm:layoutNode>
+        <dgm:layoutNode name="desTx" styleLbl="revTx">
+          <dgm:varLst/>
+          <dgm:alg type="tx">
+            <dgm:param type="stBulletLvl" val="0"/>
+            <dgm:param type="txAnchorVert" val="t"/>
+            <dgm:param type="parTxLTRAlign" val="l"/>
+            <dgm:param type="shpTxLTRAlignCh" val="l"/>
+            <dgm:param type="parTxRTLAlign" val="r"/>
+            <dgm:param type="shpTxRTLAlignCh" val="r"/>
+          </dgm:alg>
+          <dgm:shape xmlns:r="http://schemas.openxmlformats.org/officeDocument/2006/relationships" type="rect" r:blip="">
+            <dgm:adjLst/>
+          </dgm:shape>
+          <dgm:presOf axis="des" ptType="node"/>
+          <dgm:constrLst>
+            <dgm:constr type="secFontSz" refType="primFontSz"/>
+            <dgm:constr type="lMarg"/>
+            <dgm:constr type="rMarg"/>
+            <dgm:constr type="tMarg"/>
+            <dgm:constr type="bMarg"/>
+          </dgm:constrLst>
+          <dgm:ruleLst>
+            <dgm:rule type="primFontSz" val="NaN" fact="NaN" max="17"/>
+            <dgm:rule type="h" val="INF" fact="NaN" max="NaN"/>
+          </dgm:ruleLst>
+        </dgm:layoutNode>
+      </dgm:layoutNode>
+      <dgm:forEach name="Name4" axis="followSib" ptType="sibTrans" cnt="1">
+        <dgm:layoutNode name="sibTrans">
+          <dgm:alg type="sp"/>
+          <dgm:shape xmlns:r="http://schemas.openxmlformats.org/officeDocument/2006/relationships" r:blip="">
+            <dgm:adjLst/>
+          </dgm:shape>
+          <dgm:presOf axis="self"/>
+          <dgm:constrLst/>
+          <dgm:ruleLst/>
+        </dgm:layoutNode>
+      </dgm:forEach>
+    </dgm:forEach>
+  </dgm:layoutNode>
+  <dgm:extLst>
+    <a:ext uri="{68A01E43-0DF5-4B5B-8FA6-DAF915123BFB}">
+      <dgm1612:lstStyle xmlns:dgm1612="http://schemas.microsoft.com/office/drawing/2016/12/diagram">
+        <a:lvl1pPr>
+          <a:lnSpc>
+            <a:spcPct val="100000"/>
+          </a:lnSpc>
+          <a:defRPr b="1"/>
+        </a:lvl1pPr>
+        <a:lvl2pPr>
+          <a:lnSpc>
+            <a:spcPct val="100000"/>
+          </a:lnSpc>
+        </a:lvl2pPr>
+      </dgm1612:lstStyle>
+    </a:ext>
+  </dgm:extLst>
+</dgm:layoutDef>
+</file>
+
 <file path=ppt/diagrams/quickStyle1.xml><?xml version="1.0" encoding="utf-8"?>
+<dgm:styleDef xmlns:dgm="http://schemas.openxmlformats.org/drawingml/2006/diagram" xmlns:a="http://schemas.openxmlformats.org/drawingml/2006/main" uniqueId="urn:microsoft.com/office/officeart/2005/8/quickstyle/simple1">
+  <dgm:title val=""/>
+  <dgm:desc val=""/>
+  <dgm:catLst>
+    <dgm:cat type="simple" pri="10100"/>
+  </dgm:catLst>
+  <dgm:scene3d>
+    <a:camera prst="orthographicFront"/>
+    <a:lightRig rig="threePt" dir="t"/>
+  </dgm:scene3d>
+  <dgm:styleLbl name="node0">
+    <dgm:scene3d>
+      <a:camera prst="orthographicFront"/>
+      <a:lightRig rig="threePt" dir="t"/>
+    </dgm:scene3d>
+    <dgm:sp3d/>
+    <dgm:txPr/>
+    <dgm:style>
+      <a:lnRef idx="2">
+        <a:scrgbClr r="0" g="0" b="0"/>
+      </a:lnRef>
+      <a:fillRef idx="1">
+        <a:scrgbClr r="0" g="0" b="0"/>
+      </a:fillRef>
+      <a:effectRef idx="0">
+        <a:scrgbClr r="0" g="0" b="0"/>
+      </a:effectRef>
+      <a:fontRef idx="minor">
+        <a:schemeClr val="lt1"/>
+      </a:fontRef>
+    </dgm:style>
+  </dgm:styleLbl>
+  <dgm:styleLbl name="lnNode1">
+    <dgm:scene3d>
+      <a:camera prst="orthographicFront"/>
+      <a:lightRig rig="threePt" dir="t"/>
+    </dgm:scene3d>
+    <dgm:sp3d/>
+    <dgm:txPr/>
+    <dgm:style>
+      <a:lnRef idx="2">
+        <a:scrgbClr r="0" g="0" b="0"/>
+      </a:lnRef>
+      <a:fillRef idx="1">
+        <a:scrgbClr r="0" g="0" b="0"/>
+      </a:fillRef>
+      <a:effectRef idx="0">
+        <a:scrgbClr r="0" g="0" b="0"/>
+      </a:effectRef>
+      <a:fontRef idx="minor">
+        <a:schemeClr val="lt1"/>
+      </a:fontRef>
+    </dgm:style>
+  </dgm:styleLbl>
+  <dgm:styleLbl name="vennNode1">
+    <dgm:scene3d>
+      <a:camera prst="orthographicFront"/>
+      <a:lightRig rig="threePt" dir="t"/>
+    </dgm:scene3d>
+    <dgm:sp3d/>
+    <dgm:txPr/>
+    <dgm:style>
+      <a:lnRef idx="2">
+        <a:scrgbClr r="0" g="0" b="0"/>
+      </a:lnRef>
+      <a:fillRef idx="1">
+        <a:scrgbClr r="0" g="0" b="0"/>
+      </a:fillRef>
+      <a:effectRef idx="0">
+        <a:scrgbClr r="0" g="0" b="0"/>
+      </a:effectRef>
+      <a:fontRef idx="minor">
+        <a:schemeClr val="tx1"/>
+      </a:fontRef>
+    </dgm:style>
+  </dgm:styleLbl>
+  <dgm:styleLbl name="alignNode1">
+    <dgm:scene3d>
+      <a:camera prst="orthographicFront"/>
+      <a:lightRig rig="threePt" dir="t"/>
+    </dgm:scene3d>
+    <dgm:sp3d/>
+    <dgm:txPr/>
+    <dgm:style>
+      <a:lnRef idx="2">
+        <a:scrgbClr r="0" g="0" b="0"/>
+      </a:lnRef>
+      <a:fillRef idx="1">
+        <a:scrgbClr r="0" g="0" b="0"/>
+      </a:fillRef>
+      <a:effectRef idx="0">
+        <a:scrgbClr r="0" g="0" b="0"/>
+      </a:effectRef>
+      <a:fontRef idx="minor">
+        <a:schemeClr val="lt1"/>
+      </a:fontRef>
+    </dgm:style>
+  </dgm:styleLbl>
+  <dgm:styleLbl name="node1">
+    <dgm:scene3d>
+      <a:camera prst="orthographicFront"/>
+      <a:lightRig rig="threePt" dir="t"/>
+    </dgm:scene3d>
+    <dgm:sp3d/>
+    <dgm:txPr/>
+    <dgm:style>
+      <a:lnRef idx="2">
+        <a:scrgbClr r="0" g="0" b="0"/>
+      </a:lnRef>
+      <a:fillRef idx="1">
+        <a:scrgbClr r="0" g="0" b="0"/>
+      </a:fillRef>
+      <a:effectRef idx="0">
+        <a:scrgbClr r="0" g="0" b="0"/>
+      </a:effectRef>
+      <a:fontRef idx="minor">
+        <a:schemeClr val="lt1"/>
+      </a:fontRef>
+    </dgm:style>
+  </dgm:styleLbl>
+  <dgm:styleLbl name="node2">
+    <dgm:scene3d>
+      <a:camera prst="orthographicFront"/>
+      <a:lightRig rig="threePt" dir="t"/>
+    </dgm:scene3d>
+    <dgm:sp3d/>
+    <dgm:txPr/>
+    <dgm:style>
+      <a:lnRef idx="2">
+        <a:scrgbClr r="0" g="0" b="0"/>
+      </a:lnRef>
+      <a:fillRef idx="1">
+        <a:scrgbClr r="0" g="0" b="0"/>
+      </a:fillRef>
+      <a:effectRef idx="0">
+        <a:scrgbClr r="0" g="0" b="0"/>
+      </a:effectRef>
+      <a:fontRef idx="minor">
+        <a:schemeClr val="lt1"/>
+      </a:fontRef>
+    </dgm:style>
+  </dgm:styleLbl>
+  <dgm:styleLbl name="node3">
+    <dgm:scene3d>
+      <a:camera prst="orthographicFront"/>
+      <a:lightRig rig="threePt" dir="t"/>
+    </dgm:scene3d>
+    <dgm:sp3d/>
+    <dgm:txPr/>
+    <dgm:style>
+      <a:lnRef idx="2">
+        <a:scrgbClr r="0" g="0" b="0"/>
+      </a:lnRef>
+      <a:fillRef idx="1">
+        <a:scrgbClr r="0" g="0" b="0"/>
+      </a:fillRef>
+      <a:effectRef idx="0">
+        <a:scrgbClr r="0" g="0" b="0"/>
+      </a:effectRef>
+      <a:fontRef idx="minor">
+        <a:schemeClr val="lt1"/>
+      </a:fontRef>
+    </dgm:style>
+  </dgm:styleLbl>
+  <dgm:styleLbl name="node4">
+    <dgm:scene3d>
+      <a:camera prst="orthographicFront"/>
+      <a:lightRig rig="threePt" dir="t"/>
+    </dgm:scene3d>
+    <dgm:sp3d/>
+    <dgm:txPr/>
+    <dgm:style>
+      <a:lnRef idx="2">
+        <a:scrgbClr r="0" g="0" b="0"/>
+      </a:lnRef>
+      <a:fillRef idx="1">
+        <a:scrgbClr r="0" g="0" b="0"/>
+      </a:fillRef>
+      <a:effectRef idx="0">
+        <a:scrgbClr r="0" g="0" b="0"/>
+      </a:effectRef>
+      <a:fontRef idx="minor">
+        <a:schemeClr val="lt1"/>
+      </a:fontRef>
+    </dgm:style>
+  </dgm:styleLbl>
+  <dgm:styleLbl name="fgImgPlace1">
+    <dgm:scene3d>
+      <a:camera prst="orthographicFront"/>
+      <a:lightRig rig="threePt" dir="t"/>
+    </dgm:scene3d>
+    <dgm:sp3d/>
+    <dgm:txPr/>
+    <dgm:style>
+      <a:lnRef idx="2">
+        <a:scrgbClr r="0" g="0" b="0"/>
+      </a:lnRef>
+      <a:fillRef idx="1">
+        <a:scrgbClr r="0" g="0" b="0"/>
+      </a:fillRef>
+      <a:effectRef idx="0">
+        <a:scrgbClr r="0" g="0" b="0"/>
+      </a:effectRef>
+      <a:fontRef idx="minor"/>
+    </dgm:style>
+  </dgm:styleLbl>
+  <dgm:styleLbl name="alignImgPlace1">
+    <dgm:scene3d>
+      <a:camera prst="orthographicFront"/>
+      <a:lightRig rig="threePt" dir="t"/>
+    </dgm:scene3d>
+    <dgm:sp3d/>
+    <dgm:txPr/>
+    <dgm:style>
+      <a:lnRef idx="2">
+        <a:scrgbClr r="0" g="0" b="0"/>
+      </a:lnRef>
+      <a:fillRef idx="1">
+        <a:scrgbClr r="0" g="0" b="0"/>
+      </a:fillRef>
+      <a:effectRef idx="0">
+        <a:scrgbClr r="0" g="0" b="0"/>
+      </a:effectRef>
+      <a:fontRef idx="minor"/>
+    </dgm:style>
+  </dgm:styleLbl>
+  <dgm:styleLbl name="bgImgPlace1">
+    <dgm:scene3d>
+      <a:camera prst="orthographicFront"/>
+      <a:lightRig rig="threePt" dir="t"/>
+    </dgm:scene3d>
+    <dgm:sp3d/>
+    <dgm:txPr/>
+    <dgm:style>
+      <a:lnRef idx="2">
+        <a:scrgbClr r="0" g="0" b="0"/>
+      </a:lnRef>
+      <a:fillRef idx="1">
+        <a:scrgbClr r="0" g="0" b="0"/>
+      </a:fillRef>
+      <a:effectRef idx="0">
+        <a:scrgbClr r="0" g="0" b="0"/>
+      </a:effectRef>
+      <a:fontRef idx="minor"/>
+    </dgm:style>
+  </dgm:styleLbl>
+  <dgm:styleLbl name="sibTrans2D1">
+    <dgm:scene3d>
+      <a:camera prst="orthographicFront"/>
+      <a:lightRig rig="threePt" dir="t"/>
+    </dgm:scene3d>
+    <dgm:sp3d/>
+    <dgm:txPr/>
+    <dgm:style>
+      <a:lnRef idx="0">
+        <a:scrgbClr r="0" g="0" b="0"/>
+      </a:lnRef>
+      <a:fillRef idx="1">
+        <a:scrgbClr r="0" g="0" b="0"/>
+      </a:fillRef>
+      <a:effectRef idx="0">
+        <a:scrgbClr r="0" g="0" b="0"/>
+      </a:effectRef>
+      <a:fontRef idx="minor">
+        <a:schemeClr val="lt1"/>
+      </a:fontRef>
+    </dgm:style>
+  </dgm:styleLbl>
+  <dgm:styleLbl name="fgSibTrans2D1">
+    <dgm:scene3d>
+      <a:camera prst="orthographicFront"/>
+      <a:lightRig rig="threePt" dir="t"/>
+    </dgm:scene3d>
+    <dgm:sp3d/>
+    <dgm:txPr/>
+    <dgm:style>
+      <a:lnRef idx="0">
+        <a:scrgbClr r="0" g="0" b="0"/>
+      </a:lnRef>
+      <a:fillRef idx="1">
+        <a:scrgbClr r="0" g="0" b="0"/>
+      </a:fillRef>
+      <a:effectRef idx="0">
+        <a:scrgbClr r="0" g="0" b="0"/>
+      </a:effectRef>
+      <a:fontRef idx="minor">
+        <a:schemeClr val="lt1"/>
+      </a:fontRef>
+    </dgm:style>
+  </dgm:styleLbl>
+  <dgm:styleLbl name="bgSibTrans2D1">
+    <dgm:scene3d>
+      <a:camera prst="orthographicFront"/>
+      <a:lightRig rig="threePt" dir="t"/>
+    </dgm:scene3d>
+    <dgm:sp3d/>
+    <dgm:txPr/>
+    <dgm:style>
+      <a:lnRef idx="0">
+        <a:scrgbClr r="0" g="0" b="0"/>
+      </a:lnRef>
+      <a:fillRef idx="1">
+        <a:scrgbClr r="0" g="0" b="0"/>
+      </a:fillRef>
+      <a:effectRef idx="0">
+        <a:scrgbClr r="0" g="0" b="0"/>
+      </a:effectRef>
+      <a:fontRef idx="minor">
+        <a:schemeClr val="lt1"/>
+      </a:fontRef>
+    </dgm:style>
+  </dgm:styleLbl>
+  <dgm:styleLbl name="sibTrans1D1">
+    <dgm:scene3d>
+      <a:camera prst="orthographicFront"/>
+      <a:lightRig rig="threePt" dir="t"/>
+    </dgm:scene3d>
+    <dgm:sp3d/>
+    <dgm:txPr/>
+    <dgm:style>
+      <a:lnRef idx="1">
+        <a:scrgbClr r="0" g="0" b="0"/>
+      </a:lnRef>
+      <a:fillRef idx="0">
+        <a:scrgbClr r="0" g="0" b="0"/>
+      </a:fillRef>
+      <a:effectRef idx="0">
+        <a:scrgbClr r="0" g="0" b="0"/>
+      </a:effectRef>
+      <a:fontRef idx="minor"/>
+    </dgm:style>
+  </dgm:styleLbl>
+  <dgm:styleLbl name="callout">
+    <dgm:scene3d>
+      <a:camera prst="orthographicFront"/>
+      <a:lightRig rig="threePt" dir="t"/>
+    </dgm:scene3d>
+    <dgm:sp3d/>
+    <dgm:txPr/>
+    <dgm:style>
+      <a:lnRef idx="2">
+        <a:scrgbClr r="0" g="0" b="0"/>
+      </a:lnRef>
+      <a:fillRef idx="1">
+        <a:scrgbClr r="0" g="0" b="0"/>
+      </a:fillRef>
+      <a:effectRef idx="0">
+        <a:scrgbClr r="0" g="0" b="0"/>
+      </a:effectRef>
+      <a:fontRef idx="minor"/>
+    </dgm:style>
+  </dgm:styleLbl>
+  <dgm:styleLbl name="asst0">
+    <dgm:scene3d>
+      <a:camera prst="orthographicFront"/>
+      <a:lightRig rig="threePt" dir="t"/>
+    </dgm:scene3d>
+    <dgm:sp3d/>
+    <dgm:txPr/>
+    <dgm:style>
+      <a:lnRef idx="2">
+        <a:scrgbClr r="0" g="0" b="0"/>
+      </a:lnRef>
+      <a:fillRef idx="1">
+        <a:scrgbClr r="0" g="0" b="0"/>
+      </a:fillRef>
+      <a:effectRef idx="0">
+        <a:scrgbClr r="0" g="0" b="0"/>
+      </a:effectRef>
+      <a:fontRef idx="minor">
+        <a:schemeClr val="lt1"/>
+      </a:fontRef>
+    </dgm:style>
+  </dgm:styleLbl>
+  <dgm:styleLbl name="asst1">
+    <dgm:scene3d>
+      <a:camera prst="orthographicFront"/>
+      <a:lightRig rig="threePt" dir="t"/>
+    </dgm:scene3d>
+    <dgm:sp3d/>
+    <dgm:txPr/>
+    <dgm:style>
+      <a:lnRef idx="2">
+        <a:scrgbClr r="0" g="0" b="0"/>
+      </a:lnRef>
+      <a:fillRef idx="1">
+        <a:scrgbClr r="0" g="0" b="0"/>
+      </a:fillRef>
+      <a:effectRef idx="0">
+        <a:scrgbClr r="0" g="0" b="0"/>
+      </a:effectRef>
+      <a:fontRef idx="minor">
+        <a:schemeClr val="lt1"/>
+      </a:fontRef>
+    </dgm:style>
+  </dgm:styleLbl>
+  <dgm:styleLbl name="asst2">
+    <dgm:scene3d>
+      <a:camera prst="orthographicFront"/>
+      <a:lightRig rig="threePt" dir="t"/>
+    </dgm:scene3d>
+    <dgm:sp3d/>
+    <dgm:txPr/>
+    <dgm:style>
+      <a:lnRef idx="2">
+        <a:scrgbClr r="0" g="0" b="0"/>
+      </a:lnRef>
+      <a:fillRef idx="1">
+        <a:scrgbClr r="0" g="0" b="0"/>
+      </a:fillRef>
+      <a:effectRef idx="0">
+        <a:scrgbClr r="0" g="0" b="0"/>
+      </a:effectRef>
+      <a:fontRef idx="minor">
+        <a:schemeClr val="lt1"/>
+      </a:fontRef>
+    </dgm:style>
+  </dgm:styleLbl>
+  <dgm:styleLbl name="asst3">
+    <dgm:scene3d>
+      <a:camera prst="orthographicFront"/>
+      <a:lightRig rig="threePt" dir="t"/>
+    </dgm:scene3d>
+    <dgm:sp3d/>
+    <dgm:txPr/>
+    <dgm:style>
+      <a:lnRef idx="2">
+        <a:scrgbClr r="0" g="0" b="0"/>
+      </a:lnRef>
+      <a:fillRef idx="1">
+        <a:scrgbClr r="0" g="0" b="0"/>
+      </a:fillRef>
+      <a:effectRef idx="0">
+        <a:scrgbClr r="0" g="0" b="0"/>
+      </a:effectRef>
+      <a:fontRef idx="minor">
+        <a:schemeClr val="lt1"/>
+      </a:fontRef>
+    </dgm:style>
+  </dgm:styleLbl>
+  <dgm:styleLbl name="asst4">
+    <dgm:scene3d>
+      <a:camera prst="orthographicFront"/>
+      <a:lightRig rig="threePt" dir="t"/>
+    </dgm:scene3d>
+    <dgm:sp3d/>
+    <dgm:txPr/>
+    <dgm:style>
+      <a:lnRef idx="2">
+        <a:scrgbClr r="0" g="0" b="0"/>
+      </a:lnRef>
+      <a:fillRef idx="1">
+        <a:scrgbClr r="0" g="0" b="0"/>
+      </a:fillRef>
+      <a:effectRef idx="0">
+        <a:scrgbClr r="0" g="0" b="0"/>
+      </a:effectRef>
+      <a:fontRef idx="minor">
+        <a:schemeClr val="lt1"/>
+      </a:fontRef>
+    </dgm:style>
+  </dgm:styleLbl>
+  <dgm:styleLbl name="parChTrans2D1">
+    <dgm:scene3d>
+      <a:camera prst="orthographicFront"/>
+      <a:lightRig rig="threePt" dir="t"/>
+    </dgm:scene3d>
+    <dgm:sp3d/>
+    <dgm:txPr/>
+    <dgm:style>
+      <a:lnRef idx="2">
+        <a:scrgbClr r="0" g="0" b="0"/>
+      </a:lnRef>
+      <a:fillRef idx="1">
+        <a:scrgbClr r="0" g="0" b="0"/>
+      </a:fillRef>
+      <a:effectRef idx="0">
+        <a:scrgbClr r="0" g="0" b="0"/>
+      </a:effectRef>
+      <a:fontRef idx="minor">
+        <a:schemeClr val="lt1"/>
+      </a:fontRef>
+    </dgm:style>
+  </dgm:styleLbl>
+  <dgm:styleLbl name="parChTrans2D2">
+    <dgm:scene3d>
+      <a:camera prst="orthographicFront"/>
+      <a:lightRig rig="threePt" dir="t"/>
+    </dgm:scene3d>
+    <dgm:sp3d/>
+    <dgm:txPr/>
+    <dgm:style>
+      <a:lnRef idx="2">
+        <a:scrgbClr r="0" g="0" b="0"/>
+      </a:lnRef>
+      <a:fillRef idx="1">
+        <a:scrgbClr r="0" g="0" b="0"/>
+      </a:fillRef>
+      <a:effectRef idx="0">
+        <a:scrgbClr r="0" g="0" b="0"/>
+      </a:effectRef>
+      <a:fontRef idx="minor">
+        <a:schemeClr val="lt1"/>
+      </a:fontRef>
+    </dgm:style>
+  </dgm:styleLbl>
+  <dgm:styleLbl name="parChTrans2D3">
+    <dgm:scene3d>
+      <a:camera prst="orthographicFront"/>
+      <a:lightRig rig="threePt" dir="t"/>
+    </dgm:scene3d>
+    <dgm:sp3d/>
+    <dgm:txPr/>
+    <dgm:style>
+      <a:lnRef idx="2">
+        <a:scrgbClr r="0" g="0" b="0"/>
+      </a:lnRef>
+      <a:fillRef idx="1">
+        <a:scrgbClr r="0" g="0" b="0"/>
+      </a:fillRef>
+      <a:effectRef idx="0">
+        <a:scrgbClr r="0" g="0" b="0"/>
+      </a:effectRef>
+      <a:fontRef idx="minor">
+        <a:schemeClr val="lt1"/>
+      </a:fontRef>
+    </dgm:style>
+  </dgm:styleLbl>
+  <dgm:styleLbl name="parChTrans2D4">
+    <dgm:scene3d>
+      <a:camera prst="orthographicFront"/>
+      <a:lightRig rig="threePt" dir="t"/>
+    </dgm:scene3d>
+    <dgm:sp3d/>
+    <dgm:txPr/>
+    <dgm:style>
+      <a:lnRef idx="2">
+        <a:scrgbClr r="0" g="0" b="0"/>
+      </a:lnRef>
+      <a:fillRef idx="1">
+        <a:scrgbClr r="0" g="0" b="0"/>
+      </a:fillRef>
+      <a:effectRef idx="0">
+        <a:scrgbClr r="0" g="0" b="0"/>
+      </a:effectRef>
+      <a:fontRef idx="minor">
+        <a:schemeClr val="lt1"/>
+      </a:fontRef>
+    </dgm:style>
+  </dgm:styleLbl>
+  <dgm:styleLbl name="parChTrans1D1">
+    <dgm:scene3d>
+      <a:camera prst="orthographicFront"/>
+      <a:lightRig rig="threePt" dir="t"/>
+    </dgm:scene3d>
+    <dgm:sp3d/>
+    <dgm:txPr/>
+    <dgm:style>
+      <a:lnRef idx="2">
+        <a:scrgbClr r="0" g="0" b="0"/>
+      </a:lnRef>
+      <a:fillRef idx="0">
+        <a:scrgbClr r="0" g="0" b="0"/>
+      </a:fillRef>
+      <a:effectRef idx="0">
+        <a:scrgbClr r="0" g="0" b="0"/>
+      </a:effectRef>
+      <a:fontRef idx="minor"/>
+    </dgm:style>
+  </dgm:styleLbl>
+  <dgm:styleLbl name="parChTrans1D2">
+    <dgm:scene3d>
+      <a:camera prst="orthographicFront"/>
+      <a:lightRig rig="threePt" dir="t"/>
+    </dgm:scene3d>
+    <dgm:sp3d/>
+    <dgm:txPr/>
+    <dgm:style>
+      <a:lnRef idx="2">
+        <a:scrgbClr r="0" g="0" b="0"/>
+      </a:lnRef>
+      <a:fillRef idx="0">
+        <a:scrgbClr r="0" g="0" b="0"/>
+      </a:fillRef>
+      <a:effectRef idx="0">
+        <a:scrgbClr r="0" g="0" b="0"/>
+      </a:effectRef>
+      <a:fontRef idx="minor"/>
+    </dgm:style>
+  </dgm:styleLbl>
+  <dgm:styleLbl name="parChTrans1D3">
+    <dgm:scene3d>
+      <a:camera prst="orthographicFront"/>
+      <a:lightRig rig="threePt" dir="t"/>
+    </dgm:scene3d>
+    <dgm:sp3d/>
+    <dgm:txPr/>
+    <dgm:style>
+      <a:lnRef idx="2">
+        <a:scrgbClr r="0" g="0" b="0"/>
+      </a:lnRef>
+      <a:fillRef idx="0">
+        <a:scrgbClr r="0" g="0" b="0"/>
+      </a:fillRef>
+      <a:effectRef idx="0">
+        <a:scrgbClr r="0" g="0" b="0"/>
+      </a:effectRef>
+      <a:fontRef idx="minor"/>
+    </dgm:style>
+  </dgm:styleLbl>
+  <dgm:styleLbl name="parChTrans1D4">
+    <dgm:scene3d>
+      <a:camera prst="orthographicFront"/>
+      <a:lightRig rig="threePt" dir="t"/>
+    </dgm:scene3d>
+    <dgm:sp3d/>
+    <dgm:txPr/>
+    <dgm:style>
+      <a:lnRef idx="2">
+        <a:scrgbClr r="0" g="0" b="0"/>
+      </a:lnRef>
+      <a:fillRef idx="0">
+        <a:scrgbClr r="0" g="0" b="0"/>
+      </a:fillRef>
+      <a:effectRef idx="0">
+        <a:scrgbClr r="0" g="0" b="0"/>
+      </a:effectRef>
+      <a:fontRef idx="minor"/>
+    </dgm:style>
+  </dgm:styleLbl>
+  <dgm:styleLbl name="fgAcc1">
+    <dgm:scene3d>
+      <a:camera prst="orthographicFront"/>
+      <a:lightRig rig="threePt" dir="t"/>
+    </dgm:scene3d>
+    <dgm:sp3d/>
+    <dgm:txPr/>
+    <dgm:style>
+      <a:lnRef idx="2">
+        <a:scrgbClr r="0" g="0" b="0"/>
+      </a:lnRef>
+      <a:fillRef idx="1">
+        <a:scrgbClr r="0" g="0" b="0"/>
+      </a:fillRef>
+      <a:effectRef idx="0">
+        <a:scrgbClr r="0" g="0" b="0"/>
+      </a:effectRef>
+      <a:fontRef idx="minor"/>
+    </dgm:style>
+  </dgm:styleLbl>
+  <dgm:styleLbl name="conFgAcc1">
+    <dgm:scene3d>
+      <a:camera prst="orthographicFront"/>
+      <a:lightRig rig="threePt" dir="t"/>
+    </dgm:scene3d>
+    <dgm:sp3d/>
+    <dgm:txPr/>
+    <dgm:style>
+      <a:lnRef idx="2">
+        <a:scrgbClr r="0" g="0" b="0"/>
+      </a:lnRef>
+      <a:fillRef idx="1">
+        <a:scrgbClr r="0" g="0" b="0"/>
+      </a:fillRef>
+      <a:effectRef idx="0">
+        <a:scrgbClr r="0" g="0" b="0"/>
+      </a:effectRef>
+      <a:fontRef idx="minor"/>
+    </dgm:style>
+  </dgm:styleLbl>
+  <dgm:styleLbl name="alignAcc1">
+    <dgm:scene3d>
+      <a:camera prst="orthographicFront"/>
+      <a:lightRig rig="threePt" dir="t"/>
+    </dgm:scene3d>
+    <dgm:sp3d/>
+    <dgm:txPr/>
+    <dgm:style>
+      <a:lnRef idx="2">
+        <a:scrgbClr r="0" g="0" b="0"/>
+      </a:lnRef>
+      <a:fillRef idx="1">
+        <a:scrgbClr r="0" g="0" b="0"/>
+      </a:fillRef>
+      <a:effectRef idx="0">
+        <a:scrgbClr r="0" g="0" b="0"/>
+      </a:effectRef>
+      <a:fontRef idx="minor"/>
+    </dgm:style>
+  </dgm:styleLbl>
+  <dgm:styleLbl name="trAlignAcc1">
+    <dgm:scene3d>
+      <a:camera prst="orthographicFront"/>
+      <a:lightRig rig="threePt" dir="t"/>
+    </dgm:scene3d>
+    <dgm:sp3d/>
+    <dgm:txPr/>
+    <dgm:style>
+      <a:lnRef idx="1">
+        <a:scrgbClr r="0" g="0" b="0"/>
+      </a:lnRef>
+      <a:fillRef idx="1">
+        <a:scrgbClr r="0" g="0" b="0"/>
+      </a:fillRef>
+      <a:effectRef idx="0">
+        <a:scrgbClr r="0" g="0" b="0"/>
+      </a:effectRef>
+      <a:fontRef idx="minor"/>
+    </dgm:style>
+  </dgm:styleLbl>
+  <dgm:styleLbl name="bgAcc1">
+    <dgm:scene3d>
+      <a:camera prst="orthographicFront"/>
+      <a:lightRig rig="threePt" dir="t"/>
+    </dgm:scene3d>
+    <dgm:sp3d/>
+    <dgm:txPr/>
+    <dgm:style>
+      <a:lnRef idx="2">
+        <a:scrgbClr r="0" g="0" b="0"/>
+      </a:lnRef>
+      <a:fillRef idx="1">
+        <a:scrgbClr r="0" g="0" b="0"/>
+      </a:fillRef>
+      <a:effectRef idx="0">
+        <a:scrgbClr r="0" g="0" b="0"/>
+      </a:effectRef>
+      <a:fontRef idx="minor"/>
+    </dgm:style>
+  </dgm:styleLbl>
+  <dgm:styleLbl name="solidFgAcc1">
+    <dgm:scene3d>
+      <a:camera prst="orthographicFront"/>
+      <a:lightRig rig="threePt" dir="t"/>
+    </dgm:scene3d>
+    <dgm:sp3d/>
+    <dgm:txPr/>
+    <dgm:style>
+      <a:lnRef idx="2">
+        <a:scrgbClr r="0" g="0" b="0"/>
+      </a:lnRef>
+      <a:fillRef idx="1">
+        <a:scrgbClr r="0" g="0" b="0"/>
+      </a:fillRef>
+      <a:effectRef idx="0">
+        <a:scrgbClr r="0" g="0" b="0"/>
+      </a:effectRef>
+      <a:fontRef idx="minor"/>
+    </dgm:style>
+  </dgm:styleLbl>
+  <dgm:styleLbl name="solidAlignAcc1">
+    <dgm:scene3d>
+      <a:camera prst="orthographicFront"/>
+      <a:lightRig rig="threePt" dir="t"/>
+    </dgm:scene3d>
+    <dgm:sp3d/>
+    <dgm:txPr/>
+    <dgm:style>
+      <a:lnRef idx="2">
+        <a:scrgbClr r="0" g="0" b="0"/>
+      </a:lnRef>
+      <a:fillRef idx="1">
+        <a:scrgbClr r="0" g="0" b="0"/>
+      </a:fillRef>
+      <a:effectRef idx="0">
+        <a:scrgbClr r="0" g="0" b="0"/>
+      </a:effectRef>
+      <a:fontRef idx="minor"/>
+    </dgm:style>
+  </dgm:styleLbl>
+  <dgm:styleLbl name="solidBgAcc1">
+    <dgm:scene3d>
+      <a:camera prst="orthographicFront"/>
+      <a:lightRig rig="threePt" dir="t"/>
+    </dgm:scene3d>
+    <dgm:sp3d/>
+    <dgm:txPr/>
+    <dgm:style>
+      <a:lnRef idx="2">
+        <a:scrgbClr r="0" g="0" b="0"/>
+      </a:lnRef>
+      <a:fillRef idx="1">
+        <a:scrgbClr r="0" g="0" b="0"/>
+      </a:fillRef>
+      <a:effectRef idx="0">
+        <a:scrgbClr r="0" g="0" b="0"/>
+      </a:effectRef>
+      <a:fontRef idx="minor"/>
+    </dgm:style>
+  </dgm:styleLbl>
+  <dgm:styleLbl name="fgAccFollowNode1">
+    <dgm:scene3d>
+      <a:camera prst="orthographicFront"/>
+      <a:lightRig rig="threePt" dir="t"/>
+    </dgm:scene3d>
+    <dgm:sp3d/>
+    <dgm:txPr/>
+    <dgm:style>
+      <a:lnRef idx="2">
+        <a:scrgbClr r="0" g="0" b="0"/>
+      </a:lnRef>
+      <a:fillRef idx="1">
+        <a:scrgbClr r="0" g="0" b="0"/>
+      </a:fillRef>
+      <a:effectRef idx="0">
+        <a:scrgbClr r="0" g="0" b="0"/>
+      </a:effectRef>
+      <a:fontRef idx="minor"/>
+    </dgm:style>
+  </dgm:styleLbl>
+  <dgm:styleLbl name="alignAccFollowNode1">
+    <dgm:scene3d>
+      <a:camera prst="orthographicFront"/>
+      <a:lightRig rig="threePt" dir="t"/>
+    </dgm:scene3d>
+    <dgm:sp3d/>
+    <dgm:txPr/>
+    <dgm:style>
+      <a:lnRef idx="2">
+        <a:scrgbClr r="0" g="0" b="0"/>
+      </a:lnRef>
+      <a:fillRef idx="1">
+        <a:scrgbClr r="0" g="0" b="0"/>
+      </a:fillRef>
+      <a:effectRef idx="0">
+        <a:scrgbClr r="0" g="0" b="0"/>
+      </a:effectRef>
+      <a:fontRef idx="minor"/>
+    </dgm:style>
+  </dgm:styleLbl>
+  <dgm:styleLbl name="bgAccFollowNode1">
+    <dgm:scene3d>
+      <a:camera prst="orthographicFront"/>
+      <a:lightRig rig="threePt" dir="t"/>
+    </dgm:scene3d>
+    <dgm:sp3d/>
+    <dgm:txPr/>
+    <dgm:style>
+      <a:lnRef idx="2">
+        <a:scrgbClr r="0" g="0" b="0"/>
+      </a:lnRef>
+      <a:fillRef idx="1">
+        <a:scrgbClr r="0" g="0" b="0"/>
+      </a:fillRef>
+      <a:effectRef idx="0">
+        <a:scrgbClr r="0" g="0" b="0"/>
+      </a:effectRef>
+      <a:fontRef idx="minor"/>
+    </dgm:style>
+  </dgm:styleLbl>
+  <dgm:styleLbl name="fgAcc0">
+    <dgm:scene3d>
+      <a:camera prst="orthographicFront"/>
+      <a:lightRig rig="threePt" dir="t"/>
+    </dgm:scene3d>
+    <dgm:sp3d/>
+    <dgm:txPr/>
+    <dgm:style>
+      <a:lnRef idx="2">
+        <a:scrgbClr r="0" g="0" b="0"/>
+      </a:lnRef>
+      <a:fillRef idx="1">
+        <a:scrgbClr r="0" g="0" b="0"/>
+      </a:fillRef>
+      <a:effectRef idx="0">
+        <a:scrgbClr r="0" g="0" b="0"/>
+      </a:effectRef>
+      <a:fontRef idx="minor"/>
+    </dgm:style>
+  </dgm:styleLbl>
+  <dgm:styleLbl name="fgAcc2">
+    <dgm:scene3d>
+      <a:camera prst="orthographicFront"/>
+      <a:lightRig rig="threePt" dir="t"/>
+    </dgm:scene3d>
+    <dgm:sp3d/>
+    <dgm:txPr/>
+    <dgm:style>
+      <a:lnRef idx="2">
+        <a:scrgbClr r="0" g="0" b="0"/>
+      </a:lnRef>
+      <a:fillRef idx="1">
+        <a:scrgbClr r="0" g="0" b="0"/>
+      </a:fillRef>
+      <a:effectRef idx="0">
+        <a:scrgbClr r="0" g="0" b="0"/>
+      </a:effectRef>
+      <a:fontRef idx="minor"/>
+    </dgm:style>
+  </dgm:styleLbl>
+  <dgm:styleLbl name="fgAcc3">
+    <dgm:scene3d>
+      <a:camera prst="orthographicFront"/>
+      <a:lightRig rig="threePt" dir="t"/>
+    </dgm:scene3d>
+    <dgm:sp3d/>
+    <dgm:txPr/>
+    <dgm:style>
+      <a:lnRef idx="2">
+        <a:scrgbClr r="0" g="0" b="0"/>
+      </a:lnRef>
+      <a:fillRef idx="1">
+        <a:scrgbClr r="0" g="0" b="0"/>
+      </a:fillRef>
+      <a:effectRef idx="0">
+        <a:scrgbClr r="0" g="0" b="0"/>
+      </a:effectRef>
+      <a:fontRef idx="minor"/>
+    </dgm:style>
+  </dgm:styleLbl>
+  <dgm:styleLbl name="fgAcc4">
+    <dgm:scene3d>
+      <a:camera prst="orthographicFront"/>
+      <a:lightRig rig="threePt" dir="t"/>
+    </dgm:scene3d>
+    <dgm:sp3d/>
+    <dgm:txPr/>
+    <dgm:style>
+      <a:lnRef idx="2">
+        <a:scrgbClr r="0" g="0" b="0"/>
+      </a:lnRef>
+      <a:fillRef idx="1">
+        <a:scrgbClr r="0" g="0" b="0"/>
+      </a:fillRef>
+      <a:effectRef idx="0">
+        <a:scrgbClr r="0" g="0" b="0"/>
+      </a:effectRef>
+      <a:fontRef idx="minor"/>
+    </dgm:style>
+  </dgm:styleLbl>
+  <dgm:styleLbl name="bgShp">
+    <dgm:scene3d>
+      <a:camera prst="orthographicFront"/>
+      <a:lightRig rig="threePt" dir="t"/>
+    </dgm:scene3d>
+    <dgm:sp3d/>
+    <dgm:txPr/>
+    <dgm:style>
+      <a:lnRef idx="0">
+        <a:scrgbClr r="0" g="0" b="0"/>
+      </a:lnRef>
+      <a:fillRef idx="1">
+        <a:scrgbClr r="0" g="0" b="0"/>
+      </a:fillRef>
+      <a:effectRef idx="0">
+        <a:scrgbClr r="0" g="0" b="0"/>
+      </a:effectRef>
+      <a:fontRef idx="minor"/>
+    </dgm:style>
+  </dgm:styleLbl>
+  <dgm:styleLbl name="dkBgShp">
+    <dgm:scene3d>
+      <a:camera prst="orthographicFront"/>
+      <a:lightRig rig="threePt" dir="t"/>
+    </dgm:scene3d>
+    <dgm:sp3d/>
+    <dgm:txPr/>
+    <dgm:style>
+      <a:lnRef idx="0">
+        <a:scrgbClr r="0" g="0" b="0"/>
+      </a:lnRef>
+      <a:fillRef idx="1">
+        <a:scrgbClr r="0" g="0" b="0"/>
+      </a:fillRef>
+      <a:effectRef idx="0">
+        <a:scrgbClr r="0" g="0" b="0"/>
+      </a:effectRef>
+      <a:fontRef idx="minor"/>
+    </dgm:style>
+  </dgm:styleLbl>
+  <dgm:styleLbl name="trBgShp">
+    <dgm:scene3d>
+      <a:camera prst="orthographicFront"/>
+      <a:lightRig rig="threePt" dir="t"/>
+    </dgm:scene3d>
+    <dgm:sp3d/>
+    <dgm:txPr/>
+    <dgm:style>
+      <a:lnRef idx="0">
+        <a:scrgbClr r="0" g="0" b="0"/>
+      </a:lnRef>
+      <a:fillRef idx="1">
+        <a:scrgbClr r="0" g="0" b="0"/>
+      </a:fillRef>
+      <a:effectRef idx="0">
+        <a:scrgbClr r="0" g="0" b="0"/>
+      </a:effectRef>
+      <a:fontRef idx="minor"/>
+    </dgm:style>
+  </dgm:styleLbl>
+  <dgm:styleLbl name="fgShp">
+    <dgm:scene3d>
+      <a:camera prst="orthographicFront"/>
+      <a:lightRig rig="threePt" dir="t"/>
+    </dgm:scene3d>
+    <dgm:sp3d/>
+    <dgm:txPr/>
+    <dgm:style>
+      <a:lnRef idx="2">
+        <a:scrgbClr r="0" g="0" b="0"/>
+      </a:lnRef>
+      <a:fillRef idx="1">
+        <a:scrgbClr r="0" g="0" b="0"/>
+      </a:fillRef>
+      <a:effectRef idx="0">
+        <a:scrgbClr r="0" g="0" b="0"/>
+      </a:effectRef>
+      <a:fontRef idx="minor"/>
+    </dgm:style>
+  </dgm:styleLbl>
+  <dgm:styleLbl name="revTx">
+    <dgm:scene3d>
+      <a:camera prst="orthographicFront"/>
+      <a:lightRig rig="threePt" dir="t"/>
+    </dgm:scene3d>
+    <dgm:sp3d/>
+    <dgm:txPr/>
+    <dgm:style>
+      <a:lnRef idx="0">
+        <a:scrgbClr r="0" g="0" b="0"/>
+      </a:lnRef>
+      <a:fillRef idx="0">
+        <a:scrgbClr r="0" g="0" b="0"/>
+      </a:fillRef>
+      <a:effectRef idx="0">
+        <a:scrgbClr r="0" g="0" b="0"/>
+      </a:effectRef>
+      <a:fontRef idx="minor"/>
+    </dgm:style>
+  </dgm:styleLbl>
+</dgm:styleDef>
+</file>
+
+<file path=ppt/diagrams/quickStyle2.xml><?xml version="1.0" encoding="utf-8"?>
 <dgm:styleDef xmlns:dgm="http://schemas.openxmlformats.org/drawingml/2006/diagram" xmlns:a="http://schemas.openxmlformats.org/drawingml/2006/main" uniqueId="urn:microsoft.com/office/officeart/2005/8/quickstyle/simple1">
   <dgm:title val=""/>
   <dgm:desc val=""/>
@@ -9513,6 +12547,843 @@
       <p:bldP spid="3" grpId="0" build="p"/>
     </p:bldLst>
   </p:timing>
+</p:sld>
+</file>
+
+<file path=ppt/slides/slide10.xml><?xml version="1.0" encoding="utf-8"?>
+<p:sld xmlns:a="http://schemas.openxmlformats.org/drawingml/2006/main" xmlns:r="http://schemas.openxmlformats.org/officeDocument/2006/relationships" xmlns:p="http://schemas.openxmlformats.org/presentationml/2006/main">
+  <p:cSld>
+    <p:spTree>
+      <p:nvGrpSpPr>
+        <p:cNvPr id="1" name=""/>
+        <p:cNvGrpSpPr/>
+        <p:nvPr/>
+      </p:nvGrpSpPr>
+      <p:grpSpPr>
+        <a:xfrm>
+          <a:off x="0" y="0"/>
+          <a:ext cx="0" cy="0"/>
+          <a:chOff x="0" y="0"/>
+          <a:chExt cx="0" cy="0"/>
+        </a:xfrm>
+      </p:grpSpPr>
+      <p:sp>
+        <p:nvSpPr>
+          <p:cNvPr id="4" name="Título 1">
+            <a:extLst>
+              <a:ext uri="{FF2B5EF4-FFF2-40B4-BE49-F238E27FC236}">
+                <a16:creationId xmlns:a16="http://schemas.microsoft.com/office/drawing/2014/main" id="{EDEB8FAC-37E9-FB47-00DC-A9D0F1D1AA2A}"/>
+              </a:ext>
+            </a:extLst>
+          </p:cNvPr>
+          <p:cNvSpPr txBox="1">
+            <a:spLocks/>
+          </p:cNvSpPr>
+          <p:nvPr/>
+        </p:nvSpPr>
+        <p:spPr>
+          <a:xfrm>
+            <a:off x="1286933" y="609600"/>
+            <a:ext cx="10197494" cy="1099457"/>
+          </a:xfrm>
+          <a:prstGeom prst="rect">
+            <a:avLst/>
+          </a:prstGeom>
+        </p:spPr>
+        <p:txBody>
+          <a:bodyPr vert="horz" lIns="91440" tIns="45720" rIns="91440" bIns="45720" rtlCol="0" anchor="t">
+            <a:normAutofit/>
+          </a:bodyPr>
+          <a:lstStyle>
+            <a:lvl1pPr algn="l" defTabSz="457200" rtl="0" eaLnBrk="1" latinLnBrk="0" hangingPunct="1">
+              <a:spcBef>
+                <a:spcPct val="0"/>
+              </a:spcBef>
+              <a:buNone/>
+              <a:defRPr sz="3600" kern="1200">
+                <a:solidFill>
+                  <a:schemeClr val="accent1"/>
+                </a:solidFill>
+                <a:latin typeface="+mj-lt"/>
+                <a:ea typeface="+mj-ea"/>
+                <a:cs typeface="+mj-cs"/>
+              </a:defRPr>
+            </a:lvl1pPr>
+            <a:lvl2pPr eaLnBrk="1" hangingPunct="1">
+              <a:defRPr>
+                <a:solidFill>
+                  <a:schemeClr val="tx2"/>
+                </a:solidFill>
+              </a:defRPr>
+            </a:lvl2pPr>
+            <a:lvl3pPr eaLnBrk="1" hangingPunct="1">
+              <a:defRPr>
+                <a:solidFill>
+                  <a:schemeClr val="tx2"/>
+                </a:solidFill>
+              </a:defRPr>
+            </a:lvl3pPr>
+            <a:lvl4pPr eaLnBrk="1" hangingPunct="1">
+              <a:defRPr>
+                <a:solidFill>
+                  <a:schemeClr val="tx2"/>
+                </a:solidFill>
+              </a:defRPr>
+            </a:lvl4pPr>
+            <a:lvl5pPr eaLnBrk="1" hangingPunct="1">
+              <a:defRPr>
+                <a:solidFill>
+                  <a:schemeClr val="tx2"/>
+                </a:solidFill>
+              </a:defRPr>
+            </a:lvl5pPr>
+            <a:lvl6pPr eaLnBrk="1" hangingPunct="1">
+              <a:defRPr>
+                <a:solidFill>
+                  <a:schemeClr val="tx2"/>
+                </a:solidFill>
+              </a:defRPr>
+            </a:lvl6pPr>
+            <a:lvl7pPr eaLnBrk="1" hangingPunct="1">
+              <a:defRPr>
+                <a:solidFill>
+                  <a:schemeClr val="tx2"/>
+                </a:solidFill>
+              </a:defRPr>
+            </a:lvl7pPr>
+            <a:lvl8pPr eaLnBrk="1" hangingPunct="1">
+              <a:defRPr>
+                <a:solidFill>
+                  <a:schemeClr val="tx2"/>
+                </a:solidFill>
+              </a:defRPr>
+            </a:lvl8pPr>
+            <a:lvl9pPr eaLnBrk="1" hangingPunct="1">
+              <a:defRPr>
+                <a:solidFill>
+                  <a:schemeClr val="tx2"/>
+                </a:solidFill>
+              </a:defRPr>
+            </a:lvl9pPr>
+          </a:lstStyle>
+          <a:p>
+            <a:pPr>
+              <a:spcAft>
+                <a:spcPts val="600"/>
+              </a:spcAft>
+            </a:pPr>
+            <a:r>
+              <a:rPr lang="en-US"/>
+              <a:t>Backend</a:t>
+            </a:r>
+          </a:p>
+        </p:txBody>
+      </p:sp>
+      <p:graphicFrame>
+        <p:nvGraphicFramePr>
+          <p:cNvPr id="7" name="CuadroTexto 4">
+            <a:extLst>
+              <a:ext uri="{FF2B5EF4-FFF2-40B4-BE49-F238E27FC236}">
+                <a16:creationId xmlns:a16="http://schemas.microsoft.com/office/drawing/2014/main" id="{636A2824-CA1B-962C-2769-6C459359959E}"/>
+              </a:ext>
+            </a:extLst>
+          </p:cNvPr>
+          <p:cNvGraphicFramePr/>
+          <p:nvPr/>
+        </p:nvGraphicFramePr>
+        <p:xfrm>
+          <a:off x="1286933" y="1948543"/>
+          <a:ext cx="9618133" cy="4093482"/>
+        </p:xfrm>
+        <a:graphic>
+          <a:graphicData uri="http://schemas.openxmlformats.org/drawingml/2006/diagram">
+            <dgm:relIds xmlns:dgm="http://schemas.openxmlformats.org/drawingml/2006/diagram" xmlns:r="http://schemas.openxmlformats.org/officeDocument/2006/relationships" r:dm="rId2" r:lo="rId3" r:qs="rId4" r:cs="rId5"/>
+          </a:graphicData>
+        </a:graphic>
+      </p:graphicFrame>
+    </p:spTree>
+    <p:extLst>
+      <p:ext uri="{BB962C8B-B14F-4D97-AF65-F5344CB8AC3E}">
+        <p14:creationId xmlns:p14="http://schemas.microsoft.com/office/powerpoint/2010/main" val="959427331"/>
+      </p:ext>
+    </p:extLst>
+  </p:cSld>
+  <p:clrMapOvr>
+    <a:masterClrMapping/>
+  </p:clrMapOvr>
+</p:sld>
+</file>
+
+<file path=ppt/slides/slide11.xml><?xml version="1.0" encoding="utf-8"?>
+<p:sld xmlns:a="http://schemas.openxmlformats.org/drawingml/2006/main" xmlns:r="http://schemas.openxmlformats.org/officeDocument/2006/relationships" xmlns:p="http://schemas.openxmlformats.org/presentationml/2006/main">
+  <p:cSld>
+    <p:spTree>
+      <p:nvGrpSpPr>
+        <p:cNvPr id="1" name=""/>
+        <p:cNvGrpSpPr/>
+        <p:nvPr/>
+      </p:nvGrpSpPr>
+      <p:grpSpPr>
+        <a:xfrm>
+          <a:off x="0" y="0"/>
+          <a:ext cx="0" cy="0"/>
+          <a:chOff x="0" y="0"/>
+          <a:chExt cx="0" cy="0"/>
+        </a:xfrm>
+      </p:grpSpPr>
+      <p:sp>
+        <p:nvSpPr>
+          <p:cNvPr id="4" name="Título 1">
+            <a:extLst>
+              <a:ext uri="{FF2B5EF4-FFF2-40B4-BE49-F238E27FC236}">
+                <a16:creationId xmlns:a16="http://schemas.microsoft.com/office/drawing/2014/main" id="{A245A7B8-BE05-B072-3C28-F141AB64574D}"/>
+              </a:ext>
+            </a:extLst>
+          </p:cNvPr>
+          <p:cNvSpPr txBox="1">
+            <a:spLocks/>
+          </p:cNvSpPr>
+          <p:nvPr/>
+        </p:nvSpPr>
+        <p:spPr>
+          <a:xfrm>
+            <a:off x="643467" y="816638"/>
+            <a:ext cx="3367359" cy="5224724"/>
+          </a:xfrm>
+          <a:prstGeom prst="rect">
+            <a:avLst/>
+          </a:prstGeom>
+        </p:spPr>
+        <p:txBody>
+          <a:bodyPr vert="horz" lIns="91440" tIns="45720" rIns="91440" bIns="45720" rtlCol="0" anchor="ctr">
+            <a:normAutofit/>
+          </a:bodyPr>
+          <a:lstStyle>
+            <a:lvl1pPr algn="l" defTabSz="457200" rtl="0" eaLnBrk="1" latinLnBrk="0" hangingPunct="1">
+              <a:spcBef>
+                <a:spcPct val="0"/>
+              </a:spcBef>
+              <a:buNone/>
+              <a:defRPr sz="3600" kern="1200">
+                <a:solidFill>
+                  <a:schemeClr val="accent1"/>
+                </a:solidFill>
+                <a:latin typeface="+mj-lt"/>
+                <a:ea typeface="+mj-ea"/>
+                <a:cs typeface="+mj-cs"/>
+              </a:defRPr>
+            </a:lvl1pPr>
+            <a:lvl2pPr eaLnBrk="1" hangingPunct="1">
+              <a:defRPr>
+                <a:solidFill>
+                  <a:schemeClr val="tx2"/>
+                </a:solidFill>
+              </a:defRPr>
+            </a:lvl2pPr>
+            <a:lvl3pPr eaLnBrk="1" hangingPunct="1">
+              <a:defRPr>
+                <a:solidFill>
+                  <a:schemeClr val="tx2"/>
+                </a:solidFill>
+              </a:defRPr>
+            </a:lvl3pPr>
+            <a:lvl4pPr eaLnBrk="1" hangingPunct="1">
+              <a:defRPr>
+                <a:solidFill>
+                  <a:schemeClr val="tx2"/>
+                </a:solidFill>
+              </a:defRPr>
+            </a:lvl4pPr>
+            <a:lvl5pPr eaLnBrk="1" hangingPunct="1">
+              <a:defRPr>
+                <a:solidFill>
+                  <a:schemeClr val="tx2"/>
+                </a:solidFill>
+              </a:defRPr>
+            </a:lvl5pPr>
+            <a:lvl6pPr eaLnBrk="1" hangingPunct="1">
+              <a:defRPr>
+                <a:solidFill>
+                  <a:schemeClr val="tx2"/>
+                </a:solidFill>
+              </a:defRPr>
+            </a:lvl6pPr>
+            <a:lvl7pPr eaLnBrk="1" hangingPunct="1">
+              <a:defRPr>
+                <a:solidFill>
+                  <a:schemeClr val="tx2"/>
+                </a:solidFill>
+              </a:defRPr>
+            </a:lvl7pPr>
+            <a:lvl8pPr eaLnBrk="1" hangingPunct="1">
+              <a:defRPr>
+                <a:solidFill>
+                  <a:schemeClr val="tx2"/>
+                </a:solidFill>
+              </a:defRPr>
+            </a:lvl8pPr>
+            <a:lvl9pPr eaLnBrk="1" hangingPunct="1">
+              <a:defRPr>
+                <a:solidFill>
+                  <a:schemeClr val="tx2"/>
+                </a:solidFill>
+              </a:defRPr>
+            </a:lvl9pPr>
+          </a:lstStyle>
+          <a:p>
+            <a:pPr>
+              <a:spcAft>
+                <a:spcPts val="600"/>
+              </a:spcAft>
+            </a:pPr>
+            <a:r>
+              <a:rPr lang="en-US"/>
+              <a:t>Frontend</a:t>
+            </a:r>
+          </a:p>
+        </p:txBody>
+      </p:sp>
+      <p:sp>
+        <p:nvSpPr>
+          <p:cNvPr id="5" name="CuadroTexto 4">
+            <a:extLst>
+              <a:ext uri="{FF2B5EF4-FFF2-40B4-BE49-F238E27FC236}">
+                <a16:creationId xmlns:a16="http://schemas.microsoft.com/office/drawing/2014/main" id="{3A7DD6D3-DFD4-21A3-6583-D4BE64D918A6}"/>
+              </a:ext>
+            </a:extLst>
+          </p:cNvPr>
+          <p:cNvSpPr txBox="1"/>
+          <p:nvPr/>
+        </p:nvSpPr>
+        <p:spPr>
+          <a:xfrm>
+            <a:off x="4654295" y="816638"/>
+            <a:ext cx="4619706" cy="5224724"/>
+          </a:xfrm>
+          <a:prstGeom prst="rect">
+            <a:avLst/>
+          </a:prstGeom>
+        </p:spPr>
+        <p:txBody>
+          <a:bodyPr vert="horz" lIns="91440" tIns="45720" rIns="91440" bIns="45720" rtlCol="0" anchor="ctr">
+            <a:normAutofit/>
+          </a:bodyPr>
+          <a:lstStyle/>
+          <a:p>
+            <a:pPr marL="285750" indent="-285750">
+              <a:spcBef>
+                <a:spcPts val="1000"/>
+              </a:spcBef>
+              <a:buClr>
+                <a:schemeClr val="accent1"/>
+              </a:buClr>
+              <a:buSzPct val="80000"/>
+              <a:buFont typeface="Wingdings 3" charset="2"/>
+              <a:buChar char=""/>
+            </a:pPr>
+            <a:r>
+              <a:rPr lang="en-US" dirty="0">
+                <a:solidFill>
+                  <a:schemeClr val="tx1">
+                    <a:lumMod val="75000"/>
+                    <a:lumOff val="25000"/>
+                  </a:schemeClr>
+                </a:solidFill>
+              </a:rPr>
+              <a:t>Para </a:t>
+            </a:r>
+            <a:r>
+              <a:rPr lang="en-US" dirty="0" err="1">
+                <a:solidFill>
+                  <a:schemeClr val="tx1">
+                    <a:lumMod val="75000"/>
+                    <a:lumOff val="25000"/>
+                  </a:schemeClr>
+                </a:solidFill>
+              </a:rPr>
+              <a:t>comenzar</a:t>
+            </a:r>
+            <a:r>
+              <a:rPr lang="en-US" dirty="0">
+                <a:solidFill>
+                  <a:schemeClr val="tx1">
+                    <a:lumMod val="75000"/>
+                    <a:lumOff val="25000"/>
+                  </a:schemeClr>
+                </a:solidFill>
+              </a:rPr>
+              <a:t> </a:t>
+            </a:r>
+            <a:r>
+              <a:rPr lang="en-US" dirty="0" err="1">
+                <a:solidFill>
+                  <a:schemeClr val="tx1">
+                    <a:lumMod val="75000"/>
+                    <a:lumOff val="25000"/>
+                  </a:schemeClr>
+                </a:solidFill>
+              </a:rPr>
+              <a:t>el</a:t>
+            </a:r>
+            <a:r>
+              <a:rPr lang="en-US" dirty="0">
+                <a:solidFill>
+                  <a:schemeClr val="tx1">
+                    <a:lumMod val="75000"/>
+                    <a:lumOff val="25000"/>
+                  </a:schemeClr>
+                </a:solidFill>
+              </a:rPr>
+              <a:t> </a:t>
+            </a:r>
+            <a:r>
+              <a:rPr lang="en-US" dirty="0" err="1">
+                <a:solidFill>
+                  <a:schemeClr val="tx1">
+                    <a:lumMod val="75000"/>
+                    <a:lumOff val="25000"/>
+                  </a:schemeClr>
+                </a:solidFill>
+              </a:rPr>
+              <a:t>proyecto</a:t>
+            </a:r>
+            <a:r>
+              <a:rPr lang="en-US" dirty="0">
+                <a:solidFill>
+                  <a:schemeClr val="tx1">
+                    <a:lumMod val="75000"/>
+                    <a:lumOff val="25000"/>
+                  </a:schemeClr>
+                </a:solidFill>
+              </a:rPr>
+              <a:t>:</a:t>
+            </a:r>
+          </a:p>
+          <a:p>
+            <a:pPr marL="742950" lvl="1" indent="-285750">
+              <a:spcBef>
+                <a:spcPts val="1000"/>
+              </a:spcBef>
+              <a:buClr>
+                <a:schemeClr val="accent1"/>
+              </a:buClr>
+              <a:buSzPct val="80000"/>
+              <a:buFont typeface="Wingdings 3" charset="2"/>
+              <a:buChar char=""/>
+            </a:pPr>
+            <a:r>
+              <a:rPr lang="en-US" dirty="0" err="1">
+                <a:solidFill>
+                  <a:schemeClr val="tx1">
+                    <a:lumMod val="75000"/>
+                    <a:lumOff val="25000"/>
+                  </a:schemeClr>
+                </a:solidFill>
+              </a:rPr>
+              <a:t>pnpm</a:t>
+            </a:r>
+            <a:r>
+              <a:rPr lang="en-US" dirty="0">
+                <a:solidFill>
+                  <a:schemeClr val="tx1">
+                    <a:lumMod val="75000"/>
+                    <a:lumOff val="25000"/>
+                  </a:schemeClr>
+                </a:solidFill>
+              </a:rPr>
+              <a:t> create </a:t>
+            </a:r>
+            <a:r>
+              <a:rPr lang="en-US" dirty="0" err="1">
+                <a:solidFill>
+                  <a:schemeClr val="tx1">
+                    <a:lumMod val="75000"/>
+                    <a:lumOff val="25000"/>
+                  </a:schemeClr>
+                </a:solidFill>
+              </a:rPr>
+              <a:t>vite@latest</a:t>
+            </a:r>
+            <a:r>
+              <a:rPr lang="en-US" dirty="0">
+                <a:solidFill>
+                  <a:schemeClr val="tx1">
+                    <a:lumMod val="75000"/>
+                    <a:lumOff val="25000"/>
+                  </a:schemeClr>
+                </a:solidFill>
+              </a:rPr>
+              <a:t> –template react-</a:t>
+            </a:r>
+            <a:r>
+              <a:rPr lang="en-US" dirty="0" err="1">
+                <a:solidFill>
+                  <a:schemeClr val="tx1">
+                    <a:lumMod val="75000"/>
+                    <a:lumOff val="25000"/>
+                  </a:schemeClr>
+                </a:solidFill>
+              </a:rPr>
+              <a:t>ts</a:t>
+            </a:r>
+            <a:endParaRPr lang="en-US" dirty="0">
+              <a:solidFill>
+                <a:schemeClr val="tx1">
+                  <a:lumMod val="75000"/>
+                  <a:lumOff val="25000"/>
+                </a:schemeClr>
+              </a:solidFill>
+            </a:endParaRPr>
+          </a:p>
+          <a:p>
+            <a:pPr marL="285750" indent="-285750">
+              <a:spcBef>
+                <a:spcPts val="1000"/>
+              </a:spcBef>
+              <a:buClr>
+                <a:schemeClr val="accent1"/>
+              </a:buClr>
+              <a:buSzPct val="80000"/>
+              <a:buFont typeface="Wingdings 3" charset="2"/>
+              <a:buChar char=""/>
+            </a:pPr>
+            <a:endParaRPr lang="en-US" dirty="0">
+              <a:solidFill>
+                <a:schemeClr val="tx1">
+                  <a:lumMod val="75000"/>
+                  <a:lumOff val="25000"/>
+                </a:schemeClr>
+              </a:solidFill>
+            </a:endParaRPr>
+          </a:p>
+          <a:p>
+            <a:pPr marL="285750" indent="-285750">
+              <a:spcBef>
+                <a:spcPts val="1000"/>
+              </a:spcBef>
+              <a:buClr>
+                <a:schemeClr val="accent1"/>
+              </a:buClr>
+              <a:buSzPct val="80000"/>
+              <a:buFont typeface="Wingdings 3" charset="2"/>
+              <a:buChar char=""/>
+            </a:pPr>
+            <a:r>
+              <a:rPr lang="en-US" dirty="0" err="1">
+                <a:solidFill>
+                  <a:schemeClr val="tx1">
+                    <a:lumMod val="75000"/>
+                    <a:lumOff val="25000"/>
+                  </a:schemeClr>
+                </a:solidFill>
+              </a:rPr>
+              <a:t>Añadimos</a:t>
+            </a:r>
+            <a:r>
+              <a:rPr lang="en-US" dirty="0">
+                <a:solidFill>
+                  <a:schemeClr val="tx1">
+                    <a:lumMod val="75000"/>
+                    <a:lumOff val="25000"/>
+                  </a:schemeClr>
+                </a:solidFill>
+              </a:rPr>
+              <a:t> </a:t>
+            </a:r>
+            <a:r>
+              <a:rPr lang="en-US" dirty="0" err="1">
+                <a:solidFill>
+                  <a:schemeClr val="tx1">
+                    <a:lumMod val="75000"/>
+                    <a:lumOff val="25000"/>
+                  </a:schemeClr>
+                </a:solidFill>
+              </a:rPr>
+              <a:t>dependencias</a:t>
+            </a:r>
+            <a:r>
+              <a:rPr lang="en-US" dirty="0">
+                <a:solidFill>
+                  <a:schemeClr val="tx1">
+                    <a:lumMod val="75000"/>
+                    <a:lumOff val="25000"/>
+                  </a:schemeClr>
+                </a:solidFill>
+              </a:rPr>
+              <a:t>: </a:t>
+            </a:r>
+          </a:p>
+          <a:p>
+            <a:pPr marL="742950" lvl="1" indent="-285750">
+              <a:spcBef>
+                <a:spcPts val="1000"/>
+              </a:spcBef>
+              <a:buClr>
+                <a:schemeClr val="accent1"/>
+              </a:buClr>
+              <a:buSzPct val="80000"/>
+              <a:buFont typeface="Wingdings 3" charset="2"/>
+              <a:buChar char=""/>
+            </a:pPr>
+            <a:r>
+              <a:rPr lang="en-US" dirty="0" err="1">
+                <a:solidFill>
+                  <a:schemeClr val="tx1">
+                    <a:lumMod val="75000"/>
+                    <a:lumOff val="25000"/>
+                  </a:schemeClr>
+                </a:solidFill>
+              </a:rPr>
+              <a:t>pnpm</a:t>
+            </a:r>
+            <a:r>
+              <a:rPr lang="en-US" dirty="0">
+                <a:solidFill>
+                  <a:schemeClr val="tx1">
+                    <a:lumMod val="75000"/>
+                    <a:lumOff val="25000"/>
+                  </a:schemeClr>
+                </a:solidFill>
+              </a:rPr>
+              <a:t> add socket.io-client</a:t>
+            </a:r>
+          </a:p>
+          <a:p>
+            <a:pPr marL="285750" indent="-285750">
+              <a:spcBef>
+                <a:spcPts val="1000"/>
+              </a:spcBef>
+              <a:buClr>
+                <a:schemeClr val="accent1"/>
+              </a:buClr>
+              <a:buSzPct val="80000"/>
+              <a:buFont typeface="Wingdings 3" charset="2"/>
+              <a:buChar char=""/>
+            </a:pPr>
+            <a:endParaRPr lang="en-US" dirty="0">
+              <a:solidFill>
+                <a:schemeClr val="tx1">
+                  <a:lumMod val="75000"/>
+                  <a:lumOff val="25000"/>
+                </a:schemeClr>
+              </a:solidFill>
+            </a:endParaRPr>
+          </a:p>
+          <a:p>
+            <a:pPr marL="285750" indent="-285750">
+              <a:spcBef>
+                <a:spcPts val="1000"/>
+              </a:spcBef>
+              <a:buClr>
+                <a:schemeClr val="accent1"/>
+              </a:buClr>
+              <a:buSzPct val="80000"/>
+              <a:buFont typeface="Wingdings 3" charset="2"/>
+              <a:buChar char=""/>
+            </a:pPr>
+            <a:r>
+              <a:rPr lang="en-US" dirty="0">
+                <a:solidFill>
+                  <a:schemeClr val="tx1">
+                    <a:lumMod val="75000"/>
+                    <a:lumOff val="25000"/>
+                  </a:schemeClr>
+                </a:solidFill>
+              </a:rPr>
+              <a:t>Para </a:t>
+            </a:r>
+            <a:r>
+              <a:rPr lang="en-US" dirty="0" err="1">
+                <a:solidFill>
+                  <a:schemeClr val="tx1">
+                    <a:lumMod val="75000"/>
+                    <a:lumOff val="25000"/>
+                  </a:schemeClr>
+                </a:solidFill>
+              </a:rPr>
+              <a:t>ejecutar</a:t>
+            </a:r>
+            <a:r>
+              <a:rPr lang="en-US" dirty="0">
+                <a:solidFill>
+                  <a:schemeClr val="tx1">
+                    <a:lumMod val="75000"/>
+                    <a:lumOff val="25000"/>
+                  </a:schemeClr>
+                </a:solidFill>
+              </a:rPr>
+              <a:t>: </a:t>
+            </a:r>
+          </a:p>
+          <a:p>
+            <a:pPr marL="742950" lvl="1" indent="-285750">
+              <a:spcBef>
+                <a:spcPts val="1000"/>
+              </a:spcBef>
+              <a:buClr>
+                <a:schemeClr val="accent1"/>
+              </a:buClr>
+              <a:buSzPct val="80000"/>
+              <a:buFont typeface="Wingdings 3" charset="2"/>
+              <a:buChar char=""/>
+            </a:pPr>
+            <a:r>
+              <a:rPr lang="en-US" dirty="0" err="1">
+                <a:solidFill>
+                  <a:schemeClr val="tx1">
+                    <a:lumMod val="75000"/>
+                    <a:lumOff val="25000"/>
+                  </a:schemeClr>
+                </a:solidFill>
+              </a:rPr>
+              <a:t>pnpm</a:t>
+            </a:r>
+            <a:r>
+              <a:rPr lang="en-US" dirty="0">
+                <a:solidFill>
+                  <a:schemeClr val="tx1">
+                    <a:lumMod val="75000"/>
+                    <a:lumOff val="25000"/>
+                  </a:schemeClr>
+                </a:solidFill>
+              </a:rPr>
+              <a:t> run build (</a:t>
+            </a:r>
+            <a:r>
+              <a:rPr lang="en-US" dirty="0" err="1">
+                <a:solidFill>
+                  <a:schemeClr val="tx1">
+                    <a:lumMod val="75000"/>
+                    <a:lumOff val="25000"/>
+                  </a:schemeClr>
+                </a:solidFill>
+              </a:rPr>
+              <a:t>tsc</a:t>
+            </a:r>
+            <a:r>
+              <a:rPr lang="en-US" dirty="0">
+                <a:solidFill>
+                  <a:schemeClr val="tx1">
+                    <a:lumMod val="75000"/>
+                    <a:lumOff val="25000"/>
+                  </a:schemeClr>
+                </a:solidFill>
+              </a:rPr>
+              <a:t> –b &amp;&amp; </a:t>
+            </a:r>
+            <a:r>
+              <a:rPr lang="en-US" dirty="0" err="1">
+                <a:solidFill>
+                  <a:schemeClr val="tx1">
+                    <a:lumMod val="75000"/>
+                    <a:lumOff val="25000"/>
+                  </a:schemeClr>
+                </a:solidFill>
+              </a:rPr>
+              <a:t>vite</a:t>
+            </a:r>
+            <a:r>
+              <a:rPr lang="en-US" dirty="0">
+                <a:solidFill>
+                  <a:schemeClr val="tx1">
+                    <a:lumMod val="75000"/>
+                    <a:lumOff val="25000"/>
+                  </a:schemeClr>
+                </a:solidFill>
+              </a:rPr>
+              <a:t> build)</a:t>
+            </a:r>
+          </a:p>
+          <a:p>
+            <a:pPr marL="742950" lvl="1" indent="-285750">
+              <a:spcBef>
+                <a:spcPts val="1000"/>
+              </a:spcBef>
+              <a:buClr>
+                <a:schemeClr val="accent1"/>
+              </a:buClr>
+              <a:buSzPct val="80000"/>
+              <a:buFont typeface="Wingdings 3" charset="2"/>
+              <a:buChar char=""/>
+            </a:pPr>
+            <a:r>
+              <a:rPr lang="en-US" dirty="0" err="1">
+                <a:solidFill>
+                  <a:schemeClr val="tx1">
+                    <a:lumMod val="75000"/>
+                    <a:lumOff val="25000"/>
+                  </a:schemeClr>
+                </a:solidFill>
+              </a:rPr>
+              <a:t>pnpm</a:t>
+            </a:r>
+            <a:r>
+              <a:rPr lang="en-US" dirty="0">
+                <a:solidFill>
+                  <a:schemeClr val="tx1">
+                    <a:lumMod val="75000"/>
+                    <a:lumOff val="25000"/>
+                  </a:schemeClr>
+                </a:solidFill>
+              </a:rPr>
+              <a:t> run preview (</a:t>
+            </a:r>
+            <a:r>
+              <a:rPr lang="en-US" dirty="0" err="1">
+                <a:solidFill>
+                  <a:schemeClr val="tx1">
+                    <a:lumMod val="75000"/>
+                    <a:lumOff val="25000"/>
+                  </a:schemeClr>
+                </a:solidFill>
+              </a:rPr>
+              <a:t>vite</a:t>
+            </a:r>
+            <a:r>
+              <a:rPr lang="en-US" dirty="0">
+                <a:solidFill>
+                  <a:schemeClr val="tx1">
+                    <a:lumMod val="75000"/>
+                    <a:lumOff val="25000"/>
+                  </a:schemeClr>
+                </a:solidFill>
+              </a:rPr>
+              <a:t> preview)</a:t>
+            </a:r>
+          </a:p>
+          <a:p>
+            <a:pPr marL="285750" indent="-285750">
+              <a:spcBef>
+                <a:spcPts val="1000"/>
+              </a:spcBef>
+              <a:buClr>
+                <a:schemeClr val="accent1"/>
+              </a:buClr>
+              <a:buSzPct val="80000"/>
+              <a:buFont typeface="Wingdings 3" charset="2"/>
+              <a:buChar char=""/>
+            </a:pPr>
+            <a:endParaRPr lang="en-US" dirty="0">
+              <a:solidFill>
+                <a:schemeClr val="tx1">
+                  <a:lumMod val="75000"/>
+                  <a:lumOff val="25000"/>
+                </a:schemeClr>
+              </a:solidFill>
+            </a:endParaRPr>
+          </a:p>
+        </p:txBody>
+      </p:sp>
+    </p:spTree>
+    <p:extLst>
+      <p:ext uri="{BB962C8B-B14F-4D97-AF65-F5344CB8AC3E}">
+        <p14:creationId xmlns:p14="http://schemas.microsoft.com/office/powerpoint/2010/main" val="755617845"/>
+      </p:ext>
+    </p:extLst>
+  </p:cSld>
+  <p:clrMapOvr>
+    <a:masterClrMapping/>
+  </p:clrMapOvr>
 </p:sld>
 </file>
 
@@ -12305,6 +16176,892 @@
 </p:sld>
 </file>
 
+<file path=ppt/slides/slide8.xml><?xml version="1.0" encoding="utf-8"?>
+<p:sld xmlns:a="http://schemas.openxmlformats.org/drawingml/2006/main" xmlns:r="http://schemas.openxmlformats.org/officeDocument/2006/relationships" xmlns:p="http://schemas.openxmlformats.org/presentationml/2006/main">
+  <p:cSld>
+    <p:spTree>
+      <p:nvGrpSpPr>
+        <p:cNvPr id="1" name=""/>
+        <p:cNvGrpSpPr/>
+        <p:nvPr/>
+      </p:nvGrpSpPr>
+      <p:grpSpPr>
+        <a:xfrm>
+          <a:off x="0" y="0"/>
+          <a:ext cx="0" cy="0"/>
+          <a:chOff x="0" y="0"/>
+          <a:chExt cx="0" cy="0"/>
+        </a:xfrm>
+      </p:grpSpPr>
+      <p:sp>
+        <p:nvSpPr>
+          <p:cNvPr id="4" name="Título 1">
+            <a:extLst>
+              <a:ext uri="{FF2B5EF4-FFF2-40B4-BE49-F238E27FC236}">
+                <a16:creationId xmlns:a16="http://schemas.microsoft.com/office/drawing/2014/main" id="{4EECC885-6A9F-9BD3-4103-35CA8FC4F246}"/>
+              </a:ext>
+            </a:extLst>
+          </p:cNvPr>
+          <p:cNvSpPr>
+            <a:spLocks noGrp="1"/>
+          </p:cNvSpPr>
+          <p:nvPr>
+            <p:ph type="title"/>
+          </p:nvPr>
+        </p:nvSpPr>
+        <p:spPr>
+          <a:xfrm>
+            <a:off x="1507066" y="999460"/>
+            <a:ext cx="5698067" cy="4479852"/>
+          </a:xfrm>
+        </p:spPr>
+        <p:txBody>
+          <a:bodyPr vert="horz" lIns="91440" tIns="45720" rIns="91440" bIns="45720" rtlCol="0" anchor="ctr">
+            <a:normAutofit/>
+          </a:bodyPr>
+          <a:lstStyle/>
+          <a:p>
+            <a:pPr algn="r"/>
+            <a:r>
+              <a:rPr lang="en-US" sz="5400" dirty="0"/>
+              <a:t>Como </a:t>
+            </a:r>
+            <a:r>
+              <a:rPr lang="en-US" sz="5400" dirty="0" err="1"/>
+              <a:t>empezar</a:t>
+            </a:r>
+            <a:r>
+              <a:rPr lang="en-US" sz="5400" dirty="0"/>
+              <a:t> mi </a:t>
+            </a:r>
+            <a:r>
+              <a:rPr lang="en-US" sz="5400" dirty="0" err="1"/>
+              <a:t>proyecto</a:t>
+            </a:r>
+            <a:r>
+              <a:rPr lang="en-US" sz="5400" dirty="0"/>
+              <a:t>?</a:t>
+            </a:r>
+          </a:p>
+        </p:txBody>
+      </p:sp>
+      <p:sp>
+        <p:nvSpPr>
+          <p:cNvPr id="5" name="Título 1">
+            <a:extLst>
+              <a:ext uri="{FF2B5EF4-FFF2-40B4-BE49-F238E27FC236}">
+                <a16:creationId xmlns:a16="http://schemas.microsoft.com/office/drawing/2014/main" id="{EE033618-1943-4E90-9F03-6FC6134EAA4C}"/>
+              </a:ext>
+            </a:extLst>
+          </p:cNvPr>
+          <p:cNvSpPr txBox="1">
+            <a:spLocks/>
+          </p:cNvSpPr>
+          <p:nvPr/>
+        </p:nvSpPr>
+        <p:spPr>
+          <a:xfrm>
+            <a:off x="8247661" y="2703661"/>
+            <a:ext cx="2603799" cy="886206"/>
+          </a:xfrm>
+          <a:prstGeom prst="rect">
+            <a:avLst/>
+          </a:prstGeom>
+        </p:spPr>
+        <p:txBody>
+          <a:bodyPr vert="horz" lIns="91440" tIns="45720" rIns="91440" bIns="45720" rtlCol="0" anchor="ctr">
+            <a:normAutofit lnSpcReduction="10000"/>
+          </a:bodyPr>
+          <a:lstStyle>
+            <a:lvl1pPr algn="l" defTabSz="457200" rtl="0" eaLnBrk="1" latinLnBrk="0" hangingPunct="1">
+              <a:spcBef>
+                <a:spcPct val="0"/>
+              </a:spcBef>
+              <a:buNone/>
+              <a:defRPr sz="3600" kern="1200">
+                <a:solidFill>
+                  <a:schemeClr val="accent1"/>
+                </a:solidFill>
+                <a:latin typeface="+mj-lt"/>
+                <a:ea typeface="+mj-ea"/>
+                <a:cs typeface="+mj-cs"/>
+              </a:defRPr>
+            </a:lvl1pPr>
+            <a:lvl2pPr eaLnBrk="1" hangingPunct="1">
+              <a:defRPr>
+                <a:solidFill>
+                  <a:schemeClr val="tx2"/>
+                </a:solidFill>
+              </a:defRPr>
+            </a:lvl2pPr>
+            <a:lvl3pPr eaLnBrk="1" hangingPunct="1">
+              <a:defRPr>
+                <a:solidFill>
+                  <a:schemeClr val="tx2"/>
+                </a:solidFill>
+              </a:defRPr>
+            </a:lvl3pPr>
+            <a:lvl4pPr eaLnBrk="1" hangingPunct="1">
+              <a:defRPr>
+                <a:solidFill>
+                  <a:schemeClr val="tx2"/>
+                </a:solidFill>
+              </a:defRPr>
+            </a:lvl4pPr>
+            <a:lvl5pPr eaLnBrk="1" hangingPunct="1">
+              <a:defRPr>
+                <a:solidFill>
+                  <a:schemeClr val="tx2"/>
+                </a:solidFill>
+              </a:defRPr>
+            </a:lvl5pPr>
+            <a:lvl6pPr eaLnBrk="1" hangingPunct="1">
+              <a:defRPr>
+                <a:solidFill>
+                  <a:schemeClr val="tx2"/>
+                </a:solidFill>
+              </a:defRPr>
+            </a:lvl6pPr>
+            <a:lvl7pPr eaLnBrk="1" hangingPunct="1">
+              <a:defRPr>
+                <a:solidFill>
+                  <a:schemeClr val="tx2"/>
+                </a:solidFill>
+              </a:defRPr>
+            </a:lvl7pPr>
+            <a:lvl8pPr eaLnBrk="1" hangingPunct="1">
+              <a:defRPr>
+                <a:solidFill>
+                  <a:schemeClr val="tx2"/>
+                </a:solidFill>
+              </a:defRPr>
+            </a:lvl8pPr>
+            <a:lvl9pPr eaLnBrk="1" hangingPunct="1">
+              <a:defRPr>
+                <a:solidFill>
+                  <a:schemeClr val="tx2"/>
+                </a:solidFill>
+              </a:defRPr>
+            </a:lvl9pPr>
+          </a:lstStyle>
+          <a:p>
+            <a:pPr algn="r"/>
+            <a:r>
+              <a:rPr lang="en-US" sz="5400" dirty="0"/>
+              <a:t>NODEJS</a:t>
+            </a:r>
+          </a:p>
+        </p:txBody>
+      </p:sp>
+    </p:spTree>
+    <p:extLst>
+      <p:ext uri="{BB962C8B-B14F-4D97-AF65-F5344CB8AC3E}">
+        <p14:creationId xmlns:p14="http://schemas.microsoft.com/office/powerpoint/2010/main" val="4158207622"/>
+      </p:ext>
+    </p:extLst>
+  </p:cSld>
+  <p:clrMapOvr>
+    <a:masterClrMapping/>
+  </p:clrMapOvr>
+  <p:timing>
+    <p:tnLst>
+      <p:par>
+        <p:cTn id="1" dur="indefinite" restart="never" nodeType="tmRoot">
+          <p:childTnLst>
+            <p:seq concurrent="1" nextAc="seek">
+              <p:cTn id="2" dur="indefinite" nodeType="mainSeq">
+                <p:childTnLst>
+                  <p:par>
+                    <p:cTn id="3" fill="hold">
+                      <p:stCondLst>
+                        <p:cond delay="indefinite"/>
+                        <p:cond evt="onBegin" delay="0">
+                          <p:tn val="2"/>
+                        </p:cond>
+                      </p:stCondLst>
+                      <p:childTnLst>
+                        <p:par>
+                          <p:cTn id="4" fill="hold">
+                            <p:stCondLst>
+                              <p:cond delay="0"/>
+                            </p:stCondLst>
+                            <p:childTnLst>
+                              <p:par>
+                                <p:cTn id="5" presetID="10" presetClass="entr" presetSubtype="0" fill="hold" grpId="0" nodeType="withEffect">
+                                  <p:stCondLst>
+                                    <p:cond delay="500"/>
+                                  </p:stCondLst>
+                                  <p:iterate type="wd">
+                                    <p:tmPct val="15000"/>
+                                  </p:iterate>
+                                  <p:childTnLst>
+                                    <p:set>
+                                      <p:cBhvr>
+                                        <p:cTn id="6" dur="1" fill="hold">
+                                          <p:stCondLst>
+                                            <p:cond delay="0"/>
+                                          </p:stCondLst>
+                                        </p:cTn>
+                                        <p:tgtEl>
+                                          <p:spTgt spid="4"/>
+                                        </p:tgtEl>
+                                        <p:attrNameLst>
+                                          <p:attrName>style.visibility</p:attrName>
+                                        </p:attrNameLst>
+                                      </p:cBhvr>
+                                      <p:to>
+                                        <p:strVal val="visible"/>
+                                      </p:to>
+                                    </p:set>
+                                    <p:animEffect transition="in" filter="fade">
+                                      <p:cBhvr>
+                                        <p:cTn id="7" dur="1000"/>
+                                        <p:tgtEl>
+                                          <p:spTgt spid="4"/>
+                                        </p:tgtEl>
+                                      </p:cBhvr>
+                                    </p:animEffect>
+                                  </p:childTnLst>
+                                </p:cTn>
+                              </p:par>
+                              <p:par>
+                                <p:cTn id="8" presetID="10" presetClass="entr" presetSubtype="0" fill="hold" grpId="0" nodeType="withEffect">
+                                  <p:stCondLst>
+                                    <p:cond delay="500"/>
+                                  </p:stCondLst>
+                                  <p:iterate type="wd">
+                                    <p:tmPct val="15000"/>
+                                  </p:iterate>
+                                  <p:childTnLst>
+                                    <p:set>
+                                      <p:cBhvr>
+                                        <p:cTn id="9" dur="1" fill="hold">
+                                          <p:stCondLst>
+                                            <p:cond delay="0"/>
+                                          </p:stCondLst>
+                                        </p:cTn>
+                                        <p:tgtEl>
+                                          <p:spTgt spid="5"/>
+                                        </p:tgtEl>
+                                        <p:attrNameLst>
+                                          <p:attrName>style.visibility</p:attrName>
+                                        </p:attrNameLst>
+                                      </p:cBhvr>
+                                      <p:to>
+                                        <p:strVal val="visible"/>
+                                      </p:to>
+                                    </p:set>
+                                    <p:animEffect transition="in" filter="fade">
+                                      <p:cBhvr>
+                                        <p:cTn id="10" dur="1000"/>
+                                        <p:tgtEl>
+                                          <p:spTgt spid="5"/>
+                                        </p:tgtEl>
+                                      </p:cBhvr>
+                                    </p:animEffect>
+                                  </p:childTnLst>
+                                </p:cTn>
+                              </p:par>
+                            </p:childTnLst>
+                          </p:cTn>
+                        </p:par>
+                      </p:childTnLst>
+                    </p:cTn>
+                  </p:par>
+                </p:childTnLst>
+              </p:cTn>
+              <p:prevCondLst>
+                <p:cond evt="onPrev" delay="0">
+                  <p:tgtEl>
+                    <p:sldTgt/>
+                  </p:tgtEl>
+                </p:cond>
+              </p:prevCondLst>
+              <p:nextCondLst>
+                <p:cond evt="onNext" delay="0">
+                  <p:tgtEl>
+                    <p:sldTgt/>
+                  </p:tgtEl>
+                </p:cond>
+              </p:nextCondLst>
+            </p:seq>
+          </p:childTnLst>
+        </p:cTn>
+      </p:par>
+    </p:tnLst>
+    <p:bldLst>
+      <p:bldP spid="4" grpId="0"/>
+      <p:bldP spid="5" grpId="0"/>
+    </p:bldLst>
+  </p:timing>
+</p:sld>
+</file>
+
+<file path=ppt/slides/slide9.xml><?xml version="1.0" encoding="utf-8"?>
+<p:sld xmlns:a="http://schemas.openxmlformats.org/drawingml/2006/main" xmlns:r="http://schemas.openxmlformats.org/officeDocument/2006/relationships" xmlns:p="http://schemas.openxmlformats.org/presentationml/2006/main">
+  <p:cSld>
+    <p:spTree>
+      <p:nvGrpSpPr>
+        <p:cNvPr id="1" name=""/>
+        <p:cNvGrpSpPr/>
+        <p:nvPr/>
+      </p:nvGrpSpPr>
+      <p:grpSpPr>
+        <a:xfrm>
+          <a:off x="0" y="0"/>
+          <a:ext cx="0" cy="0"/>
+          <a:chOff x="0" y="0"/>
+          <a:chExt cx="0" cy="0"/>
+        </a:xfrm>
+      </p:grpSpPr>
+      <p:pic>
+        <p:nvPicPr>
+          <p:cNvPr id="12" name="Picture 10" descr="Cubos conectados con una línea roja">
+            <a:extLst>
+              <a:ext uri="{FF2B5EF4-FFF2-40B4-BE49-F238E27FC236}">
+                <a16:creationId xmlns:a16="http://schemas.microsoft.com/office/drawing/2014/main" id="{BD096387-2C9C-464E-3033-2BA31BC2ABE6}"/>
+              </a:ext>
+            </a:extLst>
+          </p:cNvPr>
+          <p:cNvPicPr>
+            <a:picLocks noChangeAspect="1"/>
+          </p:cNvPicPr>
+          <p:nvPr/>
+        </p:nvPicPr>
+        <p:blipFill>
+          <a:blip r:embed="rId2"/>
+          <a:srcRect l="11052" r="-1" b="-1"/>
+          <a:stretch/>
+        </p:blipFill>
+        <p:spPr>
+          <a:xfrm>
+            <a:off x="4269854" y="-1"/>
+            <a:ext cx="7922146" cy="6858001"/>
+          </a:xfrm>
+          <a:custGeom>
+            <a:avLst/>
+            <a:gdLst/>
+            <a:ahLst/>
+            <a:cxnLst/>
+            <a:rect l="l" t="t" r="r" b="b"/>
+            <a:pathLst>
+              <a:path w="7922146" h="6858001">
+                <a:moveTo>
+                  <a:pt x="379987" y="0"/>
+                </a:moveTo>
+                <a:lnTo>
+                  <a:pt x="5304971" y="0"/>
+                </a:lnTo>
+                <a:lnTo>
+                  <a:pt x="7065281" y="0"/>
+                </a:lnTo>
+                <a:lnTo>
+                  <a:pt x="7397540" y="0"/>
+                </a:lnTo>
+                <a:lnTo>
+                  <a:pt x="7397540" y="1"/>
+                </a:lnTo>
+                <a:lnTo>
+                  <a:pt x="7922146" y="1"/>
+                </a:lnTo>
+                <a:lnTo>
+                  <a:pt x="7922146" y="6858001"/>
+                </a:lnTo>
+                <a:lnTo>
+                  <a:pt x="7065281" y="6858001"/>
+                </a:lnTo>
+                <a:lnTo>
+                  <a:pt x="7065281" y="6858000"/>
+                </a:lnTo>
+                <a:lnTo>
+                  <a:pt x="5932989" y="6858000"/>
+                </a:lnTo>
+                <a:lnTo>
+                  <a:pt x="5932989" y="6858001"/>
+                </a:lnTo>
+                <a:lnTo>
+                  <a:pt x="27809" y="6858001"/>
+                </a:lnTo>
+                <a:lnTo>
+                  <a:pt x="1803228" y="4521201"/>
+                </a:lnTo>
+                <a:close/>
+                <a:moveTo>
+                  <a:pt x="0" y="0"/>
+                </a:moveTo>
+                <a:lnTo>
+                  <a:pt x="379987" y="0"/>
+                </a:lnTo>
+                <a:lnTo>
+                  <a:pt x="0" y="407"/>
+                </a:lnTo>
+                <a:close/>
+              </a:path>
+            </a:pathLst>
+          </a:custGeom>
+        </p:spPr>
+      </p:pic>
+      <p:sp>
+        <p:nvSpPr>
+          <p:cNvPr id="6" name="Título 1">
+            <a:extLst>
+              <a:ext uri="{FF2B5EF4-FFF2-40B4-BE49-F238E27FC236}">
+                <a16:creationId xmlns:a16="http://schemas.microsoft.com/office/drawing/2014/main" id="{8DAF9451-BB77-4D4C-8D11-8491369F3432}"/>
+              </a:ext>
+            </a:extLst>
+          </p:cNvPr>
+          <p:cNvSpPr txBox="1">
+            <a:spLocks/>
+          </p:cNvSpPr>
+          <p:nvPr/>
+        </p:nvSpPr>
+        <p:spPr>
+          <a:xfrm>
+            <a:off x="677333" y="609600"/>
+            <a:ext cx="3851123" cy="1320800"/>
+          </a:xfrm>
+          <a:prstGeom prst="rect">
+            <a:avLst/>
+          </a:prstGeom>
+        </p:spPr>
+        <p:txBody>
+          <a:bodyPr vert="horz" lIns="91440" tIns="45720" rIns="91440" bIns="45720" rtlCol="0" anchor="t">
+            <a:normAutofit/>
+          </a:bodyPr>
+          <a:lstStyle>
+            <a:lvl1pPr algn="l" defTabSz="457200" rtl="0" eaLnBrk="1" latinLnBrk="0" hangingPunct="1">
+              <a:spcBef>
+                <a:spcPct val="0"/>
+              </a:spcBef>
+              <a:buNone/>
+              <a:defRPr sz="3600" kern="1200">
+                <a:solidFill>
+                  <a:schemeClr val="accent1"/>
+                </a:solidFill>
+                <a:latin typeface="+mj-lt"/>
+                <a:ea typeface="+mj-ea"/>
+                <a:cs typeface="+mj-cs"/>
+              </a:defRPr>
+            </a:lvl1pPr>
+            <a:lvl2pPr eaLnBrk="1" hangingPunct="1">
+              <a:defRPr>
+                <a:solidFill>
+                  <a:schemeClr val="tx2"/>
+                </a:solidFill>
+              </a:defRPr>
+            </a:lvl2pPr>
+            <a:lvl3pPr eaLnBrk="1" hangingPunct="1">
+              <a:defRPr>
+                <a:solidFill>
+                  <a:schemeClr val="tx2"/>
+                </a:solidFill>
+              </a:defRPr>
+            </a:lvl3pPr>
+            <a:lvl4pPr eaLnBrk="1" hangingPunct="1">
+              <a:defRPr>
+                <a:solidFill>
+                  <a:schemeClr val="tx2"/>
+                </a:solidFill>
+              </a:defRPr>
+            </a:lvl4pPr>
+            <a:lvl5pPr eaLnBrk="1" hangingPunct="1">
+              <a:defRPr>
+                <a:solidFill>
+                  <a:schemeClr val="tx2"/>
+                </a:solidFill>
+              </a:defRPr>
+            </a:lvl5pPr>
+            <a:lvl6pPr eaLnBrk="1" hangingPunct="1">
+              <a:defRPr>
+                <a:solidFill>
+                  <a:schemeClr val="tx2"/>
+                </a:solidFill>
+              </a:defRPr>
+            </a:lvl6pPr>
+            <a:lvl7pPr eaLnBrk="1" hangingPunct="1">
+              <a:defRPr>
+                <a:solidFill>
+                  <a:schemeClr val="tx2"/>
+                </a:solidFill>
+              </a:defRPr>
+            </a:lvl7pPr>
+            <a:lvl8pPr eaLnBrk="1" hangingPunct="1">
+              <a:defRPr>
+                <a:solidFill>
+                  <a:schemeClr val="tx2"/>
+                </a:solidFill>
+              </a:defRPr>
+            </a:lvl8pPr>
+            <a:lvl9pPr eaLnBrk="1" hangingPunct="1">
+              <a:defRPr>
+                <a:solidFill>
+                  <a:schemeClr val="tx2"/>
+                </a:solidFill>
+              </a:defRPr>
+            </a:lvl9pPr>
+          </a:lstStyle>
+          <a:p>
+            <a:pPr>
+              <a:spcAft>
+                <a:spcPts val="600"/>
+              </a:spcAft>
+            </a:pPr>
+            <a:r>
+              <a:rPr lang="en-US"/>
+              <a:t>Pasos iniciales</a:t>
+            </a:r>
+          </a:p>
+        </p:txBody>
+      </p:sp>
+      <p:sp>
+        <p:nvSpPr>
+          <p:cNvPr id="9" name="CuadroTexto 8">
+            <a:extLst>
+              <a:ext uri="{FF2B5EF4-FFF2-40B4-BE49-F238E27FC236}">
+                <a16:creationId xmlns:a16="http://schemas.microsoft.com/office/drawing/2014/main" id="{9DED2CF8-D4E3-0D6A-15E6-422FB7932DBE}"/>
+              </a:ext>
+            </a:extLst>
+          </p:cNvPr>
+          <p:cNvSpPr txBox="1"/>
+          <p:nvPr/>
+        </p:nvSpPr>
+        <p:spPr>
+          <a:xfrm>
+            <a:off x="677334" y="2160589"/>
+            <a:ext cx="3851122" cy="3880773"/>
+          </a:xfrm>
+          <a:prstGeom prst="rect">
+            <a:avLst/>
+          </a:prstGeom>
+        </p:spPr>
+        <p:txBody>
+          <a:bodyPr vert="horz" lIns="91440" tIns="45720" rIns="91440" bIns="45720" rtlCol="0">
+            <a:normAutofit/>
+          </a:bodyPr>
+          <a:lstStyle/>
+          <a:p>
+            <a:pPr marL="285750" indent="-285750">
+              <a:spcBef>
+                <a:spcPts val="1000"/>
+              </a:spcBef>
+              <a:buClr>
+                <a:schemeClr val="accent1"/>
+              </a:buClr>
+              <a:buSzPct val="80000"/>
+              <a:buFont typeface="Wingdings 3" charset="2"/>
+              <a:buChar char=""/>
+            </a:pPr>
+            <a:r>
+              <a:rPr lang="en-US" dirty="0" err="1">
+                <a:solidFill>
+                  <a:schemeClr val="tx1">
+                    <a:lumMod val="75000"/>
+                    <a:lumOff val="25000"/>
+                  </a:schemeClr>
+                </a:solidFill>
+              </a:rPr>
+              <a:t>Instalar</a:t>
+            </a:r>
+            <a:r>
+              <a:rPr lang="en-US" dirty="0">
+                <a:solidFill>
+                  <a:schemeClr val="tx1">
+                    <a:lumMod val="75000"/>
+                    <a:lumOff val="25000"/>
+                  </a:schemeClr>
+                </a:solidFill>
+              </a:rPr>
+              <a:t> node.</a:t>
+            </a:r>
+          </a:p>
+          <a:p>
+            <a:pPr marL="285750" indent="-285750">
+              <a:spcBef>
+                <a:spcPts val="1000"/>
+              </a:spcBef>
+              <a:buClr>
+                <a:schemeClr val="accent1"/>
+              </a:buClr>
+              <a:buSzPct val="80000"/>
+              <a:buFont typeface="Wingdings 3" charset="2"/>
+              <a:buChar char=""/>
+            </a:pPr>
+            <a:endParaRPr lang="en-US" dirty="0">
+              <a:solidFill>
+                <a:schemeClr val="tx1">
+                  <a:lumMod val="75000"/>
+                  <a:lumOff val="25000"/>
+                </a:schemeClr>
+              </a:solidFill>
+            </a:endParaRPr>
+          </a:p>
+          <a:p>
+            <a:pPr marL="285750" indent="-285750">
+              <a:spcBef>
+                <a:spcPts val="1000"/>
+              </a:spcBef>
+              <a:buClr>
+                <a:schemeClr val="accent1"/>
+              </a:buClr>
+              <a:buSzPct val="80000"/>
+              <a:buFont typeface="Wingdings 3" charset="2"/>
+              <a:buChar char=""/>
+            </a:pPr>
+            <a:r>
+              <a:rPr lang="en-US" dirty="0">
+                <a:solidFill>
+                  <a:schemeClr val="tx1">
+                    <a:lumMod val="75000"/>
+                    <a:lumOff val="25000"/>
+                  </a:schemeClr>
+                </a:solidFill>
+              </a:rPr>
+              <a:t>Crear un </a:t>
+            </a:r>
+            <a:r>
+              <a:rPr lang="en-US" dirty="0" err="1">
+                <a:solidFill>
+                  <a:schemeClr val="tx1">
+                    <a:lumMod val="75000"/>
+                    <a:lumOff val="25000"/>
+                  </a:schemeClr>
+                </a:solidFill>
+              </a:rPr>
+              <a:t>proyecto</a:t>
+            </a:r>
+            <a:r>
+              <a:rPr lang="en-US" dirty="0">
+                <a:solidFill>
+                  <a:schemeClr val="tx1">
+                    <a:lumMod val="75000"/>
+                    <a:lumOff val="25000"/>
+                  </a:schemeClr>
+                </a:solidFill>
+              </a:rPr>
+              <a:t>, con dos </a:t>
+            </a:r>
+            <a:r>
+              <a:rPr lang="en-US" dirty="0" err="1">
+                <a:solidFill>
+                  <a:schemeClr val="tx1">
+                    <a:lumMod val="75000"/>
+                    <a:lumOff val="25000"/>
+                  </a:schemeClr>
+                </a:solidFill>
+              </a:rPr>
+              <a:t>subproyectos</a:t>
+            </a:r>
+            <a:r>
+              <a:rPr lang="en-US" dirty="0">
+                <a:solidFill>
+                  <a:schemeClr val="tx1">
+                    <a:lumMod val="75000"/>
+                    <a:lumOff val="25000"/>
+                  </a:schemeClr>
+                </a:solidFill>
+              </a:rPr>
+              <a:t> </a:t>
+            </a:r>
+            <a:r>
+              <a:rPr lang="en-US" dirty="0" err="1">
+                <a:solidFill>
+                  <a:schemeClr val="tx1">
+                    <a:lumMod val="75000"/>
+                    <a:lumOff val="25000"/>
+                  </a:schemeClr>
+                </a:solidFill>
+              </a:rPr>
+              <a:t>cliente</a:t>
+            </a:r>
+            <a:r>
+              <a:rPr lang="en-US" dirty="0">
+                <a:solidFill>
+                  <a:schemeClr val="tx1">
+                    <a:lumMod val="75000"/>
+                    <a:lumOff val="25000"/>
+                  </a:schemeClr>
+                </a:solidFill>
+              </a:rPr>
+              <a:t> y backend</a:t>
+            </a:r>
+          </a:p>
+          <a:p>
+            <a:pPr marL="285750" indent="-285750">
+              <a:spcBef>
+                <a:spcPts val="1000"/>
+              </a:spcBef>
+              <a:buClr>
+                <a:schemeClr val="accent1"/>
+              </a:buClr>
+              <a:buSzPct val="80000"/>
+              <a:buFont typeface="Wingdings 3" charset="2"/>
+              <a:buChar char=""/>
+            </a:pPr>
+            <a:endParaRPr lang="en-US" dirty="0">
+              <a:solidFill>
+                <a:schemeClr val="tx1">
+                  <a:lumMod val="75000"/>
+                  <a:lumOff val="25000"/>
+                </a:schemeClr>
+              </a:solidFill>
+            </a:endParaRPr>
+          </a:p>
+          <a:p>
+            <a:pPr marL="285750" indent="-285750">
+              <a:spcBef>
+                <a:spcPts val="1000"/>
+              </a:spcBef>
+              <a:buClr>
+                <a:schemeClr val="accent1"/>
+              </a:buClr>
+              <a:buSzPct val="80000"/>
+              <a:buFont typeface="Wingdings 3" charset="2"/>
+              <a:buChar char=""/>
+            </a:pPr>
+            <a:r>
+              <a:rPr lang="en-US" dirty="0" err="1">
+                <a:solidFill>
+                  <a:schemeClr val="tx1">
+                    <a:lumMod val="75000"/>
+                    <a:lumOff val="25000"/>
+                  </a:schemeClr>
+                </a:solidFill>
+              </a:rPr>
+              <a:t>Entramos</a:t>
+            </a:r>
+            <a:r>
+              <a:rPr lang="en-US" dirty="0">
+                <a:solidFill>
+                  <a:schemeClr val="tx1">
+                    <a:lumMod val="75000"/>
+                    <a:lumOff val="25000"/>
+                  </a:schemeClr>
+                </a:solidFill>
+              </a:rPr>
+              <a:t> </a:t>
+            </a:r>
+            <a:r>
+              <a:rPr lang="en-US" dirty="0" err="1">
+                <a:solidFill>
+                  <a:schemeClr val="tx1">
+                    <a:lumMod val="75000"/>
+                    <a:lumOff val="25000"/>
+                  </a:schemeClr>
+                </a:solidFill>
+              </a:rPr>
+              <a:t>en</a:t>
+            </a:r>
+            <a:r>
+              <a:rPr lang="en-US" dirty="0">
+                <a:solidFill>
+                  <a:schemeClr val="tx1">
+                    <a:lumMod val="75000"/>
+                    <a:lumOff val="25000"/>
+                  </a:schemeClr>
+                </a:solidFill>
+              </a:rPr>
+              <a:t> backend y </a:t>
+            </a:r>
+            <a:r>
+              <a:rPr lang="en-US" dirty="0" err="1">
+                <a:solidFill>
+                  <a:schemeClr val="tx1">
+                    <a:lumMod val="75000"/>
+                    <a:lumOff val="25000"/>
+                  </a:schemeClr>
+                </a:solidFill>
+              </a:rPr>
+              <a:t>hacemos</a:t>
+            </a:r>
+            <a:r>
+              <a:rPr lang="en-US" dirty="0">
+                <a:solidFill>
+                  <a:schemeClr val="tx1">
+                    <a:lumMod val="75000"/>
+                    <a:lumOff val="25000"/>
+                  </a:schemeClr>
+                </a:solidFill>
+              </a:rPr>
+              <a:t> un </a:t>
+            </a:r>
+            <a:r>
+              <a:rPr lang="en-US" dirty="0" err="1">
+                <a:solidFill>
+                  <a:schemeClr val="tx1">
+                    <a:lumMod val="75000"/>
+                    <a:lumOff val="25000"/>
+                  </a:schemeClr>
+                </a:solidFill>
+              </a:rPr>
+              <a:t>pnpm</a:t>
+            </a:r>
+            <a:r>
+              <a:rPr lang="en-US" dirty="0">
+                <a:solidFill>
+                  <a:schemeClr val="tx1">
+                    <a:lumMod val="75000"/>
+                    <a:lumOff val="25000"/>
+                  </a:schemeClr>
+                </a:solidFill>
+              </a:rPr>
+              <a:t> </a:t>
+            </a:r>
+            <a:r>
+              <a:rPr lang="en-US" dirty="0" err="1">
+                <a:solidFill>
+                  <a:schemeClr val="tx1">
+                    <a:lumMod val="75000"/>
+                    <a:lumOff val="25000"/>
+                  </a:schemeClr>
+                </a:solidFill>
+              </a:rPr>
+              <a:t>init</a:t>
+            </a:r>
+            <a:endParaRPr lang="en-US" dirty="0">
+              <a:solidFill>
+                <a:schemeClr val="tx1">
+                  <a:lumMod val="75000"/>
+                  <a:lumOff val="25000"/>
+                </a:schemeClr>
+              </a:solidFill>
+            </a:endParaRPr>
+          </a:p>
+          <a:p>
+            <a:pPr marL="285750" indent="-285750">
+              <a:spcBef>
+                <a:spcPts val="1000"/>
+              </a:spcBef>
+              <a:buClr>
+                <a:schemeClr val="accent1"/>
+              </a:buClr>
+              <a:buSzPct val="80000"/>
+              <a:buFont typeface="Wingdings 3" charset="2"/>
+              <a:buChar char=""/>
+            </a:pPr>
+            <a:endParaRPr lang="en-US" dirty="0">
+              <a:solidFill>
+                <a:schemeClr val="tx1">
+                  <a:lumMod val="75000"/>
+                  <a:lumOff val="25000"/>
+                </a:schemeClr>
+              </a:solidFill>
+            </a:endParaRPr>
+          </a:p>
+        </p:txBody>
+      </p:sp>
+    </p:spTree>
+    <p:extLst>
+      <p:ext uri="{BB962C8B-B14F-4D97-AF65-F5344CB8AC3E}">
+        <p14:creationId xmlns:p14="http://schemas.microsoft.com/office/powerpoint/2010/main" val="1689843285"/>
+      </p:ext>
+    </p:extLst>
+  </p:cSld>
+  <p:clrMapOvr>
+    <a:masterClrMapping/>
+  </p:clrMapOvr>
+</p:sld>
+</file>
+
 <file path=ppt/theme/theme1.xml><?xml version="1.0" encoding="utf-8"?>
 <a:theme xmlns:a="http://schemas.openxmlformats.org/drawingml/2006/main" name="Faceta">
   <a:themeElements>

</xml_diff>